<commit_message>
Add link of result
</commit_message>
<xml_diff>
--- a/Data Analytics and Information Virtualization Project.pptx
+++ b/Data Analytics and Information Virtualization Project.pptx
@@ -177,7 +177,7 @@
           <a:noFill/>
           <a:extLst>
             <a:ext uri="{909E8E84-426E-40dd-AFC4-6F175D3DCCD1}">
-              <a14:hiddenFill xmlns:a14="http://schemas.microsoft.com/office/drawing/2010/main" xmlns="">
+              <a14:hiddenFill xmlns="" xmlns:a14="http://schemas.microsoft.com/office/drawing/2010/main">
                 <a:solidFill>
                   <a:srgbClr val="FFFFFF"/>
                 </a:solidFill>
@@ -237,7 +237,7 @@
             </a:ln>
             <a:extLst>
               <a:ext uri="{91240B29-F687-4f45-9708-019B960494DF}">
-                <a14:hiddenLine xmlns:a14="http://schemas.microsoft.com/office/drawing/2010/main" xmlns="" w="9525">
+                <a14:hiddenLine xmlns="" xmlns:a14="http://schemas.microsoft.com/office/drawing/2010/main" w="9525">
                   <a:solidFill>
                     <a:srgbClr val="000000"/>
                   </a:solidFill>
@@ -327,7 +327,7 @@
             </a:ln>
             <a:extLst>
               <a:ext uri="{91240B29-F687-4f45-9708-019B960494DF}">
-                <a14:hiddenLine xmlns:a14="http://schemas.microsoft.com/office/drawing/2010/main" xmlns="" w="9525">
+                <a14:hiddenLine xmlns="" xmlns:a14="http://schemas.microsoft.com/office/drawing/2010/main" w="9525">
                   <a:solidFill>
                     <a:srgbClr val="000000"/>
                   </a:solidFill>
@@ -417,7 +417,7 @@
             </a:ln>
             <a:extLst>
               <a:ext uri="{91240B29-F687-4f45-9708-019B960494DF}">
-                <a14:hiddenLine xmlns:a14="http://schemas.microsoft.com/office/drawing/2010/main" xmlns="" w="9525">
+                <a14:hiddenLine xmlns="" xmlns:a14="http://schemas.microsoft.com/office/drawing/2010/main" w="9525">
                   <a:solidFill>
                     <a:srgbClr val="000000"/>
                   </a:solidFill>
@@ -451,7 +451,7 @@
             </a:ln>
             <a:extLst>
               <a:ext uri="{91240B29-F687-4f45-9708-019B960494DF}">
-                <a14:hiddenLine xmlns:a14="http://schemas.microsoft.com/office/drawing/2010/main" xmlns="" w="9525">
+                <a14:hiddenLine xmlns="" xmlns:a14="http://schemas.microsoft.com/office/drawing/2010/main" w="9525">
                   <a:solidFill>
                     <a:srgbClr val="000000"/>
                   </a:solidFill>
@@ -541,7 +541,7 @@
             </a:ln>
             <a:extLst>
               <a:ext uri="{91240B29-F687-4f45-9708-019B960494DF}">
-                <a14:hiddenLine xmlns:a14="http://schemas.microsoft.com/office/drawing/2010/main" xmlns="" w="9525">
+                <a14:hiddenLine xmlns="" xmlns:a14="http://schemas.microsoft.com/office/drawing/2010/main" w="9525">
                   <a:solidFill>
                     <a:srgbClr val="000000"/>
                   </a:solidFill>
@@ -603,7 +603,7 @@
             </a:ln>
             <a:extLst>
               <a:ext uri="{91240B29-F687-4f45-9708-019B960494DF}">
-                <a14:hiddenLine xmlns:a14="http://schemas.microsoft.com/office/drawing/2010/main" xmlns="" w="9525">
+                <a14:hiddenLine xmlns="" xmlns:a14="http://schemas.microsoft.com/office/drawing/2010/main" w="9525">
                   <a:solidFill>
                     <a:srgbClr val="000000"/>
                   </a:solidFill>
@@ -665,7 +665,7 @@
             </a:ln>
             <a:extLst>
               <a:ext uri="{91240B29-F687-4f45-9708-019B960494DF}">
-                <a14:hiddenLine xmlns:a14="http://schemas.microsoft.com/office/drawing/2010/main" xmlns="" w="9525">
+                <a14:hiddenLine xmlns="" xmlns:a14="http://schemas.microsoft.com/office/drawing/2010/main" w="9525">
                   <a:solidFill>
                     <a:srgbClr val="000000"/>
                   </a:solidFill>
@@ -755,7 +755,7 @@
             </a:ln>
             <a:extLst>
               <a:ext uri="{91240B29-F687-4f45-9708-019B960494DF}">
-                <a14:hiddenLine xmlns:a14="http://schemas.microsoft.com/office/drawing/2010/main" xmlns="" w="9525">
+                <a14:hiddenLine xmlns="" xmlns:a14="http://schemas.microsoft.com/office/drawing/2010/main" w="9525">
                   <a:solidFill>
                     <a:srgbClr val="000000"/>
                   </a:solidFill>
@@ -817,7 +817,7 @@
             </a:ln>
             <a:extLst>
               <a:ext uri="{91240B29-F687-4f45-9708-019B960494DF}">
-                <a14:hiddenLine xmlns:a14="http://schemas.microsoft.com/office/drawing/2010/main" xmlns="" w="9525">
+                <a14:hiddenLine xmlns="" xmlns:a14="http://schemas.microsoft.com/office/drawing/2010/main" w="9525">
                   <a:solidFill>
                     <a:srgbClr val="000000"/>
                   </a:solidFill>
@@ -879,7 +879,7 @@
             </a:ln>
             <a:extLst>
               <a:ext uri="{91240B29-F687-4f45-9708-019B960494DF}">
-                <a14:hiddenLine xmlns:a14="http://schemas.microsoft.com/office/drawing/2010/main" xmlns="" w="9525">
+                <a14:hiddenLine xmlns="" xmlns:a14="http://schemas.microsoft.com/office/drawing/2010/main" w="9525">
                   <a:solidFill>
                     <a:srgbClr val="000000"/>
                   </a:solidFill>
@@ -969,7 +969,7 @@
             </a:ln>
             <a:extLst>
               <a:ext uri="{91240B29-F687-4f45-9708-019B960494DF}">
-                <a14:hiddenLine xmlns:a14="http://schemas.microsoft.com/office/drawing/2010/main" xmlns="" w="9525">
+                <a14:hiddenLine xmlns="" xmlns:a14="http://schemas.microsoft.com/office/drawing/2010/main" w="9525">
                   <a:solidFill>
                     <a:srgbClr val="000000"/>
                   </a:solidFill>
@@ -1059,7 +1059,7 @@
             </a:ln>
             <a:extLst>
               <a:ext uri="{91240B29-F687-4f45-9708-019B960494DF}">
-                <a14:hiddenLine xmlns:a14="http://schemas.microsoft.com/office/drawing/2010/main" xmlns="" w="9525">
+                <a14:hiddenLine xmlns="" xmlns:a14="http://schemas.microsoft.com/office/drawing/2010/main" w="9525">
                   <a:solidFill>
                     <a:srgbClr val="000000"/>
                   </a:solidFill>
@@ -1121,7 +1121,7 @@
             </a:ln>
             <a:extLst>
               <a:ext uri="{91240B29-F687-4f45-9708-019B960494DF}">
-                <a14:hiddenLine xmlns:a14="http://schemas.microsoft.com/office/drawing/2010/main" xmlns="" w="9525">
+                <a14:hiddenLine xmlns="" xmlns:a14="http://schemas.microsoft.com/office/drawing/2010/main" w="9525">
                   <a:solidFill>
                     <a:srgbClr val="000000"/>
                   </a:solidFill>
@@ -1231,7 +1231,7 @@
             </a:ln>
             <a:extLst>
               <a:ext uri="{91240B29-F687-4f45-9708-019B960494DF}">
-                <a14:hiddenLine xmlns:a14="http://schemas.microsoft.com/office/drawing/2010/main" xmlns="" w="9525">
+                <a14:hiddenLine xmlns="" xmlns:a14="http://schemas.microsoft.com/office/drawing/2010/main" w="9525">
                   <a:solidFill>
                     <a:srgbClr val="000000"/>
                   </a:solidFill>
@@ -1293,7 +1293,7 @@
             </a:ln>
             <a:extLst>
               <a:ext uri="{91240B29-F687-4f45-9708-019B960494DF}">
-                <a14:hiddenLine xmlns:a14="http://schemas.microsoft.com/office/drawing/2010/main" xmlns="" w="9525">
+                <a14:hiddenLine xmlns="" xmlns:a14="http://schemas.microsoft.com/office/drawing/2010/main" w="9525">
                   <a:solidFill>
                     <a:srgbClr val="000000"/>
                   </a:solidFill>
@@ -1383,7 +1383,7 @@
             </a:ln>
             <a:extLst>
               <a:ext uri="{91240B29-F687-4f45-9708-019B960494DF}">
-                <a14:hiddenLine xmlns:a14="http://schemas.microsoft.com/office/drawing/2010/main" xmlns="" w="9525">
+                <a14:hiddenLine xmlns="" xmlns:a14="http://schemas.microsoft.com/office/drawing/2010/main" w="9525">
                   <a:solidFill>
                     <a:srgbClr val="000000"/>
                   </a:solidFill>
@@ -1473,7 +1473,7 @@
             </a:ln>
             <a:extLst>
               <a:ext uri="{91240B29-F687-4f45-9708-019B960494DF}">
-                <a14:hiddenLine xmlns:a14="http://schemas.microsoft.com/office/drawing/2010/main" xmlns="" w="9525">
+                <a14:hiddenLine xmlns="" xmlns:a14="http://schemas.microsoft.com/office/drawing/2010/main" w="9525">
                   <a:solidFill>
                     <a:srgbClr val="000000"/>
                   </a:solidFill>
@@ -1535,7 +1535,7 @@
             </a:ln>
             <a:extLst>
               <a:ext uri="{91240B29-F687-4f45-9708-019B960494DF}">
-                <a14:hiddenLine xmlns:a14="http://schemas.microsoft.com/office/drawing/2010/main" xmlns="" w="9525">
+                <a14:hiddenLine xmlns="" xmlns:a14="http://schemas.microsoft.com/office/drawing/2010/main" w="9525">
                   <a:solidFill>
                     <a:srgbClr val="000000"/>
                   </a:solidFill>
@@ -1625,7 +1625,7 @@
             </a:ln>
             <a:extLst>
               <a:ext uri="{91240B29-F687-4f45-9708-019B960494DF}">
-                <a14:hiddenLine xmlns:a14="http://schemas.microsoft.com/office/drawing/2010/main" xmlns="" w="9525">
+                <a14:hiddenLine xmlns="" xmlns:a14="http://schemas.microsoft.com/office/drawing/2010/main" w="9525">
                   <a:solidFill>
                     <a:srgbClr val="000000"/>
                   </a:solidFill>
@@ -1715,7 +1715,7 @@
             </a:ln>
             <a:extLst>
               <a:ext uri="{91240B29-F687-4f45-9708-019B960494DF}">
-                <a14:hiddenLine xmlns:a14="http://schemas.microsoft.com/office/drawing/2010/main" xmlns="" w="9525">
+                <a14:hiddenLine xmlns="" xmlns:a14="http://schemas.microsoft.com/office/drawing/2010/main" w="9525">
                   <a:solidFill>
                     <a:srgbClr val="000000"/>
                   </a:solidFill>
@@ -1771,7 +1771,7 @@
             </a:ln>
             <a:extLst>
               <a:ext uri="{91240B29-F687-4f45-9708-019B960494DF}">
-                <a14:hiddenLine xmlns:a14="http://schemas.microsoft.com/office/drawing/2010/main" xmlns="" w="9525">
+                <a14:hiddenLine xmlns="" xmlns:a14="http://schemas.microsoft.com/office/drawing/2010/main" w="9525">
                   <a:solidFill>
                     <a:srgbClr val="000000"/>
                   </a:solidFill>
@@ -1861,7 +1861,7 @@
             </a:ln>
             <a:extLst>
               <a:ext uri="{91240B29-F687-4f45-9708-019B960494DF}">
-                <a14:hiddenLine xmlns:a14="http://schemas.microsoft.com/office/drawing/2010/main" xmlns="" w="9525">
+                <a14:hiddenLine xmlns="" xmlns:a14="http://schemas.microsoft.com/office/drawing/2010/main" w="9525">
                   <a:solidFill>
                     <a:srgbClr val="000000"/>
                   </a:solidFill>
@@ -1917,7 +1917,7 @@
             </a:ln>
             <a:extLst>
               <a:ext uri="{91240B29-F687-4f45-9708-019B960494DF}">
-                <a14:hiddenLine xmlns:a14="http://schemas.microsoft.com/office/drawing/2010/main" xmlns="" w="9525">
+                <a14:hiddenLine xmlns="" xmlns:a14="http://schemas.microsoft.com/office/drawing/2010/main" w="9525">
                   <a:solidFill>
                     <a:srgbClr val="000000"/>
                   </a:solidFill>
@@ -2007,7 +2007,7 @@
             </a:ln>
             <a:extLst>
               <a:ext uri="{91240B29-F687-4f45-9708-019B960494DF}">
-                <a14:hiddenLine xmlns:a14="http://schemas.microsoft.com/office/drawing/2010/main" xmlns="" w="9525">
+                <a14:hiddenLine xmlns="" xmlns:a14="http://schemas.microsoft.com/office/drawing/2010/main" w="9525">
                   <a:solidFill>
                     <a:srgbClr val="000000"/>
                   </a:solidFill>
@@ -2075,7 +2075,7 @@
             </a:ln>
             <a:extLst>
               <a:ext uri="{91240B29-F687-4f45-9708-019B960494DF}">
-                <a14:hiddenLine xmlns:a14="http://schemas.microsoft.com/office/drawing/2010/main" xmlns="" w="9525">
+                <a14:hiddenLine xmlns="" xmlns:a14="http://schemas.microsoft.com/office/drawing/2010/main" w="9525">
                   <a:solidFill>
                     <a:srgbClr val="000000"/>
                   </a:solidFill>
@@ -2165,7 +2165,7 @@
             </a:ln>
             <a:extLst>
               <a:ext uri="{91240B29-F687-4f45-9708-019B960494DF}">
-                <a14:hiddenLine xmlns:a14="http://schemas.microsoft.com/office/drawing/2010/main" xmlns="" w="9525">
+                <a14:hiddenLine xmlns="" xmlns:a14="http://schemas.microsoft.com/office/drawing/2010/main" w="9525">
                   <a:solidFill>
                     <a:srgbClr val="000000"/>
                   </a:solidFill>
@@ -2233,7 +2233,7 @@
             </a:ln>
             <a:extLst>
               <a:ext uri="{91240B29-F687-4f45-9708-019B960494DF}">
-                <a14:hiddenLine xmlns:a14="http://schemas.microsoft.com/office/drawing/2010/main" xmlns="" w="9525">
+                <a14:hiddenLine xmlns="" xmlns:a14="http://schemas.microsoft.com/office/drawing/2010/main" w="9525">
                   <a:solidFill>
                     <a:srgbClr val="000000"/>
                   </a:solidFill>
@@ -2323,7 +2323,7 @@
             </a:ln>
             <a:extLst>
               <a:ext uri="{91240B29-F687-4f45-9708-019B960494DF}">
-                <a14:hiddenLine xmlns:a14="http://schemas.microsoft.com/office/drawing/2010/main" xmlns="" w="9525">
+                <a14:hiddenLine xmlns="" xmlns:a14="http://schemas.microsoft.com/office/drawing/2010/main" w="9525">
                   <a:solidFill>
                     <a:srgbClr val="000000"/>
                   </a:solidFill>
@@ -2357,7 +2357,7 @@
             </a:ln>
             <a:extLst>
               <a:ext uri="{91240B29-F687-4f45-9708-019B960494DF}">
-                <a14:hiddenLine xmlns:a14="http://schemas.microsoft.com/office/drawing/2010/main" xmlns="" w="9525">
+                <a14:hiddenLine xmlns="" xmlns:a14="http://schemas.microsoft.com/office/drawing/2010/main" w="9525">
                   <a:solidFill>
                     <a:srgbClr val="000000"/>
                   </a:solidFill>
@@ -2447,7 +2447,7 @@
             </a:ln>
             <a:extLst>
               <a:ext uri="{91240B29-F687-4f45-9708-019B960494DF}">
-                <a14:hiddenLine xmlns:a14="http://schemas.microsoft.com/office/drawing/2010/main" xmlns="" w="9525">
+                <a14:hiddenLine xmlns="" xmlns:a14="http://schemas.microsoft.com/office/drawing/2010/main" w="9525">
                   <a:solidFill>
                     <a:srgbClr val="000000"/>
                   </a:solidFill>
@@ -2509,7 +2509,7 @@
             </a:ln>
             <a:extLst>
               <a:ext uri="{91240B29-F687-4f45-9708-019B960494DF}">
-                <a14:hiddenLine xmlns:a14="http://schemas.microsoft.com/office/drawing/2010/main" xmlns="" w="9525">
+                <a14:hiddenLine xmlns="" xmlns:a14="http://schemas.microsoft.com/office/drawing/2010/main" w="9525">
                   <a:solidFill>
                     <a:srgbClr val="000000"/>
                   </a:solidFill>
@@ -2571,7 +2571,7 @@
             </a:ln>
             <a:extLst>
               <a:ext uri="{91240B29-F687-4f45-9708-019B960494DF}">
-                <a14:hiddenLine xmlns:a14="http://schemas.microsoft.com/office/drawing/2010/main" xmlns="" w="9525">
+                <a14:hiddenLine xmlns="" xmlns:a14="http://schemas.microsoft.com/office/drawing/2010/main" w="9525">
                   <a:solidFill>
                     <a:srgbClr val="000000"/>
                   </a:solidFill>
@@ -2661,7 +2661,7 @@
             </a:ln>
             <a:extLst>
               <a:ext uri="{91240B29-F687-4f45-9708-019B960494DF}">
-                <a14:hiddenLine xmlns:a14="http://schemas.microsoft.com/office/drawing/2010/main" xmlns="" w="9525">
+                <a14:hiddenLine xmlns="" xmlns:a14="http://schemas.microsoft.com/office/drawing/2010/main" w="9525">
                   <a:solidFill>
                     <a:srgbClr val="000000"/>
                   </a:solidFill>
@@ -2729,7 +2729,7 @@
             </a:ln>
             <a:extLst>
               <a:ext uri="{91240B29-F687-4f45-9708-019B960494DF}">
-                <a14:hiddenLine xmlns:a14="http://schemas.microsoft.com/office/drawing/2010/main" xmlns="" w="9525">
+                <a14:hiddenLine xmlns="" xmlns:a14="http://schemas.microsoft.com/office/drawing/2010/main" w="9525">
                   <a:solidFill>
                     <a:srgbClr val="000000"/>
                   </a:solidFill>
@@ -2791,7 +2791,7 @@
             </a:ln>
             <a:extLst>
               <a:ext uri="{91240B29-F687-4f45-9708-019B960494DF}">
-                <a14:hiddenLine xmlns:a14="http://schemas.microsoft.com/office/drawing/2010/main" xmlns="" w="9525">
+                <a14:hiddenLine xmlns="" xmlns:a14="http://schemas.microsoft.com/office/drawing/2010/main" w="9525">
                   <a:solidFill>
                     <a:srgbClr val="000000"/>
                   </a:solidFill>
@@ -2881,7 +2881,7 @@
             </a:ln>
             <a:extLst>
               <a:ext uri="{91240B29-F687-4f45-9708-019B960494DF}">
-                <a14:hiddenLine xmlns:a14="http://schemas.microsoft.com/office/drawing/2010/main" xmlns="" w="9525">
+                <a14:hiddenLine xmlns="" xmlns:a14="http://schemas.microsoft.com/office/drawing/2010/main" w="9525">
                   <a:solidFill>
                     <a:srgbClr val="000000"/>
                   </a:solidFill>
@@ -2943,7 +2943,7 @@
             </a:ln>
             <a:extLst>
               <a:ext uri="{91240B29-F687-4f45-9708-019B960494DF}">
-                <a14:hiddenLine xmlns:a14="http://schemas.microsoft.com/office/drawing/2010/main" xmlns="" w="9525">
+                <a14:hiddenLine xmlns="" xmlns:a14="http://schemas.microsoft.com/office/drawing/2010/main" w="9525">
                   <a:solidFill>
                     <a:srgbClr val="000000"/>
                   </a:solidFill>
@@ -3033,7 +3033,7 @@
             </a:ln>
             <a:extLst>
               <a:ext uri="{91240B29-F687-4f45-9708-019B960494DF}">
-                <a14:hiddenLine xmlns:a14="http://schemas.microsoft.com/office/drawing/2010/main" xmlns="" w="9525">
+                <a14:hiddenLine xmlns="" xmlns:a14="http://schemas.microsoft.com/office/drawing/2010/main" w="9525">
                   <a:solidFill>
                     <a:srgbClr val="000000"/>
                   </a:solidFill>
@@ -3095,7 +3095,7 @@
             </a:ln>
             <a:extLst>
               <a:ext uri="{91240B29-F687-4f45-9708-019B960494DF}">
-                <a14:hiddenLine xmlns:a14="http://schemas.microsoft.com/office/drawing/2010/main" xmlns="" w="9525">
+                <a14:hiddenLine xmlns="" xmlns:a14="http://schemas.microsoft.com/office/drawing/2010/main" w="9525">
                   <a:solidFill>
                     <a:srgbClr val="000000"/>
                   </a:solidFill>
@@ -3185,7 +3185,7 @@
             </a:ln>
             <a:extLst>
               <a:ext uri="{91240B29-F687-4f45-9708-019B960494DF}">
-                <a14:hiddenLine xmlns:a14="http://schemas.microsoft.com/office/drawing/2010/main" xmlns="" w="9525">
+                <a14:hiddenLine xmlns="" xmlns:a14="http://schemas.microsoft.com/office/drawing/2010/main" w="9525">
                   <a:solidFill>
                     <a:srgbClr val="000000"/>
                   </a:solidFill>
@@ -3219,7 +3219,7 @@
             </a:ln>
             <a:extLst>
               <a:ext uri="{91240B29-F687-4f45-9708-019B960494DF}">
-                <a14:hiddenLine xmlns:a14="http://schemas.microsoft.com/office/drawing/2010/main" xmlns="" w="9525">
+                <a14:hiddenLine xmlns="" xmlns:a14="http://schemas.microsoft.com/office/drawing/2010/main" w="9525">
                   <a:solidFill>
                     <a:srgbClr val="000000"/>
                   </a:solidFill>
@@ -3284,7 +3284,7 @@
             </a:ln>
             <a:extLst>
               <a:ext uri="{91240B29-F687-4f45-9708-019B960494DF}">
-                <a14:hiddenLine xmlns:a14="http://schemas.microsoft.com/office/drawing/2010/main" xmlns="" w="9525">
+                <a14:hiddenLine xmlns="" xmlns:a14="http://schemas.microsoft.com/office/drawing/2010/main" w="9525">
                   <a:solidFill>
                     <a:srgbClr val="000000"/>
                   </a:solidFill>
@@ -3374,7 +3374,7 @@
             </a:ln>
             <a:extLst>
               <a:ext uri="{91240B29-F687-4f45-9708-019B960494DF}">
-                <a14:hiddenLine xmlns:a14="http://schemas.microsoft.com/office/drawing/2010/main" xmlns="" w="9525">
+                <a14:hiddenLine xmlns="" xmlns:a14="http://schemas.microsoft.com/office/drawing/2010/main" w="9525">
                   <a:solidFill>
                     <a:srgbClr val="000000"/>
                   </a:solidFill>
@@ -3436,7 +3436,7 @@
             </a:ln>
             <a:extLst>
               <a:ext uri="{91240B29-F687-4f45-9708-019B960494DF}">
-                <a14:hiddenLine xmlns:a14="http://schemas.microsoft.com/office/drawing/2010/main" xmlns="" w="9525">
+                <a14:hiddenLine xmlns="" xmlns:a14="http://schemas.microsoft.com/office/drawing/2010/main" w="9525">
                   <a:solidFill>
                     <a:srgbClr val="000000"/>
                   </a:solidFill>
@@ -3526,7 +3526,7 @@
             </a:ln>
             <a:extLst>
               <a:ext uri="{91240B29-F687-4f45-9708-019B960494DF}">
-                <a14:hiddenLine xmlns:a14="http://schemas.microsoft.com/office/drawing/2010/main" xmlns="" w="9525">
+                <a14:hiddenLine xmlns="" xmlns:a14="http://schemas.microsoft.com/office/drawing/2010/main" w="9525">
                   <a:solidFill>
                     <a:srgbClr val="000000"/>
                   </a:solidFill>
@@ -3616,7 +3616,7 @@
             </a:ln>
             <a:extLst>
               <a:ext uri="{91240B29-F687-4f45-9708-019B960494DF}">
-                <a14:hiddenLine xmlns:a14="http://schemas.microsoft.com/office/drawing/2010/main" xmlns="" w="9525">
+                <a14:hiddenLine xmlns="" xmlns:a14="http://schemas.microsoft.com/office/drawing/2010/main" w="9525">
                   <a:solidFill>
                     <a:srgbClr val="000000"/>
                   </a:solidFill>
@@ -3681,7 +3681,7 @@
             </a:ln>
             <a:extLst>
               <a:ext uri="{91240B29-F687-4f45-9708-019B960494DF}">
-                <a14:hiddenLine xmlns:a14="http://schemas.microsoft.com/office/drawing/2010/main" xmlns="" w="9525">
+                <a14:hiddenLine xmlns="" xmlns:a14="http://schemas.microsoft.com/office/drawing/2010/main" w="9525">
                   <a:solidFill>
                     <a:srgbClr val="000000"/>
                   </a:solidFill>
@@ -3743,7 +3743,7 @@
             </a:ln>
             <a:extLst>
               <a:ext uri="{91240B29-F687-4f45-9708-019B960494DF}">
-                <a14:hiddenLine xmlns:a14="http://schemas.microsoft.com/office/drawing/2010/main" xmlns="" w="9525">
+                <a14:hiddenLine xmlns="" xmlns:a14="http://schemas.microsoft.com/office/drawing/2010/main" w="9525">
                   <a:solidFill>
                     <a:srgbClr val="000000"/>
                   </a:solidFill>
@@ -3833,7 +3833,7 @@
             </a:ln>
             <a:extLst>
               <a:ext uri="{91240B29-F687-4f45-9708-019B960494DF}">
-                <a14:hiddenLine xmlns:a14="http://schemas.microsoft.com/office/drawing/2010/main" xmlns="" w="9525">
+                <a14:hiddenLine xmlns="" xmlns:a14="http://schemas.microsoft.com/office/drawing/2010/main" w="9525">
                   <a:solidFill>
                     <a:srgbClr val="000000"/>
                   </a:solidFill>
@@ -3923,7 +3923,7 @@
             </a:ln>
             <a:extLst>
               <a:ext uri="{91240B29-F687-4f45-9708-019B960494DF}">
-                <a14:hiddenLine xmlns:a14="http://schemas.microsoft.com/office/drawing/2010/main" xmlns="" w="9525">
+                <a14:hiddenLine xmlns="" xmlns:a14="http://schemas.microsoft.com/office/drawing/2010/main" w="9525">
                   <a:solidFill>
                     <a:srgbClr val="000000"/>
                   </a:solidFill>
@@ -3985,7 +3985,7 @@
             </a:ln>
             <a:extLst>
               <a:ext uri="{91240B29-F687-4f45-9708-019B960494DF}">
-                <a14:hiddenLine xmlns:a14="http://schemas.microsoft.com/office/drawing/2010/main" xmlns="" w="9525">
+                <a14:hiddenLine xmlns="" xmlns:a14="http://schemas.microsoft.com/office/drawing/2010/main" w="9525">
                   <a:solidFill>
                     <a:srgbClr val="000000"/>
                   </a:solidFill>
@@ -4105,7 +4105,7 @@
             </a:ln>
             <a:extLst>
               <a:ext uri="{91240B29-F687-4f45-9708-019B960494DF}">
-                <a14:hiddenLine xmlns:a14="http://schemas.microsoft.com/office/drawing/2010/main" xmlns="" w="9525">
+                <a14:hiddenLine xmlns="" xmlns:a14="http://schemas.microsoft.com/office/drawing/2010/main" w="9525">
                   <a:solidFill>
                     <a:srgbClr val="000000"/>
                   </a:solidFill>
@@ -4173,7 +4173,7 @@
             </a:ln>
             <a:extLst>
               <a:ext uri="{91240B29-F687-4f45-9708-019B960494DF}">
-                <a14:hiddenLine xmlns:a14="http://schemas.microsoft.com/office/drawing/2010/main" xmlns="" w="9525">
+                <a14:hiddenLine xmlns="" xmlns:a14="http://schemas.microsoft.com/office/drawing/2010/main" w="9525">
                   <a:solidFill>
                     <a:srgbClr val="000000"/>
                   </a:solidFill>
@@ -4263,7 +4263,7 @@
             </a:ln>
             <a:extLst>
               <a:ext uri="{91240B29-F687-4f45-9708-019B960494DF}">
-                <a14:hiddenLine xmlns:a14="http://schemas.microsoft.com/office/drawing/2010/main" xmlns="" w="9525">
+                <a14:hiddenLine xmlns="" xmlns:a14="http://schemas.microsoft.com/office/drawing/2010/main" w="9525">
                   <a:solidFill>
                     <a:srgbClr val="000000"/>
                   </a:solidFill>
@@ -8985,7 +8985,7 @@
           <a:noFill/>
           <a:extLst>
             <a:ext uri="{909E8E84-426E-40dd-AFC4-6F175D3DCCD1}">
-              <a14:hiddenFill xmlns:a14="http://schemas.microsoft.com/office/drawing/2010/main" xmlns="">
+              <a14:hiddenFill xmlns="" xmlns:a14="http://schemas.microsoft.com/office/drawing/2010/main">
                 <a:solidFill>
                   <a:srgbClr val="FFFFFF"/>
                 </a:solidFill>
@@ -9059,7 +9059,7 @@
               </a:ln>
               <a:extLst>
                 <a:ext uri="{91240B29-F687-4f45-9708-019B960494DF}">
-                  <a14:hiddenLine xmlns:a14="http://schemas.microsoft.com/office/drawing/2010/main" xmlns="" w="9525">
+                  <a14:hiddenLine xmlns="" xmlns:a14="http://schemas.microsoft.com/office/drawing/2010/main" w="9525">
                     <a:solidFill>
                       <a:srgbClr val="000000"/>
                     </a:solidFill>
@@ -9149,7 +9149,7 @@
               </a:ln>
               <a:extLst>
                 <a:ext uri="{91240B29-F687-4f45-9708-019B960494DF}">
-                  <a14:hiddenLine xmlns:a14="http://schemas.microsoft.com/office/drawing/2010/main" xmlns="" w="9525">
+                  <a14:hiddenLine xmlns="" xmlns:a14="http://schemas.microsoft.com/office/drawing/2010/main" w="9525">
                     <a:solidFill>
                       <a:srgbClr val="000000"/>
                     </a:solidFill>
@@ -9239,7 +9239,7 @@
               </a:ln>
               <a:extLst>
                 <a:ext uri="{91240B29-F687-4f45-9708-019B960494DF}">
-                  <a14:hiddenLine xmlns:a14="http://schemas.microsoft.com/office/drawing/2010/main" xmlns="" w="9525">
+                  <a14:hiddenLine xmlns="" xmlns:a14="http://schemas.microsoft.com/office/drawing/2010/main" w="9525">
                     <a:solidFill>
                       <a:srgbClr val="000000"/>
                     </a:solidFill>
@@ -9301,7 +9301,7 @@
               </a:ln>
               <a:extLst>
                 <a:ext uri="{91240B29-F687-4f45-9708-019B960494DF}">
-                  <a14:hiddenLine xmlns:a14="http://schemas.microsoft.com/office/drawing/2010/main" xmlns="" w="9525">
+                  <a14:hiddenLine xmlns="" xmlns:a14="http://schemas.microsoft.com/office/drawing/2010/main" w="9525">
                     <a:solidFill>
                       <a:srgbClr val="000000"/>
                     </a:solidFill>
@@ -9391,7 +9391,7 @@
               </a:ln>
               <a:extLst>
                 <a:ext uri="{91240B29-F687-4f45-9708-019B960494DF}">
-                  <a14:hiddenLine xmlns:a14="http://schemas.microsoft.com/office/drawing/2010/main" xmlns="" w="9525">
+                  <a14:hiddenLine xmlns="" xmlns:a14="http://schemas.microsoft.com/office/drawing/2010/main" w="9525">
                     <a:solidFill>
                       <a:srgbClr val="000000"/>
                     </a:solidFill>
@@ -9453,7 +9453,7 @@
               </a:ln>
               <a:extLst>
                 <a:ext uri="{91240B29-F687-4f45-9708-019B960494DF}">
-                  <a14:hiddenLine xmlns:a14="http://schemas.microsoft.com/office/drawing/2010/main" xmlns="" w="9525">
+                  <a14:hiddenLine xmlns="" xmlns:a14="http://schemas.microsoft.com/office/drawing/2010/main" w="9525">
                     <a:solidFill>
                       <a:srgbClr val="000000"/>
                     </a:solidFill>
@@ -9515,7 +9515,7 @@
               </a:ln>
               <a:extLst>
                 <a:ext uri="{91240B29-F687-4f45-9708-019B960494DF}">
-                  <a14:hiddenLine xmlns:a14="http://schemas.microsoft.com/office/drawing/2010/main" xmlns="" w="9525">
+                  <a14:hiddenLine xmlns="" xmlns:a14="http://schemas.microsoft.com/office/drawing/2010/main" w="9525">
                     <a:solidFill>
                       <a:srgbClr val="000000"/>
                     </a:solidFill>
@@ -9605,7 +9605,7 @@
               </a:ln>
               <a:extLst>
                 <a:ext uri="{91240B29-F687-4f45-9708-019B960494DF}">
-                  <a14:hiddenLine xmlns:a14="http://schemas.microsoft.com/office/drawing/2010/main" xmlns="" w="9525">
+                  <a14:hiddenLine xmlns="" xmlns:a14="http://schemas.microsoft.com/office/drawing/2010/main" w="9525">
                     <a:solidFill>
                       <a:srgbClr val="000000"/>
                     </a:solidFill>
@@ -9695,7 +9695,7 @@
               </a:ln>
               <a:extLst>
                 <a:ext uri="{91240B29-F687-4f45-9708-019B960494DF}">
-                  <a14:hiddenLine xmlns:a14="http://schemas.microsoft.com/office/drawing/2010/main" xmlns="" w="9525">
+                  <a14:hiddenLine xmlns="" xmlns:a14="http://schemas.microsoft.com/office/drawing/2010/main" w="9525">
                     <a:solidFill>
                       <a:srgbClr val="000000"/>
                     </a:solidFill>
@@ -9757,7 +9757,7 @@
               </a:ln>
               <a:extLst>
                 <a:ext uri="{91240B29-F687-4f45-9708-019B960494DF}">
-                  <a14:hiddenLine xmlns:a14="http://schemas.microsoft.com/office/drawing/2010/main" xmlns="" w="9525">
+                  <a14:hiddenLine xmlns="" xmlns:a14="http://schemas.microsoft.com/office/drawing/2010/main" w="9525">
                     <a:solidFill>
                       <a:srgbClr val="000000"/>
                     </a:solidFill>
@@ -9867,7 +9867,7 @@
               </a:ln>
               <a:extLst>
                 <a:ext uri="{91240B29-F687-4f45-9708-019B960494DF}">
-                  <a14:hiddenLine xmlns:a14="http://schemas.microsoft.com/office/drawing/2010/main" xmlns="" w="9525">
+                  <a14:hiddenLine xmlns="" xmlns:a14="http://schemas.microsoft.com/office/drawing/2010/main" w="9525">
                     <a:solidFill>
                       <a:srgbClr val="000000"/>
                     </a:solidFill>
@@ -9951,7 +9951,7 @@
               </a:ln>
               <a:extLst>
                 <a:ext uri="{91240B29-F687-4f45-9708-019B960494DF}">
-                  <a14:hiddenLine xmlns:a14="http://schemas.microsoft.com/office/drawing/2010/main" xmlns="" w="9525">
+                  <a14:hiddenLine xmlns="" xmlns:a14="http://schemas.microsoft.com/office/drawing/2010/main" w="9525">
                     <a:solidFill>
                       <a:srgbClr val="000000"/>
                     </a:solidFill>
@@ -10013,7 +10013,7 @@
               </a:ln>
               <a:extLst>
                 <a:ext uri="{91240B29-F687-4f45-9708-019B960494DF}">
-                  <a14:hiddenLine xmlns:a14="http://schemas.microsoft.com/office/drawing/2010/main" xmlns="" w="9525">
+                  <a14:hiddenLine xmlns="" xmlns:a14="http://schemas.microsoft.com/office/drawing/2010/main" w="9525">
                     <a:solidFill>
                       <a:srgbClr val="000000"/>
                     </a:solidFill>
@@ -10075,7 +10075,7 @@
               </a:ln>
               <a:extLst>
                 <a:ext uri="{91240B29-F687-4f45-9708-019B960494DF}">
-                  <a14:hiddenLine xmlns:a14="http://schemas.microsoft.com/office/drawing/2010/main" xmlns="" w="9525">
+                  <a14:hiddenLine xmlns="" xmlns:a14="http://schemas.microsoft.com/office/drawing/2010/main" w="9525">
                     <a:solidFill>
                       <a:srgbClr val="000000"/>
                     </a:solidFill>
@@ -10165,7 +10165,7 @@
               </a:ln>
               <a:extLst>
                 <a:ext uri="{91240B29-F687-4f45-9708-019B960494DF}">
-                  <a14:hiddenLine xmlns:a14="http://schemas.microsoft.com/office/drawing/2010/main" xmlns="" w="9525">
+                  <a14:hiddenLine xmlns="" xmlns:a14="http://schemas.microsoft.com/office/drawing/2010/main" w="9525">
                     <a:solidFill>
                       <a:srgbClr val="000000"/>
                     </a:solidFill>
@@ -10199,7 +10199,7 @@
               </a:ln>
               <a:extLst>
                 <a:ext uri="{91240B29-F687-4f45-9708-019B960494DF}">
-                  <a14:hiddenLine xmlns:a14="http://schemas.microsoft.com/office/drawing/2010/main" xmlns="" w="9525">
+                  <a14:hiddenLine xmlns="" xmlns:a14="http://schemas.microsoft.com/office/drawing/2010/main" w="9525">
                     <a:solidFill>
                       <a:srgbClr val="000000"/>
                     </a:solidFill>
@@ -10264,7 +10264,7 @@
               </a:ln>
               <a:extLst>
                 <a:ext uri="{91240B29-F687-4f45-9708-019B960494DF}">
-                  <a14:hiddenLine xmlns:a14="http://schemas.microsoft.com/office/drawing/2010/main" xmlns="" w="9525">
+                  <a14:hiddenLine xmlns="" xmlns:a14="http://schemas.microsoft.com/office/drawing/2010/main" w="9525">
                     <a:solidFill>
                       <a:srgbClr val="000000"/>
                     </a:solidFill>
@@ -10354,7 +10354,7 @@
               </a:ln>
               <a:extLst>
                 <a:ext uri="{91240B29-F687-4f45-9708-019B960494DF}">
-                  <a14:hiddenLine xmlns:a14="http://schemas.microsoft.com/office/drawing/2010/main" xmlns="" w="9525">
+                  <a14:hiddenLine xmlns="" xmlns:a14="http://schemas.microsoft.com/office/drawing/2010/main" w="9525">
                     <a:solidFill>
                       <a:srgbClr val="000000"/>
                     </a:solidFill>
@@ -10416,7 +10416,7 @@
               </a:ln>
               <a:extLst>
                 <a:ext uri="{91240B29-F687-4f45-9708-019B960494DF}">
-                  <a14:hiddenLine xmlns:a14="http://schemas.microsoft.com/office/drawing/2010/main" xmlns="" w="9525">
+                  <a14:hiddenLine xmlns="" xmlns:a14="http://schemas.microsoft.com/office/drawing/2010/main" w="9525">
                     <a:solidFill>
                       <a:srgbClr val="000000"/>
                     </a:solidFill>
@@ -10506,7 +10506,7 @@
               </a:ln>
               <a:extLst>
                 <a:ext uri="{91240B29-F687-4f45-9708-019B960494DF}">
-                  <a14:hiddenLine xmlns:a14="http://schemas.microsoft.com/office/drawing/2010/main" xmlns="" w="9525">
+                  <a14:hiddenLine xmlns="" xmlns:a14="http://schemas.microsoft.com/office/drawing/2010/main" w="9525">
                     <a:solidFill>
                       <a:srgbClr val="000000"/>
                     </a:solidFill>
@@ -10571,7 +10571,7 @@
               </a:ln>
               <a:extLst>
                 <a:ext uri="{91240B29-F687-4f45-9708-019B960494DF}">
-                  <a14:hiddenLine xmlns:a14="http://schemas.microsoft.com/office/drawing/2010/main" xmlns="" w="9525">
+                  <a14:hiddenLine xmlns="" xmlns:a14="http://schemas.microsoft.com/office/drawing/2010/main" w="9525">
                     <a:solidFill>
                       <a:srgbClr val="000000"/>
                     </a:solidFill>
@@ -10633,7 +10633,7 @@
               </a:ln>
               <a:extLst>
                 <a:ext uri="{91240B29-F687-4f45-9708-019B960494DF}">
-                  <a14:hiddenLine xmlns:a14="http://schemas.microsoft.com/office/drawing/2010/main" xmlns="" w="9525">
+                  <a14:hiddenLine xmlns="" xmlns:a14="http://schemas.microsoft.com/office/drawing/2010/main" w="9525">
                     <a:solidFill>
                       <a:srgbClr val="000000"/>
                     </a:solidFill>
@@ -10723,7 +10723,7 @@
               </a:ln>
               <a:extLst>
                 <a:ext uri="{91240B29-F687-4f45-9708-019B960494DF}">
-                  <a14:hiddenLine xmlns:a14="http://schemas.microsoft.com/office/drawing/2010/main" xmlns="" w="9525">
+                  <a14:hiddenLine xmlns="" xmlns:a14="http://schemas.microsoft.com/office/drawing/2010/main" w="9525">
                     <a:solidFill>
                       <a:srgbClr val="000000"/>
                     </a:solidFill>
@@ -10813,7 +10813,7 @@
               </a:ln>
               <a:extLst>
                 <a:ext uri="{91240B29-F687-4f45-9708-019B960494DF}">
-                  <a14:hiddenLine xmlns:a14="http://schemas.microsoft.com/office/drawing/2010/main" xmlns="" w="9525">
+                  <a14:hiddenLine xmlns="" xmlns:a14="http://schemas.microsoft.com/office/drawing/2010/main" w="9525">
                     <a:solidFill>
                       <a:srgbClr val="000000"/>
                     </a:solidFill>
@@ -10878,7 +10878,7 @@
               </a:ln>
               <a:extLst>
                 <a:ext uri="{91240B29-F687-4f45-9708-019B960494DF}">
-                  <a14:hiddenLine xmlns:a14="http://schemas.microsoft.com/office/drawing/2010/main" xmlns="" w="9525">
+                  <a14:hiddenLine xmlns="" xmlns:a14="http://schemas.microsoft.com/office/drawing/2010/main" w="9525">
                     <a:solidFill>
                       <a:srgbClr val="000000"/>
                     </a:solidFill>
@@ -10998,7 +10998,7 @@
               </a:ln>
               <a:extLst>
                 <a:ext uri="{91240B29-F687-4f45-9708-019B960494DF}">
-                  <a14:hiddenLine xmlns:a14="http://schemas.microsoft.com/office/drawing/2010/main" xmlns="" w="9525">
+                  <a14:hiddenLine xmlns="" xmlns:a14="http://schemas.microsoft.com/office/drawing/2010/main" w="9525">
                     <a:solidFill>
                       <a:srgbClr val="000000"/>
                     </a:solidFill>
@@ -11096,7 +11096,7 @@
               </a:ln>
               <a:extLst>
                 <a:ext uri="{91240B29-F687-4f45-9708-019B960494DF}">
-                  <a14:hiddenLine xmlns:a14="http://schemas.microsoft.com/office/drawing/2010/main" xmlns="" w="9525">
+                  <a14:hiddenLine xmlns="" xmlns:a14="http://schemas.microsoft.com/office/drawing/2010/main" w="9525">
                     <a:solidFill>
                       <a:srgbClr val="000000"/>
                     </a:solidFill>
@@ -11211,7 +11211,7 @@
               </a:ln>
               <a:extLst>
                 <a:ext uri="{91240B29-F687-4f45-9708-019B960494DF}">
-                  <a14:hiddenLine xmlns:a14="http://schemas.microsoft.com/office/drawing/2010/main" xmlns="" w="9525">
+                  <a14:hiddenLine xmlns="" xmlns:a14="http://schemas.microsoft.com/office/drawing/2010/main" w="9525">
                     <a:solidFill>
                       <a:srgbClr val="000000"/>
                     </a:solidFill>
@@ -11301,7 +11301,7 @@
               </a:ln>
               <a:extLst>
                 <a:ext uri="{91240B29-F687-4f45-9708-019B960494DF}">
-                  <a14:hiddenLine xmlns:a14="http://schemas.microsoft.com/office/drawing/2010/main" xmlns="" w="9525">
+                  <a14:hiddenLine xmlns="" xmlns:a14="http://schemas.microsoft.com/office/drawing/2010/main" w="9525">
                     <a:solidFill>
                       <a:srgbClr val="000000"/>
                     </a:solidFill>
@@ -11366,7 +11366,7 @@
               </a:ln>
               <a:extLst>
                 <a:ext uri="{91240B29-F687-4f45-9708-019B960494DF}">
-                  <a14:hiddenLine xmlns:a14="http://schemas.microsoft.com/office/drawing/2010/main" xmlns="" w="9525">
+                  <a14:hiddenLine xmlns="" xmlns:a14="http://schemas.microsoft.com/office/drawing/2010/main" w="9525">
                     <a:solidFill>
                       <a:srgbClr val="000000"/>
                     </a:solidFill>
@@ -11456,7 +11456,7 @@
               </a:ln>
               <a:extLst>
                 <a:ext uri="{91240B29-F687-4f45-9708-019B960494DF}">
-                  <a14:hiddenLine xmlns:a14="http://schemas.microsoft.com/office/drawing/2010/main" xmlns="" w="9525">
+                  <a14:hiddenLine xmlns="" xmlns:a14="http://schemas.microsoft.com/office/drawing/2010/main" w="9525">
                     <a:solidFill>
                       <a:srgbClr val="000000"/>
                     </a:solidFill>
@@ -11524,7 +11524,7 @@
               </a:ln>
               <a:extLst>
                 <a:ext uri="{91240B29-F687-4f45-9708-019B960494DF}">
-                  <a14:hiddenLine xmlns:a14="http://schemas.microsoft.com/office/drawing/2010/main" xmlns="" w="9525">
+                  <a14:hiddenLine xmlns="" xmlns:a14="http://schemas.microsoft.com/office/drawing/2010/main" w="9525">
                     <a:solidFill>
                       <a:srgbClr val="000000"/>
                     </a:solidFill>
@@ -11614,7 +11614,7 @@
               </a:ln>
               <a:extLst>
                 <a:ext uri="{91240B29-F687-4f45-9708-019B960494DF}">
-                  <a14:hiddenLine xmlns:a14="http://schemas.microsoft.com/office/drawing/2010/main" xmlns="" w="9525">
+                  <a14:hiddenLine xmlns="" xmlns:a14="http://schemas.microsoft.com/office/drawing/2010/main" w="9525">
                     <a:solidFill>
                       <a:srgbClr val="000000"/>
                     </a:solidFill>
@@ -11682,7 +11682,7 @@
               </a:ln>
               <a:extLst>
                 <a:ext uri="{91240B29-F687-4f45-9708-019B960494DF}">
-                  <a14:hiddenLine xmlns:a14="http://schemas.microsoft.com/office/drawing/2010/main" xmlns="" w="9525">
+                  <a14:hiddenLine xmlns="" xmlns:a14="http://schemas.microsoft.com/office/drawing/2010/main" w="9525">
                     <a:solidFill>
                       <a:srgbClr val="000000"/>
                     </a:solidFill>
@@ -11772,7 +11772,7 @@
               </a:ln>
               <a:extLst>
                 <a:ext uri="{91240B29-F687-4f45-9708-019B960494DF}">
-                  <a14:hiddenLine xmlns:a14="http://schemas.microsoft.com/office/drawing/2010/main" xmlns="" w="9525">
+                  <a14:hiddenLine xmlns="" xmlns:a14="http://schemas.microsoft.com/office/drawing/2010/main" w="9525">
                     <a:solidFill>
                       <a:srgbClr val="000000"/>
                     </a:solidFill>
@@ -11806,7 +11806,7 @@
               </a:ln>
               <a:extLst>
                 <a:ext uri="{91240B29-F687-4f45-9708-019B960494DF}">
-                  <a14:hiddenLine xmlns:a14="http://schemas.microsoft.com/office/drawing/2010/main" xmlns="" w="9525">
+                  <a14:hiddenLine xmlns="" xmlns:a14="http://schemas.microsoft.com/office/drawing/2010/main" w="9525">
                     <a:solidFill>
                       <a:srgbClr val="000000"/>
                     </a:solidFill>
@@ -20652,7 +20652,7 @@
         <p:spPr>
           <a:xfrm>
             <a:off x="814812" y="1259455"/>
-            <a:ext cx="10746463" cy="2954655"/>
+            <a:ext cx="10746463" cy="4431983"/>
           </a:xfrm>
           <a:prstGeom prst="rect">
             <a:avLst/>
@@ -20664,6 +20664,28 @@
             <a:spAutoFit/>
           </a:bodyPr>
           <a:lstStyle/>
+          <a:p>
+            <a:r>
+              <a:rPr lang="en-US" sz="3200" dirty="0"/>
+              <a:t>Result</a:t>
+            </a:r>
+          </a:p>
+          <a:p>
+            <a:pPr lvl="1"/>
+            <a:r>
+              <a:rPr lang="en-US" sz="3200" dirty="0">
+                <a:hlinkClick r:id="rId2"/>
+              </a:rPr>
+              <a:t>questions_score.xlsx</a:t>
+            </a:r>
+            <a:endParaRPr lang="en-US" sz="3200" dirty="0"/>
+          </a:p>
+          <a:p>
+            <a:r>
+              <a:rPr lang="en-US" sz="3200" dirty="0"/>
+              <a:t>Analysis</a:t>
+            </a:r>
+          </a:p>
           <a:p>
             <a:pPr marL="457200" indent="-457200">
               <a:buFont typeface="Arial" panose="020B0604020202020204" pitchFamily="34" charset="0"/>

</xml_diff>

<commit_message>
Add the though for IP6
</commit_message>
<xml_diff>
--- a/Data Analytics and Information Virtualization Project.pptx
+++ b/Data Analytics and Information Virtualization Project.pptx
@@ -20,7 +20,12 @@
     <p:sldId id="270" r:id="rId14"/>
     <p:sldId id="271" r:id="rId15"/>
     <p:sldId id="272" r:id="rId16"/>
-    <p:sldId id="266" r:id="rId17"/>
+    <p:sldId id="273" r:id="rId17"/>
+    <p:sldId id="275" r:id="rId18"/>
+    <p:sldId id="276" r:id="rId19"/>
+    <p:sldId id="274" r:id="rId20"/>
+    <p:sldId id="277" r:id="rId21"/>
+    <p:sldId id="266" r:id="rId22"/>
   </p:sldIdLst>
   <p:sldSz cx="12192000" cy="6858000"/>
   <p:notesSz cx="6858000" cy="9144000"/>
@@ -177,7 +182,7 @@
           <a:noFill/>
           <a:extLst>
             <a:ext uri="{909E8E84-426E-40dd-AFC4-6F175D3DCCD1}">
-              <a14:hiddenFill xmlns:a14="http://schemas.microsoft.com/office/drawing/2010/main" xmlns="">
+              <a14:hiddenFill xmlns="" xmlns:a14="http://schemas.microsoft.com/office/drawing/2010/main">
                 <a:solidFill>
                   <a:srgbClr val="FFFFFF"/>
                 </a:solidFill>
@@ -237,7 +242,7 @@
             </a:ln>
             <a:extLst>
               <a:ext uri="{91240B29-F687-4f45-9708-019B960494DF}">
-                <a14:hiddenLine xmlns:a14="http://schemas.microsoft.com/office/drawing/2010/main" xmlns="" w="9525">
+                <a14:hiddenLine xmlns="" xmlns:a14="http://schemas.microsoft.com/office/drawing/2010/main" w="9525">
                   <a:solidFill>
                     <a:srgbClr val="000000"/>
                   </a:solidFill>
@@ -327,7 +332,7 @@
             </a:ln>
             <a:extLst>
               <a:ext uri="{91240B29-F687-4f45-9708-019B960494DF}">
-                <a14:hiddenLine xmlns:a14="http://schemas.microsoft.com/office/drawing/2010/main" xmlns="" w="9525">
+                <a14:hiddenLine xmlns="" xmlns:a14="http://schemas.microsoft.com/office/drawing/2010/main" w="9525">
                   <a:solidFill>
                     <a:srgbClr val="000000"/>
                   </a:solidFill>
@@ -417,7 +422,7 @@
             </a:ln>
             <a:extLst>
               <a:ext uri="{91240B29-F687-4f45-9708-019B960494DF}">
-                <a14:hiddenLine xmlns:a14="http://schemas.microsoft.com/office/drawing/2010/main" xmlns="" w="9525">
+                <a14:hiddenLine xmlns="" xmlns:a14="http://schemas.microsoft.com/office/drawing/2010/main" w="9525">
                   <a:solidFill>
                     <a:srgbClr val="000000"/>
                   </a:solidFill>
@@ -451,7 +456,7 @@
             </a:ln>
             <a:extLst>
               <a:ext uri="{91240B29-F687-4f45-9708-019B960494DF}">
-                <a14:hiddenLine xmlns:a14="http://schemas.microsoft.com/office/drawing/2010/main" xmlns="" w="9525">
+                <a14:hiddenLine xmlns="" xmlns:a14="http://schemas.microsoft.com/office/drawing/2010/main" w="9525">
                   <a:solidFill>
                     <a:srgbClr val="000000"/>
                   </a:solidFill>
@@ -541,7 +546,7 @@
             </a:ln>
             <a:extLst>
               <a:ext uri="{91240B29-F687-4f45-9708-019B960494DF}">
-                <a14:hiddenLine xmlns:a14="http://schemas.microsoft.com/office/drawing/2010/main" xmlns="" w="9525">
+                <a14:hiddenLine xmlns="" xmlns:a14="http://schemas.microsoft.com/office/drawing/2010/main" w="9525">
                   <a:solidFill>
                     <a:srgbClr val="000000"/>
                   </a:solidFill>
@@ -603,7 +608,7 @@
             </a:ln>
             <a:extLst>
               <a:ext uri="{91240B29-F687-4f45-9708-019B960494DF}">
-                <a14:hiddenLine xmlns:a14="http://schemas.microsoft.com/office/drawing/2010/main" xmlns="" w="9525">
+                <a14:hiddenLine xmlns="" xmlns:a14="http://schemas.microsoft.com/office/drawing/2010/main" w="9525">
                   <a:solidFill>
                     <a:srgbClr val="000000"/>
                   </a:solidFill>
@@ -665,7 +670,7 @@
             </a:ln>
             <a:extLst>
               <a:ext uri="{91240B29-F687-4f45-9708-019B960494DF}">
-                <a14:hiddenLine xmlns:a14="http://schemas.microsoft.com/office/drawing/2010/main" xmlns="" w="9525">
+                <a14:hiddenLine xmlns="" xmlns:a14="http://schemas.microsoft.com/office/drawing/2010/main" w="9525">
                   <a:solidFill>
                     <a:srgbClr val="000000"/>
                   </a:solidFill>
@@ -755,7 +760,7 @@
             </a:ln>
             <a:extLst>
               <a:ext uri="{91240B29-F687-4f45-9708-019B960494DF}">
-                <a14:hiddenLine xmlns:a14="http://schemas.microsoft.com/office/drawing/2010/main" xmlns="" w="9525">
+                <a14:hiddenLine xmlns="" xmlns:a14="http://schemas.microsoft.com/office/drawing/2010/main" w="9525">
                   <a:solidFill>
                     <a:srgbClr val="000000"/>
                   </a:solidFill>
@@ -817,7 +822,7 @@
             </a:ln>
             <a:extLst>
               <a:ext uri="{91240B29-F687-4f45-9708-019B960494DF}">
-                <a14:hiddenLine xmlns:a14="http://schemas.microsoft.com/office/drawing/2010/main" xmlns="" w="9525">
+                <a14:hiddenLine xmlns="" xmlns:a14="http://schemas.microsoft.com/office/drawing/2010/main" w="9525">
                   <a:solidFill>
                     <a:srgbClr val="000000"/>
                   </a:solidFill>
@@ -879,7 +884,7 @@
             </a:ln>
             <a:extLst>
               <a:ext uri="{91240B29-F687-4f45-9708-019B960494DF}">
-                <a14:hiddenLine xmlns:a14="http://schemas.microsoft.com/office/drawing/2010/main" xmlns="" w="9525">
+                <a14:hiddenLine xmlns="" xmlns:a14="http://schemas.microsoft.com/office/drawing/2010/main" w="9525">
                   <a:solidFill>
                     <a:srgbClr val="000000"/>
                   </a:solidFill>
@@ -969,7 +974,7 @@
             </a:ln>
             <a:extLst>
               <a:ext uri="{91240B29-F687-4f45-9708-019B960494DF}">
-                <a14:hiddenLine xmlns:a14="http://schemas.microsoft.com/office/drawing/2010/main" xmlns="" w="9525">
+                <a14:hiddenLine xmlns="" xmlns:a14="http://schemas.microsoft.com/office/drawing/2010/main" w="9525">
                   <a:solidFill>
                     <a:srgbClr val="000000"/>
                   </a:solidFill>
@@ -1059,7 +1064,7 @@
             </a:ln>
             <a:extLst>
               <a:ext uri="{91240B29-F687-4f45-9708-019B960494DF}">
-                <a14:hiddenLine xmlns:a14="http://schemas.microsoft.com/office/drawing/2010/main" xmlns="" w="9525">
+                <a14:hiddenLine xmlns="" xmlns:a14="http://schemas.microsoft.com/office/drawing/2010/main" w="9525">
                   <a:solidFill>
                     <a:srgbClr val="000000"/>
                   </a:solidFill>
@@ -1121,7 +1126,7 @@
             </a:ln>
             <a:extLst>
               <a:ext uri="{91240B29-F687-4f45-9708-019B960494DF}">
-                <a14:hiddenLine xmlns:a14="http://schemas.microsoft.com/office/drawing/2010/main" xmlns="" w="9525">
+                <a14:hiddenLine xmlns="" xmlns:a14="http://schemas.microsoft.com/office/drawing/2010/main" w="9525">
                   <a:solidFill>
                     <a:srgbClr val="000000"/>
                   </a:solidFill>
@@ -1231,7 +1236,7 @@
             </a:ln>
             <a:extLst>
               <a:ext uri="{91240B29-F687-4f45-9708-019B960494DF}">
-                <a14:hiddenLine xmlns:a14="http://schemas.microsoft.com/office/drawing/2010/main" xmlns="" w="9525">
+                <a14:hiddenLine xmlns="" xmlns:a14="http://schemas.microsoft.com/office/drawing/2010/main" w="9525">
                   <a:solidFill>
                     <a:srgbClr val="000000"/>
                   </a:solidFill>
@@ -1293,7 +1298,7 @@
             </a:ln>
             <a:extLst>
               <a:ext uri="{91240B29-F687-4f45-9708-019B960494DF}">
-                <a14:hiddenLine xmlns:a14="http://schemas.microsoft.com/office/drawing/2010/main" xmlns="" w="9525">
+                <a14:hiddenLine xmlns="" xmlns:a14="http://schemas.microsoft.com/office/drawing/2010/main" w="9525">
                   <a:solidFill>
                     <a:srgbClr val="000000"/>
                   </a:solidFill>
@@ -1383,7 +1388,7 @@
             </a:ln>
             <a:extLst>
               <a:ext uri="{91240B29-F687-4f45-9708-019B960494DF}">
-                <a14:hiddenLine xmlns:a14="http://schemas.microsoft.com/office/drawing/2010/main" xmlns="" w="9525">
+                <a14:hiddenLine xmlns="" xmlns:a14="http://schemas.microsoft.com/office/drawing/2010/main" w="9525">
                   <a:solidFill>
                     <a:srgbClr val="000000"/>
                   </a:solidFill>
@@ -1473,7 +1478,7 @@
             </a:ln>
             <a:extLst>
               <a:ext uri="{91240B29-F687-4f45-9708-019B960494DF}">
-                <a14:hiddenLine xmlns:a14="http://schemas.microsoft.com/office/drawing/2010/main" xmlns="" w="9525">
+                <a14:hiddenLine xmlns="" xmlns:a14="http://schemas.microsoft.com/office/drawing/2010/main" w="9525">
                   <a:solidFill>
                     <a:srgbClr val="000000"/>
                   </a:solidFill>
@@ -1535,7 +1540,7 @@
             </a:ln>
             <a:extLst>
               <a:ext uri="{91240B29-F687-4f45-9708-019B960494DF}">
-                <a14:hiddenLine xmlns:a14="http://schemas.microsoft.com/office/drawing/2010/main" xmlns="" w="9525">
+                <a14:hiddenLine xmlns="" xmlns:a14="http://schemas.microsoft.com/office/drawing/2010/main" w="9525">
                   <a:solidFill>
                     <a:srgbClr val="000000"/>
                   </a:solidFill>
@@ -1625,7 +1630,7 @@
             </a:ln>
             <a:extLst>
               <a:ext uri="{91240B29-F687-4f45-9708-019B960494DF}">
-                <a14:hiddenLine xmlns:a14="http://schemas.microsoft.com/office/drawing/2010/main" xmlns="" w="9525">
+                <a14:hiddenLine xmlns="" xmlns:a14="http://schemas.microsoft.com/office/drawing/2010/main" w="9525">
                   <a:solidFill>
                     <a:srgbClr val="000000"/>
                   </a:solidFill>
@@ -1715,7 +1720,7 @@
             </a:ln>
             <a:extLst>
               <a:ext uri="{91240B29-F687-4f45-9708-019B960494DF}">
-                <a14:hiddenLine xmlns:a14="http://schemas.microsoft.com/office/drawing/2010/main" xmlns="" w="9525">
+                <a14:hiddenLine xmlns="" xmlns:a14="http://schemas.microsoft.com/office/drawing/2010/main" w="9525">
                   <a:solidFill>
                     <a:srgbClr val="000000"/>
                   </a:solidFill>
@@ -1771,7 +1776,7 @@
             </a:ln>
             <a:extLst>
               <a:ext uri="{91240B29-F687-4f45-9708-019B960494DF}">
-                <a14:hiddenLine xmlns:a14="http://schemas.microsoft.com/office/drawing/2010/main" xmlns="" w="9525">
+                <a14:hiddenLine xmlns="" xmlns:a14="http://schemas.microsoft.com/office/drawing/2010/main" w="9525">
                   <a:solidFill>
                     <a:srgbClr val="000000"/>
                   </a:solidFill>
@@ -1861,7 +1866,7 @@
             </a:ln>
             <a:extLst>
               <a:ext uri="{91240B29-F687-4f45-9708-019B960494DF}">
-                <a14:hiddenLine xmlns:a14="http://schemas.microsoft.com/office/drawing/2010/main" xmlns="" w="9525">
+                <a14:hiddenLine xmlns="" xmlns:a14="http://schemas.microsoft.com/office/drawing/2010/main" w="9525">
                   <a:solidFill>
                     <a:srgbClr val="000000"/>
                   </a:solidFill>
@@ -1917,7 +1922,7 @@
             </a:ln>
             <a:extLst>
               <a:ext uri="{91240B29-F687-4f45-9708-019B960494DF}">
-                <a14:hiddenLine xmlns:a14="http://schemas.microsoft.com/office/drawing/2010/main" xmlns="" w="9525">
+                <a14:hiddenLine xmlns="" xmlns:a14="http://schemas.microsoft.com/office/drawing/2010/main" w="9525">
                   <a:solidFill>
                     <a:srgbClr val="000000"/>
                   </a:solidFill>
@@ -2007,7 +2012,7 @@
             </a:ln>
             <a:extLst>
               <a:ext uri="{91240B29-F687-4f45-9708-019B960494DF}">
-                <a14:hiddenLine xmlns:a14="http://schemas.microsoft.com/office/drawing/2010/main" xmlns="" w="9525">
+                <a14:hiddenLine xmlns="" xmlns:a14="http://schemas.microsoft.com/office/drawing/2010/main" w="9525">
                   <a:solidFill>
                     <a:srgbClr val="000000"/>
                   </a:solidFill>
@@ -2075,7 +2080,7 @@
             </a:ln>
             <a:extLst>
               <a:ext uri="{91240B29-F687-4f45-9708-019B960494DF}">
-                <a14:hiddenLine xmlns:a14="http://schemas.microsoft.com/office/drawing/2010/main" xmlns="" w="9525">
+                <a14:hiddenLine xmlns="" xmlns:a14="http://schemas.microsoft.com/office/drawing/2010/main" w="9525">
                   <a:solidFill>
                     <a:srgbClr val="000000"/>
                   </a:solidFill>
@@ -2165,7 +2170,7 @@
             </a:ln>
             <a:extLst>
               <a:ext uri="{91240B29-F687-4f45-9708-019B960494DF}">
-                <a14:hiddenLine xmlns:a14="http://schemas.microsoft.com/office/drawing/2010/main" xmlns="" w="9525">
+                <a14:hiddenLine xmlns="" xmlns:a14="http://schemas.microsoft.com/office/drawing/2010/main" w="9525">
                   <a:solidFill>
                     <a:srgbClr val="000000"/>
                   </a:solidFill>
@@ -2233,7 +2238,7 @@
             </a:ln>
             <a:extLst>
               <a:ext uri="{91240B29-F687-4f45-9708-019B960494DF}">
-                <a14:hiddenLine xmlns:a14="http://schemas.microsoft.com/office/drawing/2010/main" xmlns="" w="9525">
+                <a14:hiddenLine xmlns="" xmlns:a14="http://schemas.microsoft.com/office/drawing/2010/main" w="9525">
                   <a:solidFill>
                     <a:srgbClr val="000000"/>
                   </a:solidFill>
@@ -2323,7 +2328,7 @@
             </a:ln>
             <a:extLst>
               <a:ext uri="{91240B29-F687-4f45-9708-019B960494DF}">
-                <a14:hiddenLine xmlns:a14="http://schemas.microsoft.com/office/drawing/2010/main" xmlns="" w="9525">
+                <a14:hiddenLine xmlns="" xmlns:a14="http://schemas.microsoft.com/office/drawing/2010/main" w="9525">
                   <a:solidFill>
                     <a:srgbClr val="000000"/>
                   </a:solidFill>
@@ -2357,7 +2362,7 @@
             </a:ln>
             <a:extLst>
               <a:ext uri="{91240B29-F687-4f45-9708-019B960494DF}">
-                <a14:hiddenLine xmlns:a14="http://schemas.microsoft.com/office/drawing/2010/main" xmlns="" w="9525">
+                <a14:hiddenLine xmlns="" xmlns:a14="http://schemas.microsoft.com/office/drawing/2010/main" w="9525">
                   <a:solidFill>
                     <a:srgbClr val="000000"/>
                   </a:solidFill>
@@ -2447,7 +2452,7 @@
             </a:ln>
             <a:extLst>
               <a:ext uri="{91240B29-F687-4f45-9708-019B960494DF}">
-                <a14:hiddenLine xmlns:a14="http://schemas.microsoft.com/office/drawing/2010/main" xmlns="" w="9525">
+                <a14:hiddenLine xmlns="" xmlns:a14="http://schemas.microsoft.com/office/drawing/2010/main" w="9525">
                   <a:solidFill>
                     <a:srgbClr val="000000"/>
                   </a:solidFill>
@@ -2509,7 +2514,7 @@
             </a:ln>
             <a:extLst>
               <a:ext uri="{91240B29-F687-4f45-9708-019B960494DF}">
-                <a14:hiddenLine xmlns:a14="http://schemas.microsoft.com/office/drawing/2010/main" xmlns="" w="9525">
+                <a14:hiddenLine xmlns="" xmlns:a14="http://schemas.microsoft.com/office/drawing/2010/main" w="9525">
                   <a:solidFill>
                     <a:srgbClr val="000000"/>
                   </a:solidFill>
@@ -2571,7 +2576,7 @@
             </a:ln>
             <a:extLst>
               <a:ext uri="{91240B29-F687-4f45-9708-019B960494DF}">
-                <a14:hiddenLine xmlns:a14="http://schemas.microsoft.com/office/drawing/2010/main" xmlns="" w="9525">
+                <a14:hiddenLine xmlns="" xmlns:a14="http://schemas.microsoft.com/office/drawing/2010/main" w="9525">
                   <a:solidFill>
                     <a:srgbClr val="000000"/>
                   </a:solidFill>
@@ -2661,7 +2666,7 @@
             </a:ln>
             <a:extLst>
               <a:ext uri="{91240B29-F687-4f45-9708-019B960494DF}">
-                <a14:hiddenLine xmlns:a14="http://schemas.microsoft.com/office/drawing/2010/main" xmlns="" w="9525">
+                <a14:hiddenLine xmlns="" xmlns:a14="http://schemas.microsoft.com/office/drawing/2010/main" w="9525">
                   <a:solidFill>
                     <a:srgbClr val="000000"/>
                   </a:solidFill>
@@ -2729,7 +2734,7 @@
             </a:ln>
             <a:extLst>
               <a:ext uri="{91240B29-F687-4f45-9708-019B960494DF}">
-                <a14:hiddenLine xmlns:a14="http://schemas.microsoft.com/office/drawing/2010/main" xmlns="" w="9525">
+                <a14:hiddenLine xmlns="" xmlns:a14="http://schemas.microsoft.com/office/drawing/2010/main" w="9525">
                   <a:solidFill>
                     <a:srgbClr val="000000"/>
                   </a:solidFill>
@@ -2791,7 +2796,7 @@
             </a:ln>
             <a:extLst>
               <a:ext uri="{91240B29-F687-4f45-9708-019B960494DF}">
-                <a14:hiddenLine xmlns:a14="http://schemas.microsoft.com/office/drawing/2010/main" xmlns="" w="9525">
+                <a14:hiddenLine xmlns="" xmlns:a14="http://schemas.microsoft.com/office/drawing/2010/main" w="9525">
                   <a:solidFill>
                     <a:srgbClr val="000000"/>
                   </a:solidFill>
@@ -2881,7 +2886,7 @@
             </a:ln>
             <a:extLst>
               <a:ext uri="{91240B29-F687-4f45-9708-019B960494DF}">
-                <a14:hiddenLine xmlns:a14="http://schemas.microsoft.com/office/drawing/2010/main" xmlns="" w="9525">
+                <a14:hiddenLine xmlns="" xmlns:a14="http://schemas.microsoft.com/office/drawing/2010/main" w="9525">
                   <a:solidFill>
                     <a:srgbClr val="000000"/>
                   </a:solidFill>
@@ -2943,7 +2948,7 @@
             </a:ln>
             <a:extLst>
               <a:ext uri="{91240B29-F687-4f45-9708-019B960494DF}">
-                <a14:hiddenLine xmlns:a14="http://schemas.microsoft.com/office/drawing/2010/main" xmlns="" w="9525">
+                <a14:hiddenLine xmlns="" xmlns:a14="http://schemas.microsoft.com/office/drawing/2010/main" w="9525">
                   <a:solidFill>
                     <a:srgbClr val="000000"/>
                   </a:solidFill>
@@ -3033,7 +3038,7 @@
             </a:ln>
             <a:extLst>
               <a:ext uri="{91240B29-F687-4f45-9708-019B960494DF}">
-                <a14:hiddenLine xmlns:a14="http://schemas.microsoft.com/office/drawing/2010/main" xmlns="" w="9525">
+                <a14:hiddenLine xmlns="" xmlns:a14="http://schemas.microsoft.com/office/drawing/2010/main" w="9525">
                   <a:solidFill>
                     <a:srgbClr val="000000"/>
                   </a:solidFill>
@@ -3095,7 +3100,7 @@
             </a:ln>
             <a:extLst>
               <a:ext uri="{91240B29-F687-4f45-9708-019B960494DF}">
-                <a14:hiddenLine xmlns:a14="http://schemas.microsoft.com/office/drawing/2010/main" xmlns="" w="9525">
+                <a14:hiddenLine xmlns="" xmlns:a14="http://schemas.microsoft.com/office/drawing/2010/main" w="9525">
                   <a:solidFill>
                     <a:srgbClr val="000000"/>
                   </a:solidFill>
@@ -3185,7 +3190,7 @@
             </a:ln>
             <a:extLst>
               <a:ext uri="{91240B29-F687-4f45-9708-019B960494DF}">
-                <a14:hiddenLine xmlns:a14="http://schemas.microsoft.com/office/drawing/2010/main" xmlns="" w="9525">
+                <a14:hiddenLine xmlns="" xmlns:a14="http://schemas.microsoft.com/office/drawing/2010/main" w="9525">
                   <a:solidFill>
                     <a:srgbClr val="000000"/>
                   </a:solidFill>
@@ -3219,7 +3224,7 @@
             </a:ln>
             <a:extLst>
               <a:ext uri="{91240B29-F687-4f45-9708-019B960494DF}">
-                <a14:hiddenLine xmlns:a14="http://schemas.microsoft.com/office/drawing/2010/main" xmlns="" w="9525">
+                <a14:hiddenLine xmlns="" xmlns:a14="http://schemas.microsoft.com/office/drawing/2010/main" w="9525">
                   <a:solidFill>
                     <a:srgbClr val="000000"/>
                   </a:solidFill>
@@ -3284,7 +3289,7 @@
             </a:ln>
             <a:extLst>
               <a:ext uri="{91240B29-F687-4f45-9708-019B960494DF}">
-                <a14:hiddenLine xmlns:a14="http://schemas.microsoft.com/office/drawing/2010/main" xmlns="" w="9525">
+                <a14:hiddenLine xmlns="" xmlns:a14="http://schemas.microsoft.com/office/drawing/2010/main" w="9525">
                   <a:solidFill>
                     <a:srgbClr val="000000"/>
                   </a:solidFill>
@@ -3374,7 +3379,7 @@
             </a:ln>
             <a:extLst>
               <a:ext uri="{91240B29-F687-4f45-9708-019B960494DF}">
-                <a14:hiddenLine xmlns:a14="http://schemas.microsoft.com/office/drawing/2010/main" xmlns="" w="9525">
+                <a14:hiddenLine xmlns="" xmlns:a14="http://schemas.microsoft.com/office/drawing/2010/main" w="9525">
                   <a:solidFill>
                     <a:srgbClr val="000000"/>
                   </a:solidFill>
@@ -3436,7 +3441,7 @@
             </a:ln>
             <a:extLst>
               <a:ext uri="{91240B29-F687-4f45-9708-019B960494DF}">
-                <a14:hiddenLine xmlns:a14="http://schemas.microsoft.com/office/drawing/2010/main" xmlns="" w="9525">
+                <a14:hiddenLine xmlns="" xmlns:a14="http://schemas.microsoft.com/office/drawing/2010/main" w="9525">
                   <a:solidFill>
                     <a:srgbClr val="000000"/>
                   </a:solidFill>
@@ -3526,7 +3531,7 @@
             </a:ln>
             <a:extLst>
               <a:ext uri="{91240B29-F687-4f45-9708-019B960494DF}">
-                <a14:hiddenLine xmlns:a14="http://schemas.microsoft.com/office/drawing/2010/main" xmlns="" w="9525">
+                <a14:hiddenLine xmlns="" xmlns:a14="http://schemas.microsoft.com/office/drawing/2010/main" w="9525">
                   <a:solidFill>
                     <a:srgbClr val="000000"/>
                   </a:solidFill>
@@ -3616,7 +3621,7 @@
             </a:ln>
             <a:extLst>
               <a:ext uri="{91240B29-F687-4f45-9708-019B960494DF}">
-                <a14:hiddenLine xmlns:a14="http://schemas.microsoft.com/office/drawing/2010/main" xmlns="" w="9525">
+                <a14:hiddenLine xmlns="" xmlns:a14="http://schemas.microsoft.com/office/drawing/2010/main" w="9525">
                   <a:solidFill>
                     <a:srgbClr val="000000"/>
                   </a:solidFill>
@@ -3681,7 +3686,7 @@
             </a:ln>
             <a:extLst>
               <a:ext uri="{91240B29-F687-4f45-9708-019B960494DF}">
-                <a14:hiddenLine xmlns:a14="http://schemas.microsoft.com/office/drawing/2010/main" xmlns="" w="9525">
+                <a14:hiddenLine xmlns="" xmlns:a14="http://schemas.microsoft.com/office/drawing/2010/main" w="9525">
                   <a:solidFill>
                     <a:srgbClr val="000000"/>
                   </a:solidFill>
@@ -3743,7 +3748,7 @@
             </a:ln>
             <a:extLst>
               <a:ext uri="{91240B29-F687-4f45-9708-019B960494DF}">
-                <a14:hiddenLine xmlns:a14="http://schemas.microsoft.com/office/drawing/2010/main" xmlns="" w="9525">
+                <a14:hiddenLine xmlns="" xmlns:a14="http://schemas.microsoft.com/office/drawing/2010/main" w="9525">
                   <a:solidFill>
                     <a:srgbClr val="000000"/>
                   </a:solidFill>
@@ -3833,7 +3838,7 @@
             </a:ln>
             <a:extLst>
               <a:ext uri="{91240B29-F687-4f45-9708-019B960494DF}">
-                <a14:hiddenLine xmlns:a14="http://schemas.microsoft.com/office/drawing/2010/main" xmlns="" w="9525">
+                <a14:hiddenLine xmlns="" xmlns:a14="http://schemas.microsoft.com/office/drawing/2010/main" w="9525">
                   <a:solidFill>
                     <a:srgbClr val="000000"/>
                   </a:solidFill>
@@ -3923,7 +3928,7 @@
             </a:ln>
             <a:extLst>
               <a:ext uri="{91240B29-F687-4f45-9708-019B960494DF}">
-                <a14:hiddenLine xmlns:a14="http://schemas.microsoft.com/office/drawing/2010/main" xmlns="" w="9525">
+                <a14:hiddenLine xmlns="" xmlns:a14="http://schemas.microsoft.com/office/drawing/2010/main" w="9525">
                   <a:solidFill>
                     <a:srgbClr val="000000"/>
                   </a:solidFill>
@@ -3985,7 +3990,7 @@
             </a:ln>
             <a:extLst>
               <a:ext uri="{91240B29-F687-4f45-9708-019B960494DF}">
-                <a14:hiddenLine xmlns:a14="http://schemas.microsoft.com/office/drawing/2010/main" xmlns="" w="9525">
+                <a14:hiddenLine xmlns="" xmlns:a14="http://schemas.microsoft.com/office/drawing/2010/main" w="9525">
                   <a:solidFill>
                     <a:srgbClr val="000000"/>
                   </a:solidFill>
@@ -4105,7 +4110,7 @@
             </a:ln>
             <a:extLst>
               <a:ext uri="{91240B29-F687-4f45-9708-019B960494DF}">
-                <a14:hiddenLine xmlns:a14="http://schemas.microsoft.com/office/drawing/2010/main" xmlns="" w="9525">
+                <a14:hiddenLine xmlns="" xmlns:a14="http://schemas.microsoft.com/office/drawing/2010/main" w="9525">
                   <a:solidFill>
                     <a:srgbClr val="000000"/>
                   </a:solidFill>
@@ -4173,7 +4178,7 @@
             </a:ln>
             <a:extLst>
               <a:ext uri="{91240B29-F687-4f45-9708-019B960494DF}">
-                <a14:hiddenLine xmlns:a14="http://schemas.microsoft.com/office/drawing/2010/main" xmlns="" w="9525">
+                <a14:hiddenLine xmlns="" xmlns:a14="http://schemas.microsoft.com/office/drawing/2010/main" w="9525">
                   <a:solidFill>
                     <a:srgbClr val="000000"/>
                   </a:solidFill>
@@ -4263,7 +4268,7 @@
             </a:ln>
             <a:extLst>
               <a:ext uri="{91240B29-F687-4f45-9708-019B960494DF}">
-                <a14:hiddenLine xmlns:a14="http://schemas.microsoft.com/office/drawing/2010/main" xmlns="" w="9525">
+                <a14:hiddenLine xmlns="" xmlns:a14="http://schemas.microsoft.com/office/drawing/2010/main" w="9525">
                   <a:solidFill>
                     <a:srgbClr val="000000"/>
                   </a:solidFill>
@@ -4403,7 +4408,7 @@
           <a:p>
             <a:fld id="{48A87A34-81AB-432B-8DAE-1953F412C126}" type="datetimeFigureOut">
               <a:rPr lang="en-US" dirty="0"/>
-              <a:t>2/26/2019</a:t>
+              <a:t>3/5/2019</a:t>
             </a:fld>
             <a:endParaRPr lang="en-US" dirty="0"/>
           </a:p>
@@ -4665,7 +4670,7 @@
           <a:p>
             <a:fld id="{48A87A34-81AB-432B-8DAE-1953F412C126}" type="datetimeFigureOut">
               <a:rPr lang="en-US" dirty="0"/>
-              <a:t>2/26/2019</a:t>
+              <a:t>3/5/2019</a:t>
             </a:fld>
             <a:endParaRPr lang="en-US" dirty="0"/>
           </a:p>
@@ -4856,7 +4861,7 @@
           <a:p>
             <a:fld id="{48A87A34-81AB-432B-8DAE-1953F412C126}" type="datetimeFigureOut">
               <a:rPr lang="en-US" dirty="0"/>
-              <a:t>2/26/2019</a:t>
+              <a:t>3/5/2019</a:t>
             </a:fld>
             <a:endParaRPr lang="en-US" dirty="0"/>
           </a:p>
@@ -5114,7 +5119,7 @@
           <a:p>
             <a:fld id="{48A87A34-81AB-432B-8DAE-1953F412C126}" type="datetimeFigureOut">
               <a:rPr lang="en-US" dirty="0"/>
-              <a:t>2/26/2019</a:t>
+              <a:t>3/5/2019</a:t>
             </a:fld>
             <a:endParaRPr lang="en-US" dirty="0"/>
           </a:p>
@@ -5543,7 +5548,7 @@
           <a:p>
             <a:fld id="{48A87A34-81AB-432B-8DAE-1953F412C126}" type="datetimeFigureOut">
               <a:rPr lang="en-US" dirty="0"/>
-              <a:t>2/26/2019</a:t>
+              <a:t>3/5/2019</a:t>
             </a:fld>
             <a:endParaRPr lang="en-US" dirty="0"/>
           </a:p>
@@ -6084,7 +6089,7 @@
           <a:p>
             <a:fld id="{48A87A34-81AB-432B-8DAE-1953F412C126}" type="datetimeFigureOut">
               <a:rPr lang="en-US" dirty="0"/>
-              <a:t>2/26/2019</a:t>
+              <a:t>3/5/2019</a:t>
             </a:fld>
             <a:endParaRPr lang="en-US" dirty="0"/>
           </a:p>
@@ -6799,7 +6804,7 @@
           <a:p>
             <a:fld id="{48A87A34-81AB-432B-8DAE-1953F412C126}" type="datetimeFigureOut">
               <a:rPr lang="en-US" dirty="0"/>
-              <a:t>2/26/2019</a:t>
+              <a:t>3/5/2019</a:t>
             </a:fld>
             <a:endParaRPr lang="en-US" dirty="0"/>
           </a:p>
@@ -6964,7 +6969,7 @@
           <a:p>
             <a:fld id="{48A87A34-81AB-432B-8DAE-1953F412C126}" type="datetimeFigureOut">
               <a:rPr lang="en-US" dirty="0"/>
-              <a:t>2/26/2019</a:t>
+              <a:t>3/5/2019</a:t>
             </a:fld>
             <a:endParaRPr lang="en-US" dirty="0"/>
           </a:p>
@@ -7139,7 +7144,7 @@
           <a:p>
             <a:fld id="{48A87A34-81AB-432B-8DAE-1953F412C126}" type="datetimeFigureOut">
               <a:rPr lang="en-US" dirty="0"/>
-              <a:t>2/26/2019</a:t>
+              <a:t>3/5/2019</a:t>
             </a:fld>
             <a:endParaRPr lang="en-US" dirty="0"/>
           </a:p>
@@ -7304,7 +7309,7 @@
           <a:p>
             <a:fld id="{48A87A34-81AB-432B-8DAE-1953F412C126}" type="datetimeFigureOut">
               <a:rPr lang="en-US" dirty="0"/>
-              <a:t>2/26/2019</a:t>
+              <a:t>3/5/2019</a:t>
             </a:fld>
             <a:endParaRPr lang="en-US" dirty="0"/>
           </a:p>
@@ -7549,7 +7554,7 @@
           <a:p>
             <a:fld id="{48A87A34-81AB-432B-8DAE-1953F412C126}" type="datetimeFigureOut">
               <a:rPr lang="en-US" dirty="0"/>
-              <a:t>2/26/2019</a:t>
+              <a:t>3/5/2019</a:t>
             </a:fld>
             <a:endParaRPr lang="en-US" dirty="0"/>
           </a:p>
@@ -7776,7 +7781,7 @@
           <a:p>
             <a:fld id="{48A87A34-81AB-432B-8DAE-1953F412C126}" type="datetimeFigureOut">
               <a:rPr lang="en-US" dirty="0"/>
-              <a:t>2/26/2019</a:t>
+              <a:t>3/5/2019</a:t>
             </a:fld>
             <a:endParaRPr lang="en-US" dirty="0"/>
           </a:p>
@@ -8152,7 +8157,7 @@
           <a:p>
             <a:fld id="{48A87A34-81AB-432B-8DAE-1953F412C126}" type="datetimeFigureOut">
               <a:rPr lang="en-US" dirty="0"/>
-              <a:t>2/26/2019</a:t>
+              <a:t>3/5/2019</a:t>
             </a:fld>
             <a:endParaRPr lang="en-US" dirty="0"/>
           </a:p>
@@ -8265,7 +8270,7 @@
           <a:p>
             <a:fld id="{48A87A34-81AB-432B-8DAE-1953F412C126}" type="datetimeFigureOut">
               <a:rPr lang="en-US" dirty="0"/>
-              <a:t>2/26/2019</a:t>
+              <a:t>3/5/2019</a:t>
             </a:fld>
             <a:endParaRPr lang="en-US" dirty="0"/>
           </a:p>
@@ -8355,7 +8360,7 @@
           <a:p>
             <a:fld id="{48A87A34-81AB-432B-8DAE-1953F412C126}" type="datetimeFigureOut">
               <a:rPr lang="en-US" dirty="0"/>
-              <a:t>2/26/2019</a:t>
+              <a:t>3/5/2019</a:t>
             </a:fld>
             <a:endParaRPr lang="en-US" dirty="0"/>
           </a:p>
@@ -8599,7 +8604,7 @@
           <a:p>
             <a:fld id="{48A87A34-81AB-432B-8DAE-1953F412C126}" type="datetimeFigureOut">
               <a:rPr lang="en-US" dirty="0"/>
-              <a:t>2/26/2019</a:t>
+              <a:t>3/5/2019</a:t>
             </a:fld>
             <a:endParaRPr lang="en-US" dirty="0"/>
           </a:p>
@@ -8874,7 +8879,7 @@
           <a:p>
             <a:fld id="{48A87A34-81AB-432B-8DAE-1953F412C126}" type="datetimeFigureOut">
               <a:rPr lang="en-US" dirty="0"/>
-              <a:t>2/26/2019</a:t>
+              <a:t>3/5/2019</a:t>
             </a:fld>
             <a:endParaRPr lang="en-US" dirty="0"/>
           </a:p>
@@ -8985,7 +8990,7 @@
           <a:noFill/>
           <a:extLst>
             <a:ext uri="{909E8E84-426E-40dd-AFC4-6F175D3DCCD1}">
-              <a14:hiddenFill xmlns:a14="http://schemas.microsoft.com/office/drawing/2010/main" xmlns="">
+              <a14:hiddenFill xmlns="" xmlns:a14="http://schemas.microsoft.com/office/drawing/2010/main">
                 <a:solidFill>
                   <a:srgbClr val="FFFFFF"/>
                 </a:solidFill>
@@ -9059,7 +9064,7 @@
               </a:ln>
               <a:extLst>
                 <a:ext uri="{91240B29-F687-4f45-9708-019B960494DF}">
-                  <a14:hiddenLine xmlns:a14="http://schemas.microsoft.com/office/drawing/2010/main" xmlns="" w="9525">
+                  <a14:hiddenLine xmlns="" xmlns:a14="http://schemas.microsoft.com/office/drawing/2010/main" w="9525">
                     <a:solidFill>
                       <a:srgbClr val="000000"/>
                     </a:solidFill>
@@ -9149,7 +9154,7 @@
               </a:ln>
               <a:extLst>
                 <a:ext uri="{91240B29-F687-4f45-9708-019B960494DF}">
-                  <a14:hiddenLine xmlns:a14="http://schemas.microsoft.com/office/drawing/2010/main" xmlns="" w="9525">
+                  <a14:hiddenLine xmlns="" xmlns:a14="http://schemas.microsoft.com/office/drawing/2010/main" w="9525">
                     <a:solidFill>
                       <a:srgbClr val="000000"/>
                     </a:solidFill>
@@ -9239,7 +9244,7 @@
               </a:ln>
               <a:extLst>
                 <a:ext uri="{91240B29-F687-4f45-9708-019B960494DF}">
-                  <a14:hiddenLine xmlns:a14="http://schemas.microsoft.com/office/drawing/2010/main" xmlns="" w="9525">
+                  <a14:hiddenLine xmlns="" xmlns:a14="http://schemas.microsoft.com/office/drawing/2010/main" w="9525">
                     <a:solidFill>
                       <a:srgbClr val="000000"/>
                     </a:solidFill>
@@ -9301,7 +9306,7 @@
               </a:ln>
               <a:extLst>
                 <a:ext uri="{91240B29-F687-4f45-9708-019B960494DF}">
-                  <a14:hiddenLine xmlns:a14="http://schemas.microsoft.com/office/drawing/2010/main" xmlns="" w="9525">
+                  <a14:hiddenLine xmlns="" xmlns:a14="http://schemas.microsoft.com/office/drawing/2010/main" w="9525">
                     <a:solidFill>
                       <a:srgbClr val="000000"/>
                     </a:solidFill>
@@ -9391,7 +9396,7 @@
               </a:ln>
               <a:extLst>
                 <a:ext uri="{91240B29-F687-4f45-9708-019B960494DF}">
-                  <a14:hiddenLine xmlns:a14="http://schemas.microsoft.com/office/drawing/2010/main" xmlns="" w="9525">
+                  <a14:hiddenLine xmlns="" xmlns:a14="http://schemas.microsoft.com/office/drawing/2010/main" w="9525">
                     <a:solidFill>
                       <a:srgbClr val="000000"/>
                     </a:solidFill>
@@ -9453,7 +9458,7 @@
               </a:ln>
               <a:extLst>
                 <a:ext uri="{91240B29-F687-4f45-9708-019B960494DF}">
-                  <a14:hiddenLine xmlns:a14="http://schemas.microsoft.com/office/drawing/2010/main" xmlns="" w="9525">
+                  <a14:hiddenLine xmlns="" xmlns:a14="http://schemas.microsoft.com/office/drawing/2010/main" w="9525">
                     <a:solidFill>
                       <a:srgbClr val="000000"/>
                     </a:solidFill>
@@ -9515,7 +9520,7 @@
               </a:ln>
               <a:extLst>
                 <a:ext uri="{91240B29-F687-4f45-9708-019B960494DF}">
-                  <a14:hiddenLine xmlns:a14="http://schemas.microsoft.com/office/drawing/2010/main" xmlns="" w="9525">
+                  <a14:hiddenLine xmlns="" xmlns:a14="http://schemas.microsoft.com/office/drawing/2010/main" w="9525">
                     <a:solidFill>
                       <a:srgbClr val="000000"/>
                     </a:solidFill>
@@ -9605,7 +9610,7 @@
               </a:ln>
               <a:extLst>
                 <a:ext uri="{91240B29-F687-4f45-9708-019B960494DF}">
-                  <a14:hiddenLine xmlns:a14="http://schemas.microsoft.com/office/drawing/2010/main" xmlns="" w="9525">
+                  <a14:hiddenLine xmlns="" xmlns:a14="http://schemas.microsoft.com/office/drawing/2010/main" w="9525">
                     <a:solidFill>
                       <a:srgbClr val="000000"/>
                     </a:solidFill>
@@ -9695,7 +9700,7 @@
               </a:ln>
               <a:extLst>
                 <a:ext uri="{91240B29-F687-4f45-9708-019B960494DF}">
-                  <a14:hiddenLine xmlns:a14="http://schemas.microsoft.com/office/drawing/2010/main" xmlns="" w="9525">
+                  <a14:hiddenLine xmlns="" xmlns:a14="http://schemas.microsoft.com/office/drawing/2010/main" w="9525">
                     <a:solidFill>
                       <a:srgbClr val="000000"/>
                     </a:solidFill>
@@ -9757,7 +9762,7 @@
               </a:ln>
               <a:extLst>
                 <a:ext uri="{91240B29-F687-4f45-9708-019B960494DF}">
-                  <a14:hiddenLine xmlns:a14="http://schemas.microsoft.com/office/drawing/2010/main" xmlns="" w="9525">
+                  <a14:hiddenLine xmlns="" xmlns:a14="http://schemas.microsoft.com/office/drawing/2010/main" w="9525">
                     <a:solidFill>
                       <a:srgbClr val="000000"/>
                     </a:solidFill>
@@ -9867,7 +9872,7 @@
               </a:ln>
               <a:extLst>
                 <a:ext uri="{91240B29-F687-4f45-9708-019B960494DF}">
-                  <a14:hiddenLine xmlns:a14="http://schemas.microsoft.com/office/drawing/2010/main" xmlns="" w="9525">
+                  <a14:hiddenLine xmlns="" xmlns:a14="http://schemas.microsoft.com/office/drawing/2010/main" w="9525">
                     <a:solidFill>
                       <a:srgbClr val="000000"/>
                     </a:solidFill>
@@ -9951,7 +9956,7 @@
               </a:ln>
               <a:extLst>
                 <a:ext uri="{91240B29-F687-4f45-9708-019B960494DF}">
-                  <a14:hiddenLine xmlns:a14="http://schemas.microsoft.com/office/drawing/2010/main" xmlns="" w="9525">
+                  <a14:hiddenLine xmlns="" xmlns:a14="http://schemas.microsoft.com/office/drawing/2010/main" w="9525">
                     <a:solidFill>
                       <a:srgbClr val="000000"/>
                     </a:solidFill>
@@ -10013,7 +10018,7 @@
               </a:ln>
               <a:extLst>
                 <a:ext uri="{91240B29-F687-4f45-9708-019B960494DF}">
-                  <a14:hiddenLine xmlns:a14="http://schemas.microsoft.com/office/drawing/2010/main" xmlns="" w="9525">
+                  <a14:hiddenLine xmlns="" xmlns:a14="http://schemas.microsoft.com/office/drawing/2010/main" w="9525">
                     <a:solidFill>
                       <a:srgbClr val="000000"/>
                     </a:solidFill>
@@ -10075,7 +10080,7 @@
               </a:ln>
               <a:extLst>
                 <a:ext uri="{91240B29-F687-4f45-9708-019B960494DF}">
-                  <a14:hiddenLine xmlns:a14="http://schemas.microsoft.com/office/drawing/2010/main" xmlns="" w="9525">
+                  <a14:hiddenLine xmlns="" xmlns:a14="http://schemas.microsoft.com/office/drawing/2010/main" w="9525">
                     <a:solidFill>
                       <a:srgbClr val="000000"/>
                     </a:solidFill>
@@ -10165,7 +10170,7 @@
               </a:ln>
               <a:extLst>
                 <a:ext uri="{91240B29-F687-4f45-9708-019B960494DF}">
-                  <a14:hiddenLine xmlns:a14="http://schemas.microsoft.com/office/drawing/2010/main" xmlns="" w="9525">
+                  <a14:hiddenLine xmlns="" xmlns:a14="http://schemas.microsoft.com/office/drawing/2010/main" w="9525">
                     <a:solidFill>
                       <a:srgbClr val="000000"/>
                     </a:solidFill>
@@ -10199,7 +10204,7 @@
               </a:ln>
               <a:extLst>
                 <a:ext uri="{91240B29-F687-4f45-9708-019B960494DF}">
-                  <a14:hiddenLine xmlns:a14="http://schemas.microsoft.com/office/drawing/2010/main" xmlns="" w="9525">
+                  <a14:hiddenLine xmlns="" xmlns:a14="http://schemas.microsoft.com/office/drawing/2010/main" w="9525">
                     <a:solidFill>
                       <a:srgbClr val="000000"/>
                     </a:solidFill>
@@ -10264,7 +10269,7 @@
               </a:ln>
               <a:extLst>
                 <a:ext uri="{91240B29-F687-4f45-9708-019B960494DF}">
-                  <a14:hiddenLine xmlns:a14="http://schemas.microsoft.com/office/drawing/2010/main" xmlns="" w="9525">
+                  <a14:hiddenLine xmlns="" xmlns:a14="http://schemas.microsoft.com/office/drawing/2010/main" w="9525">
                     <a:solidFill>
                       <a:srgbClr val="000000"/>
                     </a:solidFill>
@@ -10354,7 +10359,7 @@
               </a:ln>
               <a:extLst>
                 <a:ext uri="{91240B29-F687-4f45-9708-019B960494DF}">
-                  <a14:hiddenLine xmlns:a14="http://schemas.microsoft.com/office/drawing/2010/main" xmlns="" w="9525">
+                  <a14:hiddenLine xmlns="" xmlns:a14="http://schemas.microsoft.com/office/drawing/2010/main" w="9525">
                     <a:solidFill>
                       <a:srgbClr val="000000"/>
                     </a:solidFill>
@@ -10416,7 +10421,7 @@
               </a:ln>
               <a:extLst>
                 <a:ext uri="{91240B29-F687-4f45-9708-019B960494DF}">
-                  <a14:hiddenLine xmlns:a14="http://schemas.microsoft.com/office/drawing/2010/main" xmlns="" w="9525">
+                  <a14:hiddenLine xmlns="" xmlns:a14="http://schemas.microsoft.com/office/drawing/2010/main" w="9525">
                     <a:solidFill>
                       <a:srgbClr val="000000"/>
                     </a:solidFill>
@@ -10506,7 +10511,7 @@
               </a:ln>
               <a:extLst>
                 <a:ext uri="{91240B29-F687-4f45-9708-019B960494DF}">
-                  <a14:hiddenLine xmlns:a14="http://schemas.microsoft.com/office/drawing/2010/main" xmlns="" w="9525">
+                  <a14:hiddenLine xmlns="" xmlns:a14="http://schemas.microsoft.com/office/drawing/2010/main" w="9525">
                     <a:solidFill>
                       <a:srgbClr val="000000"/>
                     </a:solidFill>
@@ -10571,7 +10576,7 @@
               </a:ln>
               <a:extLst>
                 <a:ext uri="{91240B29-F687-4f45-9708-019B960494DF}">
-                  <a14:hiddenLine xmlns:a14="http://schemas.microsoft.com/office/drawing/2010/main" xmlns="" w="9525">
+                  <a14:hiddenLine xmlns="" xmlns:a14="http://schemas.microsoft.com/office/drawing/2010/main" w="9525">
                     <a:solidFill>
                       <a:srgbClr val="000000"/>
                     </a:solidFill>
@@ -10633,7 +10638,7 @@
               </a:ln>
               <a:extLst>
                 <a:ext uri="{91240B29-F687-4f45-9708-019B960494DF}">
-                  <a14:hiddenLine xmlns:a14="http://schemas.microsoft.com/office/drawing/2010/main" xmlns="" w="9525">
+                  <a14:hiddenLine xmlns="" xmlns:a14="http://schemas.microsoft.com/office/drawing/2010/main" w="9525">
                     <a:solidFill>
                       <a:srgbClr val="000000"/>
                     </a:solidFill>
@@ -10723,7 +10728,7 @@
               </a:ln>
               <a:extLst>
                 <a:ext uri="{91240B29-F687-4f45-9708-019B960494DF}">
-                  <a14:hiddenLine xmlns:a14="http://schemas.microsoft.com/office/drawing/2010/main" xmlns="" w="9525">
+                  <a14:hiddenLine xmlns="" xmlns:a14="http://schemas.microsoft.com/office/drawing/2010/main" w="9525">
                     <a:solidFill>
                       <a:srgbClr val="000000"/>
                     </a:solidFill>
@@ -10813,7 +10818,7 @@
               </a:ln>
               <a:extLst>
                 <a:ext uri="{91240B29-F687-4f45-9708-019B960494DF}">
-                  <a14:hiddenLine xmlns:a14="http://schemas.microsoft.com/office/drawing/2010/main" xmlns="" w="9525">
+                  <a14:hiddenLine xmlns="" xmlns:a14="http://schemas.microsoft.com/office/drawing/2010/main" w="9525">
                     <a:solidFill>
                       <a:srgbClr val="000000"/>
                     </a:solidFill>
@@ -10878,7 +10883,7 @@
               </a:ln>
               <a:extLst>
                 <a:ext uri="{91240B29-F687-4f45-9708-019B960494DF}">
-                  <a14:hiddenLine xmlns:a14="http://schemas.microsoft.com/office/drawing/2010/main" xmlns="" w="9525">
+                  <a14:hiddenLine xmlns="" xmlns:a14="http://schemas.microsoft.com/office/drawing/2010/main" w="9525">
                     <a:solidFill>
                       <a:srgbClr val="000000"/>
                     </a:solidFill>
@@ -10998,7 +11003,7 @@
               </a:ln>
               <a:extLst>
                 <a:ext uri="{91240B29-F687-4f45-9708-019B960494DF}">
-                  <a14:hiddenLine xmlns:a14="http://schemas.microsoft.com/office/drawing/2010/main" xmlns="" w="9525">
+                  <a14:hiddenLine xmlns="" xmlns:a14="http://schemas.microsoft.com/office/drawing/2010/main" w="9525">
                     <a:solidFill>
                       <a:srgbClr val="000000"/>
                     </a:solidFill>
@@ -11096,7 +11101,7 @@
               </a:ln>
               <a:extLst>
                 <a:ext uri="{91240B29-F687-4f45-9708-019B960494DF}">
-                  <a14:hiddenLine xmlns:a14="http://schemas.microsoft.com/office/drawing/2010/main" xmlns="" w="9525">
+                  <a14:hiddenLine xmlns="" xmlns:a14="http://schemas.microsoft.com/office/drawing/2010/main" w="9525">
                     <a:solidFill>
                       <a:srgbClr val="000000"/>
                     </a:solidFill>
@@ -11211,7 +11216,7 @@
               </a:ln>
               <a:extLst>
                 <a:ext uri="{91240B29-F687-4f45-9708-019B960494DF}">
-                  <a14:hiddenLine xmlns:a14="http://schemas.microsoft.com/office/drawing/2010/main" xmlns="" w="9525">
+                  <a14:hiddenLine xmlns="" xmlns:a14="http://schemas.microsoft.com/office/drawing/2010/main" w="9525">
                     <a:solidFill>
                       <a:srgbClr val="000000"/>
                     </a:solidFill>
@@ -11301,7 +11306,7 @@
               </a:ln>
               <a:extLst>
                 <a:ext uri="{91240B29-F687-4f45-9708-019B960494DF}">
-                  <a14:hiddenLine xmlns:a14="http://schemas.microsoft.com/office/drawing/2010/main" xmlns="" w="9525">
+                  <a14:hiddenLine xmlns="" xmlns:a14="http://schemas.microsoft.com/office/drawing/2010/main" w="9525">
                     <a:solidFill>
                       <a:srgbClr val="000000"/>
                     </a:solidFill>
@@ -11366,7 +11371,7 @@
               </a:ln>
               <a:extLst>
                 <a:ext uri="{91240B29-F687-4f45-9708-019B960494DF}">
-                  <a14:hiddenLine xmlns:a14="http://schemas.microsoft.com/office/drawing/2010/main" xmlns="" w="9525">
+                  <a14:hiddenLine xmlns="" xmlns:a14="http://schemas.microsoft.com/office/drawing/2010/main" w="9525">
                     <a:solidFill>
                       <a:srgbClr val="000000"/>
                     </a:solidFill>
@@ -11456,7 +11461,7 @@
               </a:ln>
               <a:extLst>
                 <a:ext uri="{91240B29-F687-4f45-9708-019B960494DF}">
-                  <a14:hiddenLine xmlns:a14="http://schemas.microsoft.com/office/drawing/2010/main" xmlns="" w="9525">
+                  <a14:hiddenLine xmlns="" xmlns:a14="http://schemas.microsoft.com/office/drawing/2010/main" w="9525">
                     <a:solidFill>
                       <a:srgbClr val="000000"/>
                     </a:solidFill>
@@ -11524,7 +11529,7 @@
               </a:ln>
               <a:extLst>
                 <a:ext uri="{91240B29-F687-4f45-9708-019B960494DF}">
-                  <a14:hiddenLine xmlns:a14="http://schemas.microsoft.com/office/drawing/2010/main" xmlns="" w="9525">
+                  <a14:hiddenLine xmlns="" xmlns:a14="http://schemas.microsoft.com/office/drawing/2010/main" w="9525">
                     <a:solidFill>
                       <a:srgbClr val="000000"/>
                     </a:solidFill>
@@ -11614,7 +11619,7 @@
               </a:ln>
               <a:extLst>
                 <a:ext uri="{91240B29-F687-4f45-9708-019B960494DF}">
-                  <a14:hiddenLine xmlns:a14="http://schemas.microsoft.com/office/drawing/2010/main" xmlns="" w="9525">
+                  <a14:hiddenLine xmlns="" xmlns:a14="http://schemas.microsoft.com/office/drawing/2010/main" w="9525">
                     <a:solidFill>
                       <a:srgbClr val="000000"/>
                     </a:solidFill>
@@ -11682,7 +11687,7 @@
               </a:ln>
               <a:extLst>
                 <a:ext uri="{91240B29-F687-4f45-9708-019B960494DF}">
-                  <a14:hiddenLine xmlns:a14="http://schemas.microsoft.com/office/drawing/2010/main" xmlns="" w="9525">
+                  <a14:hiddenLine xmlns="" xmlns:a14="http://schemas.microsoft.com/office/drawing/2010/main" w="9525">
                     <a:solidFill>
                       <a:srgbClr val="000000"/>
                     </a:solidFill>
@@ -11772,7 +11777,7 @@
               </a:ln>
               <a:extLst>
                 <a:ext uri="{91240B29-F687-4f45-9708-019B960494DF}">
-                  <a14:hiddenLine xmlns:a14="http://schemas.microsoft.com/office/drawing/2010/main" xmlns="" w="9525">
+                  <a14:hiddenLine xmlns="" xmlns:a14="http://schemas.microsoft.com/office/drawing/2010/main" w="9525">
                     <a:solidFill>
                       <a:srgbClr val="000000"/>
                     </a:solidFill>
@@ -11806,7 +11811,7 @@
               </a:ln>
               <a:extLst>
                 <a:ext uri="{91240B29-F687-4f45-9708-019B960494DF}">
-                  <a14:hiddenLine xmlns:a14="http://schemas.microsoft.com/office/drawing/2010/main" xmlns="" w="9525">
+                  <a14:hiddenLine xmlns="" xmlns:a14="http://schemas.microsoft.com/office/drawing/2010/main" w="9525">
                     <a:solidFill>
                       <a:srgbClr val="000000"/>
                     </a:solidFill>
@@ -11947,7 +11952,7 @@
             <a:fld id="{48A87A34-81AB-432B-8DAE-1953F412C126}" type="datetimeFigureOut">
               <a:rPr lang="en-US" dirty="0"/>
               <a:pPr/>
-              <a:t>2/26/2019</a:t>
+              <a:t>3/5/2019</a:t>
             </a:fld>
             <a:endParaRPr lang="en-US" dirty="0"/>
           </a:p>
@@ -24823,17 +24828,17 @@
             <a:pPr fontAlgn="ctr"/>
             <a:r>
               <a:rPr lang="en-US" sz="4400" dirty="0"/>
-              <a:t>Links</a:t>
+              <a:t>Predictive Data Analytics(IP#6)</a:t>
             </a:r>
           </a:p>
         </p:txBody>
       </p:sp>
       <p:sp>
         <p:nvSpPr>
-          <p:cNvPr id="6" name="TextBox 5">
+          <p:cNvPr id="2" name="TextBox 1">
             <a:extLst>
               <a:ext uri="{FF2B5EF4-FFF2-40B4-BE49-F238E27FC236}">
-                <a16:creationId xmlns:a16="http://schemas.microsoft.com/office/drawing/2014/main" id="{CE7BF1D4-5981-DE45-A564-E16ED6CC1451}"/>
+                <a16:creationId xmlns:a16="http://schemas.microsoft.com/office/drawing/2014/main" id="{7893E434-ED00-466E-BBDF-6643C0B83A39}"/>
               </a:ext>
             </a:extLst>
           </p:cNvPr>
@@ -24842,8 +24847,8 @@
         </p:nvSpPr>
         <p:spPr>
           <a:xfrm>
-            <a:off x="1173892" y="1189571"/>
-            <a:ext cx="10095471" cy="2308324"/>
+            <a:off x="814812" y="1259455"/>
+            <a:ext cx="10746463" cy="5386090"/>
           </a:xfrm>
           <a:prstGeom prst="rect">
             <a:avLst/>
@@ -24856,7 +24861,206 @@
           </a:bodyPr>
           <a:lstStyle/>
           <a:p>
-            <a:pPr marL="571500" indent="-571500" defTabSz="914400" eaLnBrk="0" fontAlgn="base" hangingPunct="0">
+            <a:pPr defTabSz="914400" eaLnBrk="0" fontAlgn="base" hangingPunct="0">
+              <a:spcBef>
+                <a:spcPct val="0"/>
+              </a:spcBef>
+              <a:spcAft>
+                <a:spcPct val="0"/>
+              </a:spcAft>
+            </a:pPr>
+            <a:r>
+              <a:rPr lang="en-US" altLang="en-US" sz="3200" dirty="0"/>
+              <a:t>Question Defined</a:t>
+            </a:r>
+          </a:p>
+          <a:p>
+            <a:r>
+              <a:rPr lang="en-US" sz="3200" dirty="0"/>
+              <a:t>	</a:t>
+            </a:r>
+            <a:r>
+              <a:rPr lang="en-US" sz="2400" dirty="0"/>
+              <a:t>According to </a:t>
+            </a:r>
+            <a:r>
+              <a:rPr lang="en-US" sz="2400" dirty="0">
+                <a:hlinkClick r:id="rId2"/>
+              </a:rPr>
+              <a:t>tag.xsl</a:t>
+            </a:r>
+            <a:r>
+              <a:rPr lang="en-US" sz="2400" dirty="0"/>
+              <a:t>, we know most tagged topic is </a:t>
+            </a:r>
+            <a:r>
+              <a:rPr lang="en-US" sz="2400" dirty="0" err="1"/>
+              <a:t>javascript</a:t>
+            </a:r>
+            <a:r>
+              <a:rPr lang="en-US" sz="2400" dirty="0"/>
+              <a:t>, we’re going to analyze how accurate this tag</a:t>
+            </a:r>
+          </a:p>
+          <a:p>
+            <a:endParaRPr lang="en-US" sz="3200" dirty="0"/>
+          </a:p>
+          <a:p>
+            <a:r>
+              <a:rPr lang="en-US" sz="3200" dirty="0"/>
+              <a:t>Analysis</a:t>
+            </a:r>
+          </a:p>
+          <a:p>
+            <a:pPr marL="742950" lvl="1" indent="-285750">
+              <a:buFont typeface="Arial" panose="020B0604020202020204" pitchFamily="34" charset="0"/>
+              <a:buChar char="•"/>
+            </a:pPr>
+            <a:r>
+              <a:rPr lang="en-US" sz="2400" dirty="0"/>
+              <a:t>In IP#2, we know that </a:t>
+            </a:r>
+            <a:r>
+              <a:rPr lang="en-US" sz="2400" dirty="0" err="1"/>
+              <a:t>javascript</a:t>
+            </a:r>
+            <a:r>
+              <a:rPr lang="en-US" sz="2400" dirty="0"/>
+              <a:t> has been tagged as most mentioned word in all posts</a:t>
+            </a:r>
+          </a:p>
+          <a:p>
+            <a:pPr marL="742950" lvl="1" indent="-285750">
+              <a:buFont typeface="Arial" panose="020B0604020202020204" pitchFamily="34" charset="0"/>
+              <a:buChar char="•"/>
+            </a:pPr>
+            <a:r>
+              <a:rPr lang="en-US" sz="2400" dirty="0"/>
+              <a:t>For all the post, we only analysis the title by using either bag of word or word2vec get word vector, also the category will be 1 when tag contains </a:t>
+            </a:r>
+            <a:r>
+              <a:rPr lang="en-US" sz="2400" dirty="0" err="1"/>
+              <a:t>javascript</a:t>
+            </a:r>
+            <a:r>
+              <a:rPr lang="en-US" sz="2400" dirty="0"/>
+              <a:t> and 9 when it doesn’t contain </a:t>
+            </a:r>
+            <a:r>
+              <a:rPr lang="en-US" sz="2400" dirty="0" err="1"/>
+              <a:t>javascript</a:t>
+            </a:r>
+            <a:endParaRPr lang="en-US" sz="2400" dirty="0"/>
+          </a:p>
+          <a:p>
+            <a:endParaRPr lang="en-US" dirty="0"/>
+          </a:p>
+          <a:p>
+            <a:endParaRPr lang="en-US" dirty="0"/>
+          </a:p>
+          <a:p>
+            <a:endParaRPr lang="en-US" dirty="0"/>
+          </a:p>
+          <a:p>
+            <a:endParaRPr lang="en-US" dirty="0"/>
+          </a:p>
+        </p:txBody>
+      </p:sp>
+    </p:spTree>
+    <p:extLst>
+      <p:ext uri="{BB962C8B-B14F-4D97-AF65-F5344CB8AC3E}">
+        <p14:creationId xmlns:p14="http://schemas.microsoft.com/office/powerpoint/2010/main" val="219019549"/>
+      </p:ext>
+    </p:extLst>
+  </p:cSld>
+  <p:clrMapOvr>
+    <a:masterClrMapping/>
+  </p:clrMapOvr>
+</p:sld>
+</file>
+
+<file path=ppt/slides/slide17.xml><?xml version="1.0" encoding="utf-8"?>
+<p:sld xmlns:a="http://schemas.openxmlformats.org/drawingml/2006/main" xmlns:r="http://schemas.openxmlformats.org/officeDocument/2006/relationships" xmlns:p="http://schemas.openxmlformats.org/presentationml/2006/main">
+  <p:cSld>
+    <p:spTree>
+      <p:nvGrpSpPr>
+        <p:cNvPr id="1" name=""/>
+        <p:cNvGrpSpPr/>
+        <p:nvPr/>
+      </p:nvGrpSpPr>
+      <p:grpSpPr>
+        <a:xfrm>
+          <a:off x="0" y="0"/>
+          <a:ext cx="0" cy="0"/>
+          <a:chOff x="0" y="0"/>
+          <a:chExt cx="0" cy="0"/>
+        </a:xfrm>
+      </p:grpSpPr>
+      <p:sp>
+        <p:nvSpPr>
+          <p:cNvPr id="9" name="TextBox 8">
+            <a:extLst>
+              <a:ext uri="{FF2B5EF4-FFF2-40B4-BE49-F238E27FC236}">
+                <a16:creationId xmlns:a16="http://schemas.microsoft.com/office/drawing/2014/main" id="{FAAC2C86-314D-C84A-A3BF-C8810037B47E}"/>
+              </a:ext>
+            </a:extLst>
+          </p:cNvPr>
+          <p:cNvSpPr txBox="1"/>
+          <p:nvPr/>
+        </p:nvSpPr>
+        <p:spPr>
+          <a:xfrm>
+            <a:off x="1173892" y="420130"/>
+            <a:ext cx="10157254" cy="769441"/>
+          </a:xfrm>
+          <a:prstGeom prst="rect">
+            <a:avLst/>
+          </a:prstGeom>
+          <a:noFill/>
+        </p:spPr>
+        <p:txBody>
+          <a:bodyPr wrap="square" rtlCol="0">
+            <a:spAutoFit/>
+          </a:bodyPr>
+          <a:lstStyle/>
+          <a:p>
+            <a:pPr fontAlgn="ctr"/>
+            <a:r>
+              <a:rPr lang="en-US" sz="4400" dirty="0"/>
+              <a:t>Data Preparation(IP#6)</a:t>
+            </a:r>
+          </a:p>
+        </p:txBody>
+      </p:sp>
+      <p:sp>
+        <p:nvSpPr>
+          <p:cNvPr id="2" name="TextBox 1">
+            <a:extLst>
+              <a:ext uri="{FF2B5EF4-FFF2-40B4-BE49-F238E27FC236}">
+                <a16:creationId xmlns:a16="http://schemas.microsoft.com/office/drawing/2014/main" id="{7893E434-ED00-466E-BBDF-6643C0B83A39}"/>
+              </a:ext>
+            </a:extLst>
+          </p:cNvPr>
+          <p:cNvSpPr txBox="1"/>
+          <p:nvPr/>
+        </p:nvSpPr>
+        <p:spPr>
+          <a:xfrm>
+            <a:off x="814812" y="1259455"/>
+            <a:ext cx="10746463" cy="3662541"/>
+          </a:xfrm>
+          <a:prstGeom prst="rect">
+            <a:avLst/>
+          </a:prstGeom>
+          <a:noFill/>
+        </p:spPr>
+        <p:txBody>
+          <a:bodyPr wrap="square" rtlCol="0">
+            <a:spAutoFit/>
+          </a:bodyPr>
+          <a:lstStyle/>
+          <a:p>
+            <a:pPr marL="457200" indent="-457200" defTabSz="914400" eaLnBrk="0" fontAlgn="base" hangingPunct="0">
               <a:spcBef>
                 <a:spcPct val="0"/>
               </a:spcBef>
@@ -24867,28 +25071,12 @@
               <a:buChar char="•"/>
             </a:pPr>
             <a:r>
-              <a:rPr lang="en-US" altLang="en-US" sz="3200" dirty="0"/>
-              <a:t>Code: https://</a:t>
+              <a:rPr lang="en-US" sz="3200" dirty="0"/>
+              <a:t>The data we got from big query is sampling data.</a:t>
             </a:r>
-            <a:r>
-              <a:rPr lang="en-US" altLang="en-US" sz="3200" dirty="0" err="1"/>
-              <a:t>github.com</a:t>
-            </a:r>
-            <a:r>
-              <a:rPr lang="en-US" altLang="en-US" sz="3200" dirty="0"/>
-              <a:t>/</a:t>
-            </a:r>
-            <a:r>
-              <a:rPr lang="en-US" altLang="en-US" sz="3200" dirty="0" err="1"/>
-              <a:t>billyean</a:t>
-            </a:r>
-            <a:r>
-              <a:rPr lang="en-US" altLang="en-US" sz="3200" dirty="0"/>
-              <a:t>/anna</a:t>
-            </a:r>
-          </a:p>
-          <a:p>
-            <a:pPr marL="1028700" lvl="1" indent="-571500" defTabSz="914400" eaLnBrk="0" fontAlgn="base" hangingPunct="0">
+          </a:p>
+          <a:p>
+            <a:pPr marL="457200" indent="-457200" defTabSz="914400" eaLnBrk="0" fontAlgn="base" hangingPunct="0">
               <a:spcBef>
                 <a:spcPct val="0"/>
               </a:spcBef>
@@ -24898,10 +25086,13 @@
               <a:buFont typeface="Arial" panose="020B0604020202020204" pitchFamily="34" charset="0"/>
               <a:buChar char="•"/>
             </a:pPr>
-            <a:endParaRPr lang="en-US" altLang="en-US" sz="2000" dirty="0"/>
-          </a:p>
-          <a:p>
-            <a:pPr marL="571500" indent="-571500" defTabSz="914400" eaLnBrk="0" fontAlgn="base" hangingPunct="0">
+            <a:r>
+              <a:rPr lang="en-US" sz="3200" dirty="0"/>
+              <a:t>As the dataset we have is 10K data, we would use 60% as training set, 20% as validation set and 20% as test set.</a:t>
+            </a:r>
+          </a:p>
+          <a:p>
+            <a:pPr marL="457200" indent="-457200" defTabSz="914400" eaLnBrk="0" fontAlgn="base" hangingPunct="0">
               <a:spcBef>
                 <a:spcPct val="0"/>
               </a:spcBef>
@@ -24911,10 +25102,13 @@
               <a:buFont typeface="Arial" panose="020B0604020202020204" pitchFamily="34" charset="0"/>
               <a:buChar char="•"/>
             </a:pPr>
-            <a:endParaRPr lang="en-US" altLang="en-US" sz="3200" dirty="0"/>
-          </a:p>
-          <a:p>
-            <a:pPr marL="571500" indent="-571500" defTabSz="914400" eaLnBrk="0" fontAlgn="base" hangingPunct="0">
+            <a:r>
+              <a:rPr lang="en-US" sz="3200" dirty="0"/>
+              <a:t>The code for converting title to vector is here.</a:t>
+            </a:r>
+          </a:p>
+          <a:p>
+            <a:pPr marL="457200" indent="-457200" defTabSz="914400" eaLnBrk="0" fontAlgn="base" hangingPunct="0">
               <a:spcBef>
                 <a:spcPct val="0"/>
               </a:spcBef>
@@ -24924,25 +25118,261 @@
               <a:buFont typeface="Arial" panose="020B0604020202020204" pitchFamily="34" charset="0"/>
               <a:buChar char="•"/>
             </a:pPr>
-            <a:endParaRPr lang="en-US" altLang="en-US" sz="2400" dirty="0"/>
-          </a:p>
-          <a:p>
-            <a:pPr lvl="0" defTabSz="914400" eaLnBrk="0" fontAlgn="base" hangingPunct="0">
+            <a:r>
+              <a:rPr lang="en-US" sz="3200" dirty="0"/>
+              <a:t>  </a:t>
+            </a:r>
+            <a:endParaRPr lang="en-US" sz="2400" dirty="0"/>
+          </a:p>
+          <a:p>
+            <a:endParaRPr lang="en-US" dirty="0"/>
+          </a:p>
+          <a:p>
+            <a:endParaRPr lang="en-US" dirty="0"/>
+          </a:p>
+          <a:p>
+            <a:endParaRPr lang="en-US" dirty="0"/>
+          </a:p>
+          <a:p>
+            <a:endParaRPr lang="en-US" dirty="0"/>
+          </a:p>
+        </p:txBody>
+      </p:sp>
+    </p:spTree>
+    <p:extLst>
+      <p:ext uri="{BB962C8B-B14F-4D97-AF65-F5344CB8AC3E}">
+        <p14:creationId xmlns:p14="http://schemas.microsoft.com/office/powerpoint/2010/main" val="1718350551"/>
+      </p:ext>
+    </p:extLst>
+  </p:cSld>
+  <p:clrMapOvr>
+    <a:masterClrMapping/>
+  </p:clrMapOvr>
+</p:sld>
+</file>
+
+<file path=ppt/slides/slide18.xml><?xml version="1.0" encoding="utf-8"?>
+<p:sld xmlns:a="http://schemas.openxmlformats.org/drawingml/2006/main" xmlns:r="http://schemas.openxmlformats.org/officeDocument/2006/relationships" xmlns:p="http://schemas.openxmlformats.org/presentationml/2006/main">
+  <p:cSld>
+    <p:spTree>
+      <p:nvGrpSpPr>
+        <p:cNvPr id="1" name=""/>
+        <p:cNvGrpSpPr/>
+        <p:nvPr/>
+      </p:nvGrpSpPr>
+      <p:grpSpPr>
+        <a:xfrm>
+          <a:off x="0" y="0"/>
+          <a:ext cx="0" cy="0"/>
+          <a:chOff x="0" y="0"/>
+          <a:chExt cx="0" cy="0"/>
+        </a:xfrm>
+      </p:grpSpPr>
+      <p:sp>
+        <p:nvSpPr>
+          <p:cNvPr id="9" name="TextBox 8">
+            <a:extLst>
+              <a:ext uri="{FF2B5EF4-FFF2-40B4-BE49-F238E27FC236}">
+                <a16:creationId xmlns:a16="http://schemas.microsoft.com/office/drawing/2014/main" id="{FAAC2C86-314D-C84A-A3BF-C8810037B47E}"/>
+              </a:ext>
+            </a:extLst>
+          </p:cNvPr>
+          <p:cNvSpPr txBox="1"/>
+          <p:nvPr/>
+        </p:nvSpPr>
+        <p:spPr>
+          <a:xfrm>
+            <a:off x="1173892" y="420130"/>
+            <a:ext cx="10157254" cy="769441"/>
+          </a:xfrm>
+          <a:prstGeom prst="rect">
+            <a:avLst/>
+          </a:prstGeom>
+          <a:noFill/>
+        </p:spPr>
+        <p:txBody>
+          <a:bodyPr wrap="square" rtlCol="0">
+            <a:spAutoFit/>
+          </a:bodyPr>
+          <a:lstStyle/>
+          <a:p>
+            <a:pPr fontAlgn="ctr"/>
+            <a:r>
+              <a:rPr lang="en-US" sz="4400" dirty="0"/>
+              <a:t>Data Preparation(IP#6) – Logistic Regression</a:t>
+            </a:r>
+          </a:p>
+        </p:txBody>
+      </p:sp>
+      <p:sp>
+        <p:nvSpPr>
+          <p:cNvPr id="2" name="TextBox 1">
+            <a:extLst>
+              <a:ext uri="{FF2B5EF4-FFF2-40B4-BE49-F238E27FC236}">
+                <a16:creationId xmlns:a16="http://schemas.microsoft.com/office/drawing/2014/main" id="{7893E434-ED00-466E-BBDF-6643C0B83A39}"/>
+              </a:ext>
+            </a:extLst>
+          </p:cNvPr>
+          <p:cNvSpPr txBox="1"/>
+          <p:nvPr/>
+        </p:nvSpPr>
+        <p:spPr>
+          <a:xfrm>
+            <a:off x="814812" y="1259455"/>
+            <a:ext cx="10746463" cy="1692771"/>
+          </a:xfrm>
+          <a:prstGeom prst="rect">
+            <a:avLst/>
+          </a:prstGeom>
+          <a:noFill/>
+        </p:spPr>
+        <p:txBody>
+          <a:bodyPr wrap="square" rtlCol="0">
+            <a:spAutoFit/>
+          </a:bodyPr>
+          <a:lstStyle/>
+          <a:p>
+            <a:pPr marL="457200" indent="-457200" defTabSz="914400" eaLnBrk="0" fontAlgn="base" hangingPunct="0">
               <a:spcBef>
                 <a:spcPct val="0"/>
               </a:spcBef>
               <a:spcAft>
                 <a:spcPct val="0"/>
               </a:spcAft>
+              <a:buFont typeface="Arial" panose="020B0604020202020204" pitchFamily="34" charset="0"/>
+              <a:buChar char="•"/>
             </a:pPr>
-            <a:endParaRPr lang="en-US" altLang="en-US" sz="3600" dirty="0"/>
+            <a:r>
+              <a:rPr lang="en-US" sz="3200" dirty="0"/>
+              <a:t>  </a:t>
+            </a:r>
+            <a:endParaRPr lang="en-US" sz="2400" dirty="0"/>
+          </a:p>
+          <a:p>
+            <a:endParaRPr lang="en-US" dirty="0"/>
+          </a:p>
+          <a:p>
+            <a:endParaRPr lang="en-US" dirty="0"/>
+          </a:p>
+          <a:p>
+            <a:endParaRPr lang="en-US" dirty="0"/>
+          </a:p>
+          <a:p>
+            <a:endParaRPr lang="en-US" dirty="0"/>
           </a:p>
         </p:txBody>
       </p:sp>
     </p:spTree>
     <p:extLst>
       <p:ext uri="{BB962C8B-B14F-4D97-AF65-F5344CB8AC3E}">
-        <p14:creationId xmlns:p14="http://schemas.microsoft.com/office/powerpoint/2010/main" val="631803287"/>
+        <p14:creationId xmlns:p14="http://schemas.microsoft.com/office/powerpoint/2010/main" val="507629737"/>
+      </p:ext>
+    </p:extLst>
+  </p:cSld>
+  <p:clrMapOvr>
+    <a:masterClrMapping/>
+  </p:clrMapOvr>
+</p:sld>
+</file>
+
+<file path=ppt/slides/slide19.xml><?xml version="1.0" encoding="utf-8"?>
+<p:sld xmlns:a="http://schemas.openxmlformats.org/drawingml/2006/main" xmlns:r="http://schemas.openxmlformats.org/officeDocument/2006/relationships" xmlns:p="http://schemas.openxmlformats.org/presentationml/2006/main">
+  <p:cSld>
+    <p:spTree>
+      <p:nvGrpSpPr>
+        <p:cNvPr id="1" name=""/>
+        <p:cNvGrpSpPr/>
+        <p:nvPr/>
+      </p:nvGrpSpPr>
+      <p:grpSpPr>
+        <a:xfrm>
+          <a:off x="0" y="0"/>
+          <a:ext cx="0" cy="0"/>
+          <a:chOff x="0" y="0"/>
+          <a:chExt cx="0" cy="0"/>
+        </a:xfrm>
+      </p:grpSpPr>
+      <p:sp>
+        <p:nvSpPr>
+          <p:cNvPr id="9" name="TextBox 8">
+            <a:extLst>
+              <a:ext uri="{FF2B5EF4-FFF2-40B4-BE49-F238E27FC236}">
+                <a16:creationId xmlns:a16="http://schemas.microsoft.com/office/drawing/2014/main" id="{FAAC2C86-314D-C84A-A3BF-C8810037B47E}"/>
+              </a:ext>
+            </a:extLst>
+          </p:cNvPr>
+          <p:cNvSpPr txBox="1"/>
+          <p:nvPr/>
+        </p:nvSpPr>
+        <p:spPr>
+          <a:xfrm>
+            <a:off x="1173892" y="420130"/>
+            <a:ext cx="10157254" cy="769441"/>
+          </a:xfrm>
+          <a:prstGeom prst="rect">
+            <a:avLst/>
+          </a:prstGeom>
+          <a:noFill/>
+        </p:spPr>
+        <p:txBody>
+          <a:bodyPr wrap="square" rtlCol="0">
+            <a:spAutoFit/>
+          </a:bodyPr>
+          <a:lstStyle/>
+          <a:p>
+            <a:pPr fontAlgn="ctr"/>
+            <a:r>
+              <a:rPr lang="en-US" sz="4400" dirty="0"/>
+              <a:t>Predictive Data Analytics(IP#6) – KNN</a:t>
+            </a:r>
+          </a:p>
+        </p:txBody>
+      </p:sp>
+      <p:sp>
+        <p:nvSpPr>
+          <p:cNvPr id="2" name="TextBox 1">
+            <a:extLst>
+              <a:ext uri="{FF2B5EF4-FFF2-40B4-BE49-F238E27FC236}">
+                <a16:creationId xmlns:a16="http://schemas.microsoft.com/office/drawing/2014/main" id="{7893E434-ED00-466E-BBDF-6643C0B83A39}"/>
+              </a:ext>
+            </a:extLst>
+          </p:cNvPr>
+          <p:cNvSpPr txBox="1"/>
+          <p:nvPr/>
+        </p:nvSpPr>
+        <p:spPr>
+          <a:xfrm>
+            <a:off x="814812" y="1259455"/>
+            <a:ext cx="10746463" cy="1200329"/>
+          </a:xfrm>
+          <a:prstGeom prst="rect">
+            <a:avLst/>
+          </a:prstGeom>
+          <a:noFill/>
+        </p:spPr>
+        <p:txBody>
+          <a:bodyPr wrap="square" rtlCol="0">
+            <a:spAutoFit/>
+          </a:bodyPr>
+          <a:lstStyle/>
+          <a:p>
+            <a:endParaRPr lang="en-US" dirty="0"/>
+          </a:p>
+          <a:p>
+            <a:endParaRPr lang="en-US" dirty="0"/>
+          </a:p>
+          <a:p>
+            <a:endParaRPr lang="en-US" dirty="0"/>
+          </a:p>
+          <a:p>
+            <a:endParaRPr lang="en-US" dirty="0"/>
+          </a:p>
+        </p:txBody>
+      </p:sp>
+    </p:spTree>
+    <p:extLst>
+      <p:ext uri="{BB962C8B-B14F-4D97-AF65-F5344CB8AC3E}">
+        <p14:creationId xmlns:p14="http://schemas.microsoft.com/office/powerpoint/2010/main" val="1860435743"/>
       </p:ext>
     </p:extLst>
   </p:cSld>
@@ -25125,6 +25555,290 @@
     <p:extLst>
       <p:ext uri="{BB962C8B-B14F-4D97-AF65-F5344CB8AC3E}">
         <p14:creationId xmlns:p14="http://schemas.microsoft.com/office/powerpoint/2010/main" val="1020259238"/>
+      </p:ext>
+    </p:extLst>
+  </p:cSld>
+  <p:clrMapOvr>
+    <a:masterClrMapping/>
+  </p:clrMapOvr>
+</p:sld>
+</file>
+
+<file path=ppt/slides/slide20.xml><?xml version="1.0" encoding="utf-8"?>
+<p:sld xmlns:a="http://schemas.openxmlformats.org/drawingml/2006/main" xmlns:r="http://schemas.openxmlformats.org/officeDocument/2006/relationships" xmlns:p="http://schemas.openxmlformats.org/presentationml/2006/main">
+  <p:cSld>
+    <p:spTree>
+      <p:nvGrpSpPr>
+        <p:cNvPr id="1" name=""/>
+        <p:cNvGrpSpPr/>
+        <p:nvPr/>
+      </p:nvGrpSpPr>
+      <p:grpSpPr>
+        <a:xfrm>
+          <a:off x="0" y="0"/>
+          <a:ext cx="0" cy="0"/>
+          <a:chOff x="0" y="0"/>
+          <a:chExt cx="0" cy="0"/>
+        </a:xfrm>
+      </p:grpSpPr>
+      <p:sp>
+        <p:nvSpPr>
+          <p:cNvPr id="9" name="TextBox 8">
+            <a:extLst>
+              <a:ext uri="{FF2B5EF4-FFF2-40B4-BE49-F238E27FC236}">
+                <a16:creationId xmlns:a16="http://schemas.microsoft.com/office/drawing/2014/main" id="{FAAC2C86-314D-C84A-A3BF-C8810037B47E}"/>
+              </a:ext>
+            </a:extLst>
+          </p:cNvPr>
+          <p:cNvSpPr txBox="1"/>
+          <p:nvPr/>
+        </p:nvSpPr>
+        <p:spPr>
+          <a:xfrm>
+            <a:off x="1173892" y="420130"/>
+            <a:ext cx="10157254" cy="769441"/>
+          </a:xfrm>
+          <a:prstGeom prst="rect">
+            <a:avLst/>
+          </a:prstGeom>
+          <a:noFill/>
+        </p:spPr>
+        <p:txBody>
+          <a:bodyPr wrap="square" rtlCol="0">
+            <a:spAutoFit/>
+          </a:bodyPr>
+          <a:lstStyle/>
+          <a:p>
+            <a:pPr fontAlgn="ctr"/>
+            <a:r>
+              <a:rPr lang="en-US" sz="4400" dirty="0"/>
+              <a:t>Predictive Data Analytics(IP#6) – Conclusion</a:t>
+            </a:r>
+          </a:p>
+        </p:txBody>
+      </p:sp>
+      <p:sp>
+        <p:nvSpPr>
+          <p:cNvPr id="2" name="TextBox 1">
+            <a:extLst>
+              <a:ext uri="{FF2B5EF4-FFF2-40B4-BE49-F238E27FC236}">
+                <a16:creationId xmlns:a16="http://schemas.microsoft.com/office/drawing/2014/main" id="{7893E434-ED00-466E-BBDF-6643C0B83A39}"/>
+              </a:ext>
+            </a:extLst>
+          </p:cNvPr>
+          <p:cNvSpPr txBox="1"/>
+          <p:nvPr/>
+        </p:nvSpPr>
+        <p:spPr>
+          <a:xfrm>
+            <a:off x="814812" y="1259455"/>
+            <a:ext cx="10746463" cy="1200329"/>
+          </a:xfrm>
+          <a:prstGeom prst="rect">
+            <a:avLst/>
+          </a:prstGeom>
+          <a:noFill/>
+        </p:spPr>
+        <p:txBody>
+          <a:bodyPr wrap="square" rtlCol="0">
+            <a:spAutoFit/>
+          </a:bodyPr>
+          <a:lstStyle/>
+          <a:p>
+            <a:endParaRPr lang="en-US" dirty="0"/>
+          </a:p>
+          <a:p>
+            <a:endParaRPr lang="en-US" dirty="0"/>
+          </a:p>
+          <a:p>
+            <a:endParaRPr lang="en-US" dirty="0"/>
+          </a:p>
+          <a:p>
+            <a:endParaRPr lang="en-US" dirty="0"/>
+          </a:p>
+        </p:txBody>
+      </p:sp>
+    </p:spTree>
+    <p:extLst>
+      <p:ext uri="{BB962C8B-B14F-4D97-AF65-F5344CB8AC3E}">
+        <p14:creationId xmlns:p14="http://schemas.microsoft.com/office/powerpoint/2010/main" val="2467964634"/>
+      </p:ext>
+    </p:extLst>
+  </p:cSld>
+  <p:clrMapOvr>
+    <a:masterClrMapping/>
+  </p:clrMapOvr>
+</p:sld>
+</file>
+
+<file path=ppt/slides/slide21.xml><?xml version="1.0" encoding="utf-8"?>
+<p:sld xmlns:a="http://schemas.openxmlformats.org/drawingml/2006/main" xmlns:r="http://schemas.openxmlformats.org/officeDocument/2006/relationships" xmlns:p="http://schemas.openxmlformats.org/presentationml/2006/main">
+  <p:cSld>
+    <p:spTree>
+      <p:nvGrpSpPr>
+        <p:cNvPr id="1" name=""/>
+        <p:cNvGrpSpPr/>
+        <p:nvPr/>
+      </p:nvGrpSpPr>
+      <p:grpSpPr>
+        <a:xfrm>
+          <a:off x="0" y="0"/>
+          <a:ext cx="0" cy="0"/>
+          <a:chOff x="0" y="0"/>
+          <a:chExt cx="0" cy="0"/>
+        </a:xfrm>
+      </p:grpSpPr>
+      <p:sp>
+        <p:nvSpPr>
+          <p:cNvPr id="9" name="TextBox 8">
+            <a:extLst>
+              <a:ext uri="{FF2B5EF4-FFF2-40B4-BE49-F238E27FC236}">
+                <a16:creationId xmlns:a16="http://schemas.microsoft.com/office/drawing/2014/main" id="{FAAC2C86-314D-C84A-A3BF-C8810037B47E}"/>
+              </a:ext>
+            </a:extLst>
+          </p:cNvPr>
+          <p:cNvSpPr txBox="1"/>
+          <p:nvPr/>
+        </p:nvSpPr>
+        <p:spPr>
+          <a:xfrm>
+            <a:off x="1173892" y="420130"/>
+            <a:ext cx="10157254" cy="769441"/>
+          </a:xfrm>
+          <a:prstGeom prst="rect">
+            <a:avLst/>
+          </a:prstGeom>
+          <a:noFill/>
+        </p:spPr>
+        <p:txBody>
+          <a:bodyPr wrap="square" rtlCol="0">
+            <a:spAutoFit/>
+          </a:bodyPr>
+          <a:lstStyle/>
+          <a:p>
+            <a:pPr fontAlgn="ctr"/>
+            <a:r>
+              <a:rPr lang="en-US" sz="4400" dirty="0"/>
+              <a:t>Links</a:t>
+            </a:r>
+          </a:p>
+        </p:txBody>
+      </p:sp>
+      <p:sp>
+        <p:nvSpPr>
+          <p:cNvPr id="6" name="TextBox 5">
+            <a:extLst>
+              <a:ext uri="{FF2B5EF4-FFF2-40B4-BE49-F238E27FC236}">
+                <a16:creationId xmlns:a16="http://schemas.microsoft.com/office/drawing/2014/main" id="{CE7BF1D4-5981-DE45-A564-E16ED6CC1451}"/>
+              </a:ext>
+            </a:extLst>
+          </p:cNvPr>
+          <p:cNvSpPr txBox="1"/>
+          <p:nvPr/>
+        </p:nvSpPr>
+        <p:spPr>
+          <a:xfrm>
+            <a:off x="1173892" y="1189571"/>
+            <a:ext cx="10095471" cy="2308324"/>
+          </a:xfrm>
+          <a:prstGeom prst="rect">
+            <a:avLst/>
+          </a:prstGeom>
+          <a:noFill/>
+        </p:spPr>
+        <p:txBody>
+          <a:bodyPr wrap="square" rtlCol="0">
+            <a:spAutoFit/>
+          </a:bodyPr>
+          <a:lstStyle/>
+          <a:p>
+            <a:pPr marL="571500" indent="-571500" defTabSz="914400" eaLnBrk="0" fontAlgn="base" hangingPunct="0">
+              <a:spcBef>
+                <a:spcPct val="0"/>
+              </a:spcBef>
+              <a:spcAft>
+                <a:spcPct val="0"/>
+              </a:spcAft>
+              <a:buFont typeface="Arial" panose="020B0604020202020204" pitchFamily="34" charset="0"/>
+              <a:buChar char="•"/>
+            </a:pPr>
+            <a:r>
+              <a:rPr lang="en-US" altLang="en-US" sz="3200" dirty="0"/>
+              <a:t>Code: https://</a:t>
+            </a:r>
+            <a:r>
+              <a:rPr lang="en-US" altLang="en-US" sz="3200" dirty="0" err="1"/>
+              <a:t>github.com</a:t>
+            </a:r>
+            <a:r>
+              <a:rPr lang="en-US" altLang="en-US" sz="3200" dirty="0"/>
+              <a:t>/</a:t>
+            </a:r>
+            <a:r>
+              <a:rPr lang="en-US" altLang="en-US" sz="3200" dirty="0" err="1"/>
+              <a:t>billyean</a:t>
+            </a:r>
+            <a:r>
+              <a:rPr lang="en-US" altLang="en-US" sz="3200" dirty="0"/>
+              <a:t>/anna</a:t>
+            </a:r>
+          </a:p>
+          <a:p>
+            <a:pPr marL="1028700" lvl="1" indent="-571500" defTabSz="914400" eaLnBrk="0" fontAlgn="base" hangingPunct="0">
+              <a:spcBef>
+                <a:spcPct val="0"/>
+              </a:spcBef>
+              <a:spcAft>
+                <a:spcPct val="0"/>
+              </a:spcAft>
+              <a:buFont typeface="Arial" panose="020B0604020202020204" pitchFamily="34" charset="0"/>
+              <a:buChar char="•"/>
+            </a:pPr>
+            <a:endParaRPr lang="en-US" altLang="en-US" sz="2000" dirty="0"/>
+          </a:p>
+          <a:p>
+            <a:pPr marL="571500" indent="-571500" defTabSz="914400" eaLnBrk="0" fontAlgn="base" hangingPunct="0">
+              <a:spcBef>
+                <a:spcPct val="0"/>
+              </a:spcBef>
+              <a:spcAft>
+                <a:spcPct val="0"/>
+              </a:spcAft>
+              <a:buFont typeface="Arial" panose="020B0604020202020204" pitchFamily="34" charset="0"/>
+              <a:buChar char="•"/>
+            </a:pPr>
+            <a:endParaRPr lang="en-US" altLang="en-US" sz="3200" dirty="0"/>
+          </a:p>
+          <a:p>
+            <a:pPr marL="571500" indent="-571500" defTabSz="914400" eaLnBrk="0" fontAlgn="base" hangingPunct="0">
+              <a:spcBef>
+                <a:spcPct val="0"/>
+              </a:spcBef>
+              <a:spcAft>
+                <a:spcPct val="0"/>
+              </a:spcAft>
+              <a:buFont typeface="Arial" panose="020B0604020202020204" pitchFamily="34" charset="0"/>
+              <a:buChar char="•"/>
+            </a:pPr>
+            <a:endParaRPr lang="en-US" altLang="en-US" sz="2400" dirty="0"/>
+          </a:p>
+          <a:p>
+            <a:pPr lvl="0" defTabSz="914400" eaLnBrk="0" fontAlgn="base" hangingPunct="0">
+              <a:spcBef>
+                <a:spcPct val="0"/>
+              </a:spcBef>
+              <a:spcAft>
+                <a:spcPct val="0"/>
+              </a:spcAft>
+            </a:pPr>
+            <a:endParaRPr lang="en-US" altLang="en-US" sz="3600" dirty="0"/>
+          </a:p>
+        </p:txBody>
+      </p:sp>
+    </p:spTree>
+    <p:extLst>
+      <p:ext uri="{BB962C8B-B14F-4D97-AF65-F5344CB8AC3E}">
+        <p14:creationId xmlns:p14="http://schemas.microsoft.com/office/powerpoint/2010/main" val="631803287"/>
       </p:ext>
     </p:extLst>
   </p:cSld>

</xml_diff>

<commit_message>
Update Data Analytics and Information Virtualization Project.pptx
</commit_message>
<xml_diff>
--- a/Data Analytics and Information Virtualization Project.pptx
+++ b/Data Analytics and Information Virtualization Project.pptx
@@ -182,7 +182,7 @@
           <a:noFill/>
           <a:extLst>
             <a:ext uri="{909E8E84-426E-40dd-AFC4-6F175D3DCCD1}">
-              <a14:hiddenFill xmlns="" xmlns:a14="http://schemas.microsoft.com/office/drawing/2010/main">
+              <a14:hiddenFill xmlns:a14="http://schemas.microsoft.com/office/drawing/2010/main" xmlns="">
                 <a:solidFill>
                   <a:srgbClr val="FFFFFF"/>
                 </a:solidFill>
@@ -242,7 +242,7 @@
             </a:ln>
             <a:extLst>
               <a:ext uri="{91240B29-F687-4f45-9708-019B960494DF}">
-                <a14:hiddenLine xmlns="" xmlns:a14="http://schemas.microsoft.com/office/drawing/2010/main" w="9525">
+                <a14:hiddenLine xmlns:a14="http://schemas.microsoft.com/office/drawing/2010/main" xmlns="" w="9525">
                   <a:solidFill>
                     <a:srgbClr val="000000"/>
                   </a:solidFill>
@@ -332,7 +332,7 @@
             </a:ln>
             <a:extLst>
               <a:ext uri="{91240B29-F687-4f45-9708-019B960494DF}">
-                <a14:hiddenLine xmlns="" xmlns:a14="http://schemas.microsoft.com/office/drawing/2010/main" w="9525">
+                <a14:hiddenLine xmlns:a14="http://schemas.microsoft.com/office/drawing/2010/main" xmlns="" w="9525">
                   <a:solidFill>
                     <a:srgbClr val="000000"/>
                   </a:solidFill>
@@ -422,7 +422,7 @@
             </a:ln>
             <a:extLst>
               <a:ext uri="{91240B29-F687-4f45-9708-019B960494DF}">
-                <a14:hiddenLine xmlns="" xmlns:a14="http://schemas.microsoft.com/office/drawing/2010/main" w="9525">
+                <a14:hiddenLine xmlns:a14="http://schemas.microsoft.com/office/drawing/2010/main" xmlns="" w="9525">
                   <a:solidFill>
                     <a:srgbClr val="000000"/>
                   </a:solidFill>
@@ -456,7 +456,7 @@
             </a:ln>
             <a:extLst>
               <a:ext uri="{91240B29-F687-4f45-9708-019B960494DF}">
-                <a14:hiddenLine xmlns="" xmlns:a14="http://schemas.microsoft.com/office/drawing/2010/main" w="9525">
+                <a14:hiddenLine xmlns:a14="http://schemas.microsoft.com/office/drawing/2010/main" xmlns="" w="9525">
                   <a:solidFill>
                     <a:srgbClr val="000000"/>
                   </a:solidFill>
@@ -546,7 +546,7 @@
             </a:ln>
             <a:extLst>
               <a:ext uri="{91240B29-F687-4f45-9708-019B960494DF}">
-                <a14:hiddenLine xmlns="" xmlns:a14="http://schemas.microsoft.com/office/drawing/2010/main" w="9525">
+                <a14:hiddenLine xmlns:a14="http://schemas.microsoft.com/office/drawing/2010/main" xmlns="" w="9525">
                   <a:solidFill>
                     <a:srgbClr val="000000"/>
                   </a:solidFill>
@@ -608,7 +608,7 @@
             </a:ln>
             <a:extLst>
               <a:ext uri="{91240B29-F687-4f45-9708-019B960494DF}">
-                <a14:hiddenLine xmlns="" xmlns:a14="http://schemas.microsoft.com/office/drawing/2010/main" w="9525">
+                <a14:hiddenLine xmlns:a14="http://schemas.microsoft.com/office/drawing/2010/main" xmlns="" w="9525">
                   <a:solidFill>
                     <a:srgbClr val="000000"/>
                   </a:solidFill>
@@ -670,7 +670,7 @@
             </a:ln>
             <a:extLst>
               <a:ext uri="{91240B29-F687-4f45-9708-019B960494DF}">
-                <a14:hiddenLine xmlns="" xmlns:a14="http://schemas.microsoft.com/office/drawing/2010/main" w="9525">
+                <a14:hiddenLine xmlns:a14="http://schemas.microsoft.com/office/drawing/2010/main" xmlns="" w="9525">
                   <a:solidFill>
                     <a:srgbClr val="000000"/>
                   </a:solidFill>
@@ -760,7 +760,7 @@
             </a:ln>
             <a:extLst>
               <a:ext uri="{91240B29-F687-4f45-9708-019B960494DF}">
-                <a14:hiddenLine xmlns="" xmlns:a14="http://schemas.microsoft.com/office/drawing/2010/main" w="9525">
+                <a14:hiddenLine xmlns:a14="http://schemas.microsoft.com/office/drawing/2010/main" xmlns="" w="9525">
                   <a:solidFill>
                     <a:srgbClr val="000000"/>
                   </a:solidFill>
@@ -822,7 +822,7 @@
             </a:ln>
             <a:extLst>
               <a:ext uri="{91240B29-F687-4f45-9708-019B960494DF}">
-                <a14:hiddenLine xmlns="" xmlns:a14="http://schemas.microsoft.com/office/drawing/2010/main" w="9525">
+                <a14:hiddenLine xmlns:a14="http://schemas.microsoft.com/office/drawing/2010/main" xmlns="" w="9525">
                   <a:solidFill>
                     <a:srgbClr val="000000"/>
                   </a:solidFill>
@@ -884,7 +884,7 @@
             </a:ln>
             <a:extLst>
               <a:ext uri="{91240B29-F687-4f45-9708-019B960494DF}">
-                <a14:hiddenLine xmlns="" xmlns:a14="http://schemas.microsoft.com/office/drawing/2010/main" w="9525">
+                <a14:hiddenLine xmlns:a14="http://schemas.microsoft.com/office/drawing/2010/main" xmlns="" w="9525">
                   <a:solidFill>
                     <a:srgbClr val="000000"/>
                   </a:solidFill>
@@ -974,7 +974,7 @@
             </a:ln>
             <a:extLst>
               <a:ext uri="{91240B29-F687-4f45-9708-019B960494DF}">
-                <a14:hiddenLine xmlns="" xmlns:a14="http://schemas.microsoft.com/office/drawing/2010/main" w="9525">
+                <a14:hiddenLine xmlns:a14="http://schemas.microsoft.com/office/drawing/2010/main" xmlns="" w="9525">
                   <a:solidFill>
                     <a:srgbClr val="000000"/>
                   </a:solidFill>
@@ -1064,7 +1064,7 @@
             </a:ln>
             <a:extLst>
               <a:ext uri="{91240B29-F687-4f45-9708-019B960494DF}">
-                <a14:hiddenLine xmlns="" xmlns:a14="http://schemas.microsoft.com/office/drawing/2010/main" w="9525">
+                <a14:hiddenLine xmlns:a14="http://schemas.microsoft.com/office/drawing/2010/main" xmlns="" w="9525">
                   <a:solidFill>
                     <a:srgbClr val="000000"/>
                   </a:solidFill>
@@ -1126,7 +1126,7 @@
             </a:ln>
             <a:extLst>
               <a:ext uri="{91240B29-F687-4f45-9708-019B960494DF}">
-                <a14:hiddenLine xmlns="" xmlns:a14="http://schemas.microsoft.com/office/drawing/2010/main" w="9525">
+                <a14:hiddenLine xmlns:a14="http://schemas.microsoft.com/office/drawing/2010/main" xmlns="" w="9525">
                   <a:solidFill>
                     <a:srgbClr val="000000"/>
                   </a:solidFill>
@@ -1236,7 +1236,7 @@
             </a:ln>
             <a:extLst>
               <a:ext uri="{91240B29-F687-4f45-9708-019B960494DF}">
-                <a14:hiddenLine xmlns="" xmlns:a14="http://schemas.microsoft.com/office/drawing/2010/main" w="9525">
+                <a14:hiddenLine xmlns:a14="http://schemas.microsoft.com/office/drawing/2010/main" xmlns="" w="9525">
                   <a:solidFill>
                     <a:srgbClr val="000000"/>
                   </a:solidFill>
@@ -1298,7 +1298,7 @@
             </a:ln>
             <a:extLst>
               <a:ext uri="{91240B29-F687-4f45-9708-019B960494DF}">
-                <a14:hiddenLine xmlns="" xmlns:a14="http://schemas.microsoft.com/office/drawing/2010/main" w="9525">
+                <a14:hiddenLine xmlns:a14="http://schemas.microsoft.com/office/drawing/2010/main" xmlns="" w="9525">
                   <a:solidFill>
                     <a:srgbClr val="000000"/>
                   </a:solidFill>
@@ -1388,7 +1388,7 @@
             </a:ln>
             <a:extLst>
               <a:ext uri="{91240B29-F687-4f45-9708-019B960494DF}">
-                <a14:hiddenLine xmlns="" xmlns:a14="http://schemas.microsoft.com/office/drawing/2010/main" w="9525">
+                <a14:hiddenLine xmlns:a14="http://schemas.microsoft.com/office/drawing/2010/main" xmlns="" w="9525">
                   <a:solidFill>
                     <a:srgbClr val="000000"/>
                   </a:solidFill>
@@ -1478,7 +1478,7 @@
             </a:ln>
             <a:extLst>
               <a:ext uri="{91240B29-F687-4f45-9708-019B960494DF}">
-                <a14:hiddenLine xmlns="" xmlns:a14="http://schemas.microsoft.com/office/drawing/2010/main" w="9525">
+                <a14:hiddenLine xmlns:a14="http://schemas.microsoft.com/office/drawing/2010/main" xmlns="" w="9525">
                   <a:solidFill>
                     <a:srgbClr val="000000"/>
                   </a:solidFill>
@@ -1540,7 +1540,7 @@
             </a:ln>
             <a:extLst>
               <a:ext uri="{91240B29-F687-4f45-9708-019B960494DF}">
-                <a14:hiddenLine xmlns="" xmlns:a14="http://schemas.microsoft.com/office/drawing/2010/main" w="9525">
+                <a14:hiddenLine xmlns:a14="http://schemas.microsoft.com/office/drawing/2010/main" xmlns="" w="9525">
                   <a:solidFill>
                     <a:srgbClr val="000000"/>
                   </a:solidFill>
@@ -1630,7 +1630,7 @@
             </a:ln>
             <a:extLst>
               <a:ext uri="{91240B29-F687-4f45-9708-019B960494DF}">
-                <a14:hiddenLine xmlns="" xmlns:a14="http://schemas.microsoft.com/office/drawing/2010/main" w="9525">
+                <a14:hiddenLine xmlns:a14="http://schemas.microsoft.com/office/drawing/2010/main" xmlns="" w="9525">
                   <a:solidFill>
                     <a:srgbClr val="000000"/>
                   </a:solidFill>
@@ -1720,7 +1720,7 @@
             </a:ln>
             <a:extLst>
               <a:ext uri="{91240B29-F687-4f45-9708-019B960494DF}">
-                <a14:hiddenLine xmlns="" xmlns:a14="http://schemas.microsoft.com/office/drawing/2010/main" w="9525">
+                <a14:hiddenLine xmlns:a14="http://schemas.microsoft.com/office/drawing/2010/main" xmlns="" w="9525">
                   <a:solidFill>
                     <a:srgbClr val="000000"/>
                   </a:solidFill>
@@ -1776,7 +1776,7 @@
             </a:ln>
             <a:extLst>
               <a:ext uri="{91240B29-F687-4f45-9708-019B960494DF}">
-                <a14:hiddenLine xmlns="" xmlns:a14="http://schemas.microsoft.com/office/drawing/2010/main" w="9525">
+                <a14:hiddenLine xmlns:a14="http://schemas.microsoft.com/office/drawing/2010/main" xmlns="" w="9525">
                   <a:solidFill>
                     <a:srgbClr val="000000"/>
                   </a:solidFill>
@@ -1866,7 +1866,7 @@
             </a:ln>
             <a:extLst>
               <a:ext uri="{91240B29-F687-4f45-9708-019B960494DF}">
-                <a14:hiddenLine xmlns="" xmlns:a14="http://schemas.microsoft.com/office/drawing/2010/main" w="9525">
+                <a14:hiddenLine xmlns:a14="http://schemas.microsoft.com/office/drawing/2010/main" xmlns="" w="9525">
                   <a:solidFill>
                     <a:srgbClr val="000000"/>
                   </a:solidFill>
@@ -1922,7 +1922,7 @@
             </a:ln>
             <a:extLst>
               <a:ext uri="{91240B29-F687-4f45-9708-019B960494DF}">
-                <a14:hiddenLine xmlns="" xmlns:a14="http://schemas.microsoft.com/office/drawing/2010/main" w="9525">
+                <a14:hiddenLine xmlns:a14="http://schemas.microsoft.com/office/drawing/2010/main" xmlns="" w="9525">
                   <a:solidFill>
                     <a:srgbClr val="000000"/>
                   </a:solidFill>
@@ -2012,7 +2012,7 @@
             </a:ln>
             <a:extLst>
               <a:ext uri="{91240B29-F687-4f45-9708-019B960494DF}">
-                <a14:hiddenLine xmlns="" xmlns:a14="http://schemas.microsoft.com/office/drawing/2010/main" w="9525">
+                <a14:hiddenLine xmlns:a14="http://schemas.microsoft.com/office/drawing/2010/main" xmlns="" w="9525">
                   <a:solidFill>
                     <a:srgbClr val="000000"/>
                   </a:solidFill>
@@ -2080,7 +2080,7 @@
             </a:ln>
             <a:extLst>
               <a:ext uri="{91240B29-F687-4f45-9708-019B960494DF}">
-                <a14:hiddenLine xmlns="" xmlns:a14="http://schemas.microsoft.com/office/drawing/2010/main" w="9525">
+                <a14:hiddenLine xmlns:a14="http://schemas.microsoft.com/office/drawing/2010/main" xmlns="" w="9525">
                   <a:solidFill>
                     <a:srgbClr val="000000"/>
                   </a:solidFill>
@@ -2170,7 +2170,7 @@
             </a:ln>
             <a:extLst>
               <a:ext uri="{91240B29-F687-4f45-9708-019B960494DF}">
-                <a14:hiddenLine xmlns="" xmlns:a14="http://schemas.microsoft.com/office/drawing/2010/main" w="9525">
+                <a14:hiddenLine xmlns:a14="http://schemas.microsoft.com/office/drawing/2010/main" xmlns="" w="9525">
                   <a:solidFill>
                     <a:srgbClr val="000000"/>
                   </a:solidFill>
@@ -2238,7 +2238,7 @@
             </a:ln>
             <a:extLst>
               <a:ext uri="{91240B29-F687-4f45-9708-019B960494DF}">
-                <a14:hiddenLine xmlns="" xmlns:a14="http://schemas.microsoft.com/office/drawing/2010/main" w="9525">
+                <a14:hiddenLine xmlns:a14="http://schemas.microsoft.com/office/drawing/2010/main" xmlns="" w="9525">
                   <a:solidFill>
                     <a:srgbClr val="000000"/>
                   </a:solidFill>
@@ -2328,7 +2328,7 @@
             </a:ln>
             <a:extLst>
               <a:ext uri="{91240B29-F687-4f45-9708-019B960494DF}">
-                <a14:hiddenLine xmlns="" xmlns:a14="http://schemas.microsoft.com/office/drawing/2010/main" w="9525">
+                <a14:hiddenLine xmlns:a14="http://schemas.microsoft.com/office/drawing/2010/main" xmlns="" w="9525">
                   <a:solidFill>
                     <a:srgbClr val="000000"/>
                   </a:solidFill>
@@ -2362,7 +2362,7 @@
             </a:ln>
             <a:extLst>
               <a:ext uri="{91240B29-F687-4f45-9708-019B960494DF}">
-                <a14:hiddenLine xmlns="" xmlns:a14="http://schemas.microsoft.com/office/drawing/2010/main" w="9525">
+                <a14:hiddenLine xmlns:a14="http://schemas.microsoft.com/office/drawing/2010/main" xmlns="" w="9525">
                   <a:solidFill>
                     <a:srgbClr val="000000"/>
                   </a:solidFill>
@@ -2452,7 +2452,7 @@
             </a:ln>
             <a:extLst>
               <a:ext uri="{91240B29-F687-4f45-9708-019B960494DF}">
-                <a14:hiddenLine xmlns="" xmlns:a14="http://schemas.microsoft.com/office/drawing/2010/main" w="9525">
+                <a14:hiddenLine xmlns:a14="http://schemas.microsoft.com/office/drawing/2010/main" xmlns="" w="9525">
                   <a:solidFill>
                     <a:srgbClr val="000000"/>
                   </a:solidFill>
@@ -2514,7 +2514,7 @@
             </a:ln>
             <a:extLst>
               <a:ext uri="{91240B29-F687-4f45-9708-019B960494DF}">
-                <a14:hiddenLine xmlns="" xmlns:a14="http://schemas.microsoft.com/office/drawing/2010/main" w="9525">
+                <a14:hiddenLine xmlns:a14="http://schemas.microsoft.com/office/drawing/2010/main" xmlns="" w="9525">
                   <a:solidFill>
                     <a:srgbClr val="000000"/>
                   </a:solidFill>
@@ -2576,7 +2576,7 @@
             </a:ln>
             <a:extLst>
               <a:ext uri="{91240B29-F687-4f45-9708-019B960494DF}">
-                <a14:hiddenLine xmlns="" xmlns:a14="http://schemas.microsoft.com/office/drawing/2010/main" w="9525">
+                <a14:hiddenLine xmlns:a14="http://schemas.microsoft.com/office/drawing/2010/main" xmlns="" w="9525">
                   <a:solidFill>
                     <a:srgbClr val="000000"/>
                   </a:solidFill>
@@ -2666,7 +2666,7 @@
             </a:ln>
             <a:extLst>
               <a:ext uri="{91240B29-F687-4f45-9708-019B960494DF}">
-                <a14:hiddenLine xmlns="" xmlns:a14="http://schemas.microsoft.com/office/drawing/2010/main" w="9525">
+                <a14:hiddenLine xmlns:a14="http://schemas.microsoft.com/office/drawing/2010/main" xmlns="" w="9525">
                   <a:solidFill>
                     <a:srgbClr val="000000"/>
                   </a:solidFill>
@@ -2734,7 +2734,7 @@
             </a:ln>
             <a:extLst>
               <a:ext uri="{91240B29-F687-4f45-9708-019B960494DF}">
-                <a14:hiddenLine xmlns="" xmlns:a14="http://schemas.microsoft.com/office/drawing/2010/main" w="9525">
+                <a14:hiddenLine xmlns:a14="http://schemas.microsoft.com/office/drawing/2010/main" xmlns="" w="9525">
                   <a:solidFill>
                     <a:srgbClr val="000000"/>
                   </a:solidFill>
@@ -2796,7 +2796,7 @@
             </a:ln>
             <a:extLst>
               <a:ext uri="{91240B29-F687-4f45-9708-019B960494DF}">
-                <a14:hiddenLine xmlns="" xmlns:a14="http://schemas.microsoft.com/office/drawing/2010/main" w="9525">
+                <a14:hiddenLine xmlns:a14="http://schemas.microsoft.com/office/drawing/2010/main" xmlns="" w="9525">
                   <a:solidFill>
                     <a:srgbClr val="000000"/>
                   </a:solidFill>
@@ -2886,7 +2886,7 @@
             </a:ln>
             <a:extLst>
               <a:ext uri="{91240B29-F687-4f45-9708-019B960494DF}">
-                <a14:hiddenLine xmlns="" xmlns:a14="http://schemas.microsoft.com/office/drawing/2010/main" w="9525">
+                <a14:hiddenLine xmlns:a14="http://schemas.microsoft.com/office/drawing/2010/main" xmlns="" w="9525">
                   <a:solidFill>
                     <a:srgbClr val="000000"/>
                   </a:solidFill>
@@ -2948,7 +2948,7 @@
             </a:ln>
             <a:extLst>
               <a:ext uri="{91240B29-F687-4f45-9708-019B960494DF}">
-                <a14:hiddenLine xmlns="" xmlns:a14="http://schemas.microsoft.com/office/drawing/2010/main" w="9525">
+                <a14:hiddenLine xmlns:a14="http://schemas.microsoft.com/office/drawing/2010/main" xmlns="" w="9525">
                   <a:solidFill>
                     <a:srgbClr val="000000"/>
                   </a:solidFill>
@@ -3038,7 +3038,7 @@
             </a:ln>
             <a:extLst>
               <a:ext uri="{91240B29-F687-4f45-9708-019B960494DF}">
-                <a14:hiddenLine xmlns="" xmlns:a14="http://schemas.microsoft.com/office/drawing/2010/main" w="9525">
+                <a14:hiddenLine xmlns:a14="http://schemas.microsoft.com/office/drawing/2010/main" xmlns="" w="9525">
                   <a:solidFill>
                     <a:srgbClr val="000000"/>
                   </a:solidFill>
@@ -3100,7 +3100,7 @@
             </a:ln>
             <a:extLst>
               <a:ext uri="{91240B29-F687-4f45-9708-019B960494DF}">
-                <a14:hiddenLine xmlns="" xmlns:a14="http://schemas.microsoft.com/office/drawing/2010/main" w="9525">
+                <a14:hiddenLine xmlns:a14="http://schemas.microsoft.com/office/drawing/2010/main" xmlns="" w="9525">
                   <a:solidFill>
                     <a:srgbClr val="000000"/>
                   </a:solidFill>
@@ -3190,7 +3190,7 @@
             </a:ln>
             <a:extLst>
               <a:ext uri="{91240B29-F687-4f45-9708-019B960494DF}">
-                <a14:hiddenLine xmlns="" xmlns:a14="http://schemas.microsoft.com/office/drawing/2010/main" w="9525">
+                <a14:hiddenLine xmlns:a14="http://schemas.microsoft.com/office/drawing/2010/main" xmlns="" w="9525">
                   <a:solidFill>
                     <a:srgbClr val="000000"/>
                   </a:solidFill>
@@ -3224,7 +3224,7 @@
             </a:ln>
             <a:extLst>
               <a:ext uri="{91240B29-F687-4f45-9708-019B960494DF}">
-                <a14:hiddenLine xmlns="" xmlns:a14="http://schemas.microsoft.com/office/drawing/2010/main" w="9525">
+                <a14:hiddenLine xmlns:a14="http://schemas.microsoft.com/office/drawing/2010/main" xmlns="" w="9525">
                   <a:solidFill>
                     <a:srgbClr val="000000"/>
                   </a:solidFill>
@@ -3289,7 +3289,7 @@
             </a:ln>
             <a:extLst>
               <a:ext uri="{91240B29-F687-4f45-9708-019B960494DF}">
-                <a14:hiddenLine xmlns="" xmlns:a14="http://schemas.microsoft.com/office/drawing/2010/main" w="9525">
+                <a14:hiddenLine xmlns:a14="http://schemas.microsoft.com/office/drawing/2010/main" xmlns="" w="9525">
                   <a:solidFill>
                     <a:srgbClr val="000000"/>
                   </a:solidFill>
@@ -3379,7 +3379,7 @@
             </a:ln>
             <a:extLst>
               <a:ext uri="{91240B29-F687-4f45-9708-019B960494DF}">
-                <a14:hiddenLine xmlns="" xmlns:a14="http://schemas.microsoft.com/office/drawing/2010/main" w="9525">
+                <a14:hiddenLine xmlns:a14="http://schemas.microsoft.com/office/drawing/2010/main" xmlns="" w="9525">
                   <a:solidFill>
                     <a:srgbClr val="000000"/>
                   </a:solidFill>
@@ -3441,7 +3441,7 @@
             </a:ln>
             <a:extLst>
               <a:ext uri="{91240B29-F687-4f45-9708-019B960494DF}">
-                <a14:hiddenLine xmlns="" xmlns:a14="http://schemas.microsoft.com/office/drawing/2010/main" w="9525">
+                <a14:hiddenLine xmlns:a14="http://schemas.microsoft.com/office/drawing/2010/main" xmlns="" w="9525">
                   <a:solidFill>
                     <a:srgbClr val="000000"/>
                   </a:solidFill>
@@ -3531,7 +3531,7 @@
             </a:ln>
             <a:extLst>
               <a:ext uri="{91240B29-F687-4f45-9708-019B960494DF}">
-                <a14:hiddenLine xmlns="" xmlns:a14="http://schemas.microsoft.com/office/drawing/2010/main" w="9525">
+                <a14:hiddenLine xmlns:a14="http://schemas.microsoft.com/office/drawing/2010/main" xmlns="" w="9525">
                   <a:solidFill>
                     <a:srgbClr val="000000"/>
                   </a:solidFill>
@@ -3621,7 +3621,7 @@
             </a:ln>
             <a:extLst>
               <a:ext uri="{91240B29-F687-4f45-9708-019B960494DF}">
-                <a14:hiddenLine xmlns="" xmlns:a14="http://schemas.microsoft.com/office/drawing/2010/main" w="9525">
+                <a14:hiddenLine xmlns:a14="http://schemas.microsoft.com/office/drawing/2010/main" xmlns="" w="9525">
                   <a:solidFill>
                     <a:srgbClr val="000000"/>
                   </a:solidFill>
@@ -3686,7 +3686,7 @@
             </a:ln>
             <a:extLst>
               <a:ext uri="{91240B29-F687-4f45-9708-019B960494DF}">
-                <a14:hiddenLine xmlns="" xmlns:a14="http://schemas.microsoft.com/office/drawing/2010/main" w="9525">
+                <a14:hiddenLine xmlns:a14="http://schemas.microsoft.com/office/drawing/2010/main" xmlns="" w="9525">
                   <a:solidFill>
                     <a:srgbClr val="000000"/>
                   </a:solidFill>
@@ -3748,7 +3748,7 @@
             </a:ln>
             <a:extLst>
               <a:ext uri="{91240B29-F687-4f45-9708-019B960494DF}">
-                <a14:hiddenLine xmlns="" xmlns:a14="http://schemas.microsoft.com/office/drawing/2010/main" w="9525">
+                <a14:hiddenLine xmlns:a14="http://schemas.microsoft.com/office/drawing/2010/main" xmlns="" w="9525">
                   <a:solidFill>
                     <a:srgbClr val="000000"/>
                   </a:solidFill>
@@ -3838,7 +3838,7 @@
             </a:ln>
             <a:extLst>
               <a:ext uri="{91240B29-F687-4f45-9708-019B960494DF}">
-                <a14:hiddenLine xmlns="" xmlns:a14="http://schemas.microsoft.com/office/drawing/2010/main" w="9525">
+                <a14:hiddenLine xmlns:a14="http://schemas.microsoft.com/office/drawing/2010/main" xmlns="" w="9525">
                   <a:solidFill>
                     <a:srgbClr val="000000"/>
                   </a:solidFill>
@@ -3928,7 +3928,7 @@
             </a:ln>
             <a:extLst>
               <a:ext uri="{91240B29-F687-4f45-9708-019B960494DF}">
-                <a14:hiddenLine xmlns="" xmlns:a14="http://schemas.microsoft.com/office/drawing/2010/main" w="9525">
+                <a14:hiddenLine xmlns:a14="http://schemas.microsoft.com/office/drawing/2010/main" xmlns="" w="9525">
                   <a:solidFill>
                     <a:srgbClr val="000000"/>
                   </a:solidFill>
@@ -3990,7 +3990,7 @@
             </a:ln>
             <a:extLst>
               <a:ext uri="{91240B29-F687-4f45-9708-019B960494DF}">
-                <a14:hiddenLine xmlns="" xmlns:a14="http://schemas.microsoft.com/office/drawing/2010/main" w="9525">
+                <a14:hiddenLine xmlns:a14="http://schemas.microsoft.com/office/drawing/2010/main" xmlns="" w="9525">
                   <a:solidFill>
                     <a:srgbClr val="000000"/>
                   </a:solidFill>
@@ -4110,7 +4110,7 @@
             </a:ln>
             <a:extLst>
               <a:ext uri="{91240B29-F687-4f45-9708-019B960494DF}">
-                <a14:hiddenLine xmlns="" xmlns:a14="http://schemas.microsoft.com/office/drawing/2010/main" w="9525">
+                <a14:hiddenLine xmlns:a14="http://schemas.microsoft.com/office/drawing/2010/main" xmlns="" w="9525">
                   <a:solidFill>
                     <a:srgbClr val="000000"/>
                   </a:solidFill>
@@ -4178,7 +4178,7 @@
             </a:ln>
             <a:extLst>
               <a:ext uri="{91240B29-F687-4f45-9708-019B960494DF}">
-                <a14:hiddenLine xmlns="" xmlns:a14="http://schemas.microsoft.com/office/drawing/2010/main" w="9525">
+                <a14:hiddenLine xmlns:a14="http://schemas.microsoft.com/office/drawing/2010/main" xmlns="" w="9525">
                   <a:solidFill>
                     <a:srgbClr val="000000"/>
                   </a:solidFill>
@@ -4268,7 +4268,7 @@
             </a:ln>
             <a:extLst>
               <a:ext uri="{91240B29-F687-4f45-9708-019B960494DF}">
-                <a14:hiddenLine xmlns="" xmlns:a14="http://schemas.microsoft.com/office/drawing/2010/main" w="9525">
+                <a14:hiddenLine xmlns:a14="http://schemas.microsoft.com/office/drawing/2010/main" xmlns="" w="9525">
                   <a:solidFill>
                     <a:srgbClr val="000000"/>
                   </a:solidFill>
@@ -4408,7 +4408,7 @@
           <a:p>
             <a:fld id="{48A87A34-81AB-432B-8DAE-1953F412C126}" type="datetimeFigureOut">
               <a:rPr lang="en-US" dirty="0"/>
-              <a:t>3/5/2019</a:t>
+              <a:t>3/6/2019</a:t>
             </a:fld>
             <a:endParaRPr lang="en-US" dirty="0"/>
           </a:p>
@@ -4670,7 +4670,7 @@
           <a:p>
             <a:fld id="{48A87A34-81AB-432B-8DAE-1953F412C126}" type="datetimeFigureOut">
               <a:rPr lang="en-US" dirty="0"/>
-              <a:t>3/5/2019</a:t>
+              <a:t>3/6/2019</a:t>
             </a:fld>
             <a:endParaRPr lang="en-US" dirty="0"/>
           </a:p>
@@ -4861,7 +4861,7 @@
           <a:p>
             <a:fld id="{48A87A34-81AB-432B-8DAE-1953F412C126}" type="datetimeFigureOut">
               <a:rPr lang="en-US" dirty="0"/>
-              <a:t>3/5/2019</a:t>
+              <a:t>3/6/2019</a:t>
             </a:fld>
             <a:endParaRPr lang="en-US" dirty="0"/>
           </a:p>
@@ -5119,7 +5119,7 @@
           <a:p>
             <a:fld id="{48A87A34-81AB-432B-8DAE-1953F412C126}" type="datetimeFigureOut">
               <a:rPr lang="en-US" dirty="0"/>
-              <a:t>3/5/2019</a:t>
+              <a:t>3/6/2019</a:t>
             </a:fld>
             <a:endParaRPr lang="en-US" dirty="0"/>
           </a:p>
@@ -5548,7 +5548,7 @@
           <a:p>
             <a:fld id="{48A87A34-81AB-432B-8DAE-1953F412C126}" type="datetimeFigureOut">
               <a:rPr lang="en-US" dirty="0"/>
-              <a:t>3/5/2019</a:t>
+              <a:t>3/6/2019</a:t>
             </a:fld>
             <a:endParaRPr lang="en-US" dirty="0"/>
           </a:p>
@@ -6089,7 +6089,7 @@
           <a:p>
             <a:fld id="{48A87A34-81AB-432B-8DAE-1953F412C126}" type="datetimeFigureOut">
               <a:rPr lang="en-US" dirty="0"/>
-              <a:t>3/5/2019</a:t>
+              <a:t>3/6/2019</a:t>
             </a:fld>
             <a:endParaRPr lang="en-US" dirty="0"/>
           </a:p>
@@ -6804,7 +6804,7 @@
           <a:p>
             <a:fld id="{48A87A34-81AB-432B-8DAE-1953F412C126}" type="datetimeFigureOut">
               <a:rPr lang="en-US" dirty="0"/>
-              <a:t>3/5/2019</a:t>
+              <a:t>3/6/2019</a:t>
             </a:fld>
             <a:endParaRPr lang="en-US" dirty="0"/>
           </a:p>
@@ -6969,7 +6969,7 @@
           <a:p>
             <a:fld id="{48A87A34-81AB-432B-8DAE-1953F412C126}" type="datetimeFigureOut">
               <a:rPr lang="en-US" dirty="0"/>
-              <a:t>3/5/2019</a:t>
+              <a:t>3/6/2019</a:t>
             </a:fld>
             <a:endParaRPr lang="en-US" dirty="0"/>
           </a:p>
@@ -7144,7 +7144,7 @@
           <a:p>
             <a:fld id="{48A87A34-81AB-432B-8DAE-1953F412C126}" type="datetimeFigureOut">
               <a:rPr lang="en-US" dirty="0"/>
-              <a:t>3/5/2019</a:t>
+              <a:t>3/6/2019</a:t>
             </a:fld>
             <a:endParaRPr lang="en-US" dirty="0"/>
           </a:p>
@@ -7309,7 +7309,7 @@
           <a:p>
             <a:fld id="{48A87A34-81AB-432B-8DAE-1953F412C126}" type="datetimeFigureOut">
               <a:rPr lang="en-US" dirty="0"/>
-              <a:t>3/5/2019</a:t>
+              <a:t>3/6/2019</a:t>
             </a:fld>
             <a:endParaRPr lang="en-US" dirty="0"/>
           </a:p>
@@ -7554,7 +7554,7 @@
           <a:p>
             <a:fld id="{48A87A34-81AB-432B-8DAE-1953F412C126}" type="datetimeFigureOut">
               <a:rPr lang="en-US" dirty="0"/>
-              <a:t>3/5/2019</a:t>
+              <a:t>3/6/2019</a:t>
             </a:fld>
             <a:endParaRPr lang="en-US" dirty="0"/>
           </a:p>
@@ -7781,7 +7781,7 @@
           <a:p>
             <a:fld id="{48A87A34-81AB-432B-8DAE-1953F412C126}" type="datetimeFigureOut">
               <a:rPr lang="en-US" dirty="0"/>
-              <a:t>3/5/2019</a:t>
+              <a:t>3/6/2019</a:t>
             </a:fld>
             <a:endParaRPr lang="en-US" dirty="0"/>
           </a:p>
@@ -8157,7 +8157,7 @@
           <a:p>
             <a:fld id="{48A87A34-81AB-432B-8DAE-1953F412C126}" type="datetimeFigureOut">
               <a:rPr lang="en-US" dirty="0"/>
-              <a:t>3/5/2019</a:t>
+              <a:t>3/6/2019</a:t>
             </a:fld>
             <a:endParaRPr lang="en-US" dirty="0"/>
           </a:p>
@@ -8270,7 +8270,7 @@
           <a:p>
             <a:fld id="{48A87A34-81AB-432B-8DAE-1953F412C126}" type="datetimeFigureOut">
               <a:rPr lang="en-US" dirty="0"/>
-              <a:t>3/5/2019</a:t>
+              <a:t>3/6/2019</a:t>
             </a:fld>
             <a:endParaRPr lang="en-US" dirty="0"/>
           </a:p>
@@ -8360,7 +8360,7 @@
           <a:p>
             <a:fld id="{48A87A34-81AB-432B-8DAE-1953F412C126}" type="datetimeFigureOut">
               <a:rPr lang="en-US" dirty="0"/>
-              <a:t>3/5/2019</a:t>
+              <a:t>3/6/2019</a:t>
             </a:fld>
             <a:endParaRPr lang="en-US" dirty="0"/>
           </a:p>
@@ -8604,7 +8604,7 @@
           <a:p>
             <a:fld id="{48A87A34-81AB-432B-8DAE-1953F412C126}" type="datetimeFigureOut">
               <a:rPr lang="en-US" dirty="0"/>
-              <a:t>3/5/2019</a:t>
+              <a:t>3/6/2019</a:t>
             </a:fld>
             <a:endParaRPr lang="en-US" dirty="0"/>
           </a:p>
@@ -8879,7 +8879,7 @@
           <a:p>
             <a:fld id="{48A87A34-81AB-432B-8DAE-1953F412C126}" type="datetimeFigureOut">
               <a:rPr lang="en-US" dirty="0"/>
-              <a:t>3/5/2019</a:t>
+              <a:t>3/6/2019</a:t>
             </a:fld>
             <a:endParaRPr lang="en-US" dirty="0"/>
           </a:p>
@@ -8990,7 +8990,7 @@
           <a:noFill/>
           <a:extLst>
             <a:ext uri="{909E8E84-426E-40dd-AFC4-6F175D3DCCD1}">
-              <a14:hiddenFill xmlns="" xmlns:a14="http://schemas.microsoft.com/office/drawing/2010/main">
+              <a14:hiddenFill xmlns:a14="http://schemas.microsoft.com/office/drawing/2010/main" xmlns="">
                 <a:solidFill>
                   <a:srgbClr val="FFFFFF"/>
                 </a:solidFill>
@@ -9064,7 +9064,7 @@
               </a:ln>
               <a:extLst>
                 <a:ext uri="{91240B29-F687-4f45-9708-019B960494DF}">
-                  <a14:hiddenLine xmlns="" xmlns:a14="http://schemas.microsoft.com/office/drawing/2010/main" w="9525">
+                  <a14:hiddenLine xmlns:a14="http://schemas.microsoft.com/office/drawing/2010/main" xmlns="" w="9525">
                     <a:solidFill>
                       <a:srgbClr val="000000"/>
                     </a:solidFill>
@@ -9154,7 +9154,7 @@
               </a:ln>
               <a:extLst>
                 <a:ext uri="{91240B29-F687-4f45-9708-019B960494DF}">
-                  <a14:hiddenLine xmlns="" xmlns:a14="http://schemas.microsoft.com/office/drawing/2010/main" w="9525">
+                  <a14:hiddenLine xmlns:a14="http://schemas.microsoft.com/office/drawing/2010/main" xmlns="" w="9525">
                     <a:solidFill>
                       <a:srgbClr val="000000"/>
                     </a:solidFill>
@@ -9244,7 +9244,7 @@
               </a:ln>
               <a:extLst>
                 <a:ext uri="{91240B29-F687-4f45-9708-019B960494DF}">
-                  <a14:hiddenLine xmlns="" xmlns:a14="http://schemas.microsoft.com/office/drawing/2010/main" w="9525">
+                  <a14:hiddenLine xmlns:a14="http://schemas.microsoft.com/office/drawing/2010/main" xmlns="" w="9525">
                     <a:solidFill>
                       <a:srgbClr val="000000"/>
                     </a:solidFill>
@@ -9306,7 +9306,7 @@
               </a:ln>
               <a:extLst>
                 <a:ext uri="{91240B29-F687-4f45-9708-019B960494DF}">
-                  <a14:hiddenLine xmlns="" xmlns:a14="http://schemas.microsoft.com/office/drawing/2010/main" w="9525">
+                  <a14:hiddenLine xmlns:a14="http://schemas.microsoft.com/office/drawing/2010/main" xmlns="" w="9525">
                     <a:solidFill>
                       <a:srgbClr val="000000"/>
                     </a:solidFill>
@@ -9396,7 +9396,7 @@
               </a:ln>
               <a:extLst>
                 <a:ext uri="{91240B29-F687-4f45-9708-019B960494DF}">
-                  <a14:hiddenLine xmlns="" xmlns:a14="http://schemas.microsoft.com/office/drawing/2010/main" w="9525">
+                  <a14:hiddenLine xmlns:a14="http://schemas.microsoft.com/office/drawing/2010/main" xmlns="" w="9525">
                     <a:solidFill>
                       <a:srgbClr val="000000"/>
                     </a:solidFill>
@@ -9458,7 +9458,7 @@
               </a:ln>
               <a:extLst>
                 <a:ext uri="{91240B29-F687-4f45-9708-019B960494DF}">
-                  <a14:hiddenLine xmlns="" xmlns:a14="http://schemas.microsoft.com/office/drawing/2010/main" w="9525">
+                  <a14:hiddenLine xmlns:a14="http://schemas.microsoft.com/office/drawing/2010/main" xmlns="" w="9525">
                     <a:solidFill>
                       <a:srgbClr val="000000"/>
                     </a:solidFill>
@@ -9520,7 +9520,7 @@
               </a:ln>
               <a:extLst>
                 <a:ext uri="{91240B29-F687-4f45-9708-019B960494DF}">
-                  <a14:hiddenLine xmlns="" xmlns:a14="http://schemas.microsoft.com/office/drawing/2010/main" w="9525">
+                  <a14:hiddenLine xmlns:a14="http://schemas.microsoft.com/office/drawing/2010/main" xmlns="" w="9525">
                     <a:solidFill>
                       <a:srgbClr val="000000"/>
                     </a:solidFill>
@@ -9610,7 +9610,7 @@
               </a:ln>
               <a:extLst>
                 <a:ext uri="{91240B29-F687-4f45-9708-019B960494DF}">
-                  <a14:hiddenLine xmlns="" xmlns:a14="http://schemas.microsoft.com/office/drawing/2010/main" w="9525">
+                  <a14:hiddenLine xmlns:a14="http://schemas.microsoft.com/office/drawing/2010/main" xmlns="" w="9525">
                     <a:solidFill>
                       <a:srgbClr val="000000"/>
                     </a:solidFill>
@@ -9700,7 +9700,7 @@
               </a:ln>
               <a:extLst>
                 <a:ext uri="{91240B29-F687-4f45-9708-019B960494DF}">
-                  <a14:hiddenLine xmlns="" xmlns:a14="http://schemas.microsoft.com/office/drawing/2010/main" w="9525">
+                  <a14:hiddenLine xmlns:a14="http://schemas.microsoft.com/office/drawing/2010/main" xmlns="" w="9525">
                     <a:solidFill>
                       <a:srgbClr val="000000"/>
                     </a:solidFill>
@@ -9762,7 +9762,7 @@
               </a:ln>
               <a:extLst>
                 <a:ext uri="{91240B29-F687-4f45-9708-019B960494DF}">
-                  <a14:hiddenLine xmlns="" xmlns:a14="http://schemas.microsoft.com/office/drawing/2010/main" w="9525">
+                  <a14:hiddenLine xmlns:a14="http://schemas.microsoft.com/office/drawing/2010/main" xmlns="" w="9525">
                     <a:solidFill>
                       <a:srgbClr val="000000"/>
                     </a:solidFill>
@@ -9872,7 +9872,7 @@
               </a:ln>
               <a:extLst>
                 <a:ext uri="{91240B29-F687-4f45-9708-019B960494DF}">
-                  <a14:hiddenLine xmlns="" xmlns:a14="http://schemas.microsoft.com/office/drawing/2010/main" w="9525">
+                  <a14:hiddenLine xmlns:a14="http://schemas.microsoft.com/office/drawing/2010/main" xmlns="" w="9525">
                     <a:solidFill>
                       <a:srgbClr val="000000"/>
                     </a:solidFill>
@@ -9956,7 +9956,7 @@
               </a:ln>
               <a:extLst>
                 <a:ext uri="{91240B29-F687-4f45-9708-019B960494DF}">
-                  <a14:hiddenLine xmlns="" xmlns:a14="http://schemas.microsoft.com/office/drawing/2010/main" w="9525">
+                  <a14:hiddenLine xmlns:a14="http://schemas.microsoft.com/office/drawing/2010/main" xmlns="" w="9525">
                     <a:solidFill>
                       <a:srgbClr val="000000"/>
                     </a:solidFill>
@@ -10018,7 +10018,7 @@
               </a:ln>
               <a:extLst>
                 <a:ext uri="{91240B29-F687-4f45-9708-019B960494DF}">
-                  <a14:hiddenLine xmlns="" xmlns:a14="http://schemas.microsoft.com/office/drawing/2010/main" w="9525">
+                  <a14:hiddenLine xmlns:a14="http://schemas.microsoft.com/office/drawing/2010/main" xmlns="" w="9525">
                     <a:solidFill>
                       <a:srgbClr val="000000"/>
                     </a:solidFill>
@@ -10080,7 +10080,7 @@
               </a:ln>
               <a:extLst>
                 <a:ext uri="{91240B29-F687-4f45-9708-019B960494DF}">
-                  <a14:hiddenLine xmlns="" xmlns:a14="http://schemas.microsoft.com/office/drawing/2010/main" w="9525">
+                  <a14:hiddenLine xmlns:a14="http://schemas.microsoft.com/office/drawing/2010/main" xmlns="" w="9525">
                     <a:solidFill>
                       <a:srgbClr val="000000"/>
                     </a:solidFill>
@@ -10170,7 +10170,7 @@
               </a:ln>
               <a:extLst>
                 <a:ext uri="{91240B29-F687-4f45-9708-019B960494DF}">
-                  <a14:hiddenLine xmlns="" xmlns:a14="http://schemas.microsoft.com/office/drawing/2010/main" w="9525">
+                  <a14:hiddenLine xmlns:a14="http://schemas.microsoft.com/office/drawing/2010/main" xmlns="" w="9525">
                     <a:solidFill>
                       <a:srgbClr val="000000"/>
                     </a:solidFill>
@@ -10204,7 +10204,7 @@
               </a:ln>
               <a:extLst>
                 <a:ext uri="{91240B29-F687-4f45-9708-019B960494DF}">
-                  <a14:hiddenLine xmlns="" xmlns:a14="http://schemas.microsoft.com/office/drawing/2010/main" w="9525">
+                  <a14:hiddenLine xmlns:a14="http://schemas.microsoft.com/office/drawing/2010/main" xmlns="" w="9525">
                     <a:solidFill>
                       <a:srgbClr val="000000"/>
                     </a:solidFill>
@@ -10269,7 +10269,7 @@
               </a:ln>
               <a:extLst>
                 <a:ext uri="{91240B29-F687-4f45-9708-019B960494DF}">
-                  <a14:hiddenLine xmlns="" xmlns:a14="http://schemas.microsoft.com/office/drawing/2010/main" w="9525">
+                  <a14:hiddenLine xmlns:a14="http://schemas.microsoft.com/office/drawing/2010/main" xmlns="" w="9525">
                     <a:solidFill>
                       <a:srgbClr val="000000"/>
                     </a:solidFill>
@@ -10359,7 +10359,7 @@
               </a:ln>
               <a:extLst>
                 <a:ext uri="{91240B29-F687-4f45-9708-019B960494DF}">
-                  <a14:hiddenLine xmlns="" xmlns:a14="http://schemas.microsoft.com/office/drawing/2010/main" w="9525">
+                  <a14:hiddenLine xmlns:a14="http://schemas.microsoft.com/office/drawing/2010/main" xmlns="" w="9525">
                     <a:solidFill>
                       <a:srgbClr val="000000"/>
                     </a:solidFill>
@@ -10421,7 +10421,7 @@
               </a:ln>
               <a:extLst>
                 <a:ext uri="{91240B29-F687-4f45-9708-019B960494DF}">
-                  <a14:hiddenLine xmlns="" xmlns:a14="http://schemas.microsoft.com/office/drawing/2010/main" w="9525">
+                  <a14:hiddenLine xmlns:a14="http://schemas.microsoft.com/office/drawing/2010/main" xmlns="" w="9525">
                     <a:solidFill>
                       <a:srgbClr val="000000"/>
                     </a:solidFill>
@@ -10511,7 +10511,7 @@
               </a:ln>
               <a:extLst>
                 <a:ext uri="{91240B29-F687-4f45-9708-019B960494DF}">
-                  <a14:hiddenLine xmlns="" xmlns:a14="http://schemas.microsoft.com/office/drawing/2010/main" w="9525">
+                  <a14:hiddenLine xmlns:a14="http://schemas.microsoft.com/office/drawing/2010/main" xmlns="" w="9525">
                     <a:solidFill>
                       <a:srgbClr val="000000"/>
                     </a:solidFill>
@@ -10576,7 +10576,7 @@
               </a:ln>
               <a:extLst>
                 <a:ext uri="{91240B29-F687-4f45-9708-019B960494DF}">
-                  <a14:hiddenLine xmlns="" xmlns:a14="http://schemas.microsoft.com/office/drawing/2010/main" w="9525">
+                  <a14:hiddenLine xmlns:a14="http://schemas.microsoft.com/office/drawing/2010/main" xmlns="" w="9525">
                     <a:solidFill>
                       <a:srgbClr val="000000"/>
                     </a:solidFill>
@@ -10638,7 +10638,7 @@
               </a:ln>
               <a:extLst>
                 <a:ext uri="{91240B29-F687-4f45-9708-019B960494DF}">
-                  <a14:hiddenLine xmlns="" xmlns:a14="http://schemas.microsoft.com/office/drawing/2010/main" w="9525">
+                  <a14:hiddenLine xmlns:a14="http://schemas.microsoft.com/office/drawing/2010/main" xmlns="" w="9525">
                     <a:solidFill>
                       <a:srgbClr val="000000"/>
                     </a:solidFill>
@@ -10728,7 +10728,7 @@
               </a:ln>
               <a:extLst>
                 <a:ext uri="{91240B29-F687-4f45-9708-019B960494DF}">
-                  <a14:hiddenLine xmlns="" xmlns:a14="http://schemas.microsoft.com/office/drawing/2010/main" w="9525">
+                  <a14:hiddenLine xmlns:a14="http://schemas.microsoft.com/office/drawing/2010/main" xmlns="" w="9525">
                     <a:solidFill>
                       <a:srgbClr val="000000"/>
                     </a:solidFill>
@@ -10818,7 +10818,7 @@
               </a:ln>
               <a:extLst>
                 <a:ext uri="{91240B29-F687-4f45-9708-019B960494DF}">
-                  <a14:hiddenLine xmlns="" xmlns:a14="http://schemas.microsoft.com/office/drawing/2010/main" w="9525">
+                  <a14:hiddenLine xmlns:a14="http://schemas.microsoft.com/office/drawing/2010/main" xmlns="" w="9525">
                     <a:solidFill>
                       <a:srgbClr val="000000"/>
                     </a:solidFill>
@@ -10883,7 +10883,7 @@
               </a:ln>
               <a:extLst>
                 <a:ext uri="{91240B29-F687-4f45-9708-019B960494DF}">
-                  <a14:hiddenLine xmlns="" xmlns:a14="http://schemas.microsoft.com/office/drawing/2010/main" w="9525">
+                  <a14:hiddenLine xmlns:a14="http://schemas.microsoft.com/office/drawing/2010/main" xmlns="" w="9525">
                     <a:solidFill>
                       <a:srgbClr val="000000"/>
                     </a:solidFill>
@@ -11003,7 +11003,7 @@
               </a:ln>
               <a:extLst>
                 <a:ext uri="{91240B29-F687-4f45-9708-019B960494DF}">
-                  <a14:hiddenLine xmlns="" xmlns:a14="http://schemas.microsoft.com/office/drawing/2010/main" w="9525">
+                  <a14:hiddenLine xmlns:a14="http://schemas.microsoft.com/office/drawing/2010/main" xmlns="" w="9525">
                     <a:solidFill>
                       <a:srgbClr val="000000"/>
                     </a:solidFill>
@@ -11101,7 +11101,7 @@
               </a:ln>
               <a:extLst>
                 <a:ext uri="{91240B29-F687-4f45-9708-019B960494DF}">
-                  <a14:hiddenLine xmlns="" xmlns:a14="http://schemas.microsoft.com/office/drawing/2010/main" w="9525">
+                  <a14:hiddenLine xmlns:a14="http://schemas.microsoft.com/office/drawing/2010/main" xmlns="" w="9525">
                     <a:solidFill>
                       <a:srgbClr val="000000"/>
                     </a:solidFill>
@@ -11216,7 +11216,7 @@
               </a:ln>
               <a:extLst>
                 <a:ext uri="{91240B29-F687-4f45-9708-019B960494DF}">
-                  <a14:hiddenLine xmlns="" xmlns:a14="http://schemas.microsoft.com/office/drawing/2010/main" w="9525">
+                  <a14:hiddenLine xmlns:a14="http://schemas.microsoft.com/office/drawing/2010/main" xmlns="" w="9525">
                     <a:solidFill>
                       <a:srgbClr val="000000"/>
                     </a:solidFill>
@@ -11306,7 +11306,7 @@
               </a:ln>
               <a:extLst>
                 <a:ext uri="{91240B29-F687-4f45-9708-019B960494DF}">
-                  <a14:hiddenLine xmlns="" xmlns:a14="http://schemas.microsoft.com/office/drawing/2010/main" w="9525">
+                  <a14:hiddenLine xmlns:a14="http://schemas.microsoft.com/office/drawing/2010/main" xmlns="" w="9525">
                     <a:solidFill>
                       <a:srgbClr val="000000"/>
                     </a:solidFill>
@@ -11371,7 +11371,7 @@
               </a:ln>
               <a:extLst>
                 <a:ext uri="{91240B29-F687-4f45-9708-019B960494DF}">
-                  <a14:hiddenLine xmlns="" xmlns:a14="http://schemas.microsoft.com/office/drawing/2010/main" w="9525">
+                  <a14:hiddenLine xmlns:a14="http://schemas.microsoft.com/office/drawing/2010/main" xmlns="" w="9525">
                     <a:solidFill>
                       <a:srgbClr val="000000"/>
                     </a:solidFill>
@@ -11461,7 +11461,7 @@
               </a:ln>
               <a:extLst>
                 <a:ext uri="{91240B29-F687-4f45-9708-019B960494DF}">
-                  <a14:hiddenLine xmlns="" xmlns:a14="http://schemas.microsoft.com/office/drawing/2010/main" w="9525">
+                  <a14:hiddenLine xmlns:a14="http://schemas.microsoft.com/office/drawing/2010/main" xmlns="" w="9525">
                     <a:solidFill>
                       <a:srgbClr val="000000"/>
                     </a:solidFill>
@@ -11529,7 +11529,7 @@
               </a:ln>
               <a:extLst>
                 <a:ext uri="{91240B29-F687-4f45-9708-019B960494DF}">
-                  <a14:hiddenLine xmlns="" xmlns:a14="http://schemas.microsoft.com/office/drawing/2010/main" w="9525">
+                  <a14:hiddenLine xmlns:a14="http://schemas.microsoft.com/office/drawing/2010/main" xmlns="" w="9525">
                     <a:solidFill>
                       <a:srgbClr val="000000"/>
                     </a:solidFill>
@@ -11619,7 +11619,7 @@
               </a:ln>
               <a:extLst>
                 <a:ext uri="{91240B29-F687-4f45-9708-019B960494DF}">
-                  <a14:hiddenLine xmlns="" xmlns:a14="http://schemas.microsoft.com/office/drawing/2010/main" w="9525">
+                  <a14:hiddenLine xmlns:a14="http://schemas.microsoft.com/office/drawing/2010/main" xmlns="" w="9525">
                     <a:solidFill>
                       <a:srgbClr val="000000"/>
                     </a:solidFill>
@@ -11687,7 +11687,7 @@
               </a:ln>
               <a:extLst>
                 <a:ext uri="{91240B29-F687-4f45-9708-019B960494DF}">
-                  <a14:hiddenLine xmlns="" xmlns:a14="http://schemas.microsoft.com/office/drawing/2010/main" w="9525">
+                  <a14:hiddenLine xmlns:a14="http://schemas.microsoft.com/office/drawing/2010/main" xmlns="" w="9525">
                     <a:solidFill>
                       <a:srgbClr val="000000"/>
                     </a:solidFill>
@@ -11777,7 +11777,7 @@
               </a:ln>
               <a:extLst>
                 <a:ext uri="{91240B29-F687-4f45-9708-019B960494DF}">
-                  <a14:hiddenLine xmlns="" xmlns:a14="http://schemas.microsoft.com/office/drawing/2010/main" w="9525">
+                  <a14:hiddenLine xmlns:a14="http://schemas.microsoft.com/office/drawing/2010/main" xmlns="" w="9525">
                     <a:solidFill>
                       <a:srgbClr val="000000"/>
                     </a:solidFill>
@@ -11811,7 +11811,7 @@
               </a:ln>
               <a:extLst>
                 <a:ext uri="{91240B29-F687-4f45-9708-019B960494DF}">
-                  <a14:hiddenLine xmlns="" xmlns:a14="http://schemas.microsoft.com/office/drawing/2010/main" w="9525">
+                  <a14:hiddenLine xmlns:a14="http://schemas.microsoft.com/office/drawing/2010/main" xmlns="" w="9525">
                     <a:solidFill>
                       <a:srgbClr val="000000"/>
                     </a:solidFill>
@@ -11952,7 +11952,7 @@
             <a:fld id="{48A87A34-81AB-432B-8DAE-1953F412C126}" type="datetimeFigureOut">
               <a:rPr lang="en-US" dirty="0"/>
               <a:pPr/>
-              <a:t>3/5/2019</a:t>
+              <a:t>3/6/2019</a:t>
             </a:fld>
             <a:endParaRPr lang="en-US" dirty="0"/>
           </a:p>
@@ -25047,7 +25047,7 @@
         <p:spPr>
           <a:xfrm>
             <a:off x="814812" y="1259455"/>
-            <a:ext cx="10746463" cy="3662541"/>
+            <a:ext cx="10746463" cy="4770537"/>
           </a:xfrm>
           <a:prstGeom prst="rect">
             <a:avLst/>
@@ -25104,7 +25104,73 @@
             </a:pPr>
             <a:r>
               <a:rPr lang="en-US" sz="3200" dirty="0"/>
-              <a:t>The code for converting title to vector is here.</a:t>
+              <a:t>The code for converting title to vector is </a:t>
+            </a:r>
+            <a:r>
+              <a:rPr lang="en-US" sz="3200" dirty="0">
+                <a:hlinkClick r:id="rId2"/>
+              </a:rPr>
+              <a:t>here</a:t>
+            </a:r>
+            <a:r>
+              <a:rPr lang="en-US" sz="3200" dirty="0"/>
+              <a:t>.</a:t>
+            </a:r>
+          </a:p>
+          <a:p>
+            <a:pPr marL="914400" lvl="1" indent="-457200" defTabSz="914400" eaLnBrk="0" fontAlgn="base" hangingPunct="0">
+              <a:spcBef>
+                <a:spcPct val="0"/>
+              </a:spcBef>
+              <a:spcAft>
+                <a:spcPct val="0"/>
+              </a:spcAft>
+              <a:buFont typeface="Arial" panose="020B0604020202020204" pitchFamily="34" charset="0"/>
+              <a:buChar char="•"/>
+            </a:pPr>
+            <a:r>
+              <a:rPr lang="en-US" sz="2400" dirty="0"/>
+              <a:t>For simplicity, here only use </a:t>
+            </a:r>
+            <a:r>
+              <a:rPr lang="en-US" sz="2400" dirty="0" err="1"/>
+              <a:t>scikit</a:t>
+            </a:r>
+            <a:r>
+              <a:rPr lang="en-US" sz="2400" dirty="0"/>
+              <a:t>-lean’s bag of words(specific </a:t>
+            </a:r>
+            <a:r>
+              <a:rPr lang="en-US" sz="2400" dirty="0" err="1"/>
+              <a:t>HashingVectorizer</a:t>
+            </a:r>
+            <a:r>
+              <a:rPr lang="en-US" sz="2400" dirty="0"/>
+              <a:t>) because we have very big corpus also the title is free style.</a:t>
+            </a:r>
+          </a:p>
+          <a:p>
+            <a:pPr marL="914400" lvl="1" indent="-457200" defTabSz="914400" eaLnBrk="0" fontAlgn="base" hangingPunct="0">
+              <a:spcBef>
+                <a:spcPct val="0"/>
+              </a:spcBef>
+              <a:spcAft>
+                <a:spcPct val="0"/>
+              </a:spcAft>
+              <a:buFont typeface="Arial" panose="020B0604020202020204" pitchFamily="34" charset="0"/>
+              <a:buChar char="•"/>
+            </a:pPr>
+            <a:r>
+              <a:rPr lang="en-US" sz="2400" dirty="0"/>
+              <a:t>There are other choice like one-hot or </a:t>
+            </a:r>
+            <a:r>
+              <a:rPr lang="en-US" sz="2400" dirty="0" err="1"/>
+              <a:t>tfidi</a:t>
+            </a:r>
+            <a:r>
+              <a:rPr lang="en-US" sz="2400" dirty="0"/>
+              <a:t>. This is just a example.</a:t>
             </a:r>
           </a:p>
           <a:p>
@@ -25244,7 +25310,7 @@
             </a:pPr>
             <a:r>
               <a:rPr lang="en-US" sz="3200" dirty="0"/>
-              <a:t>  </a:t>
+              <a:t>  Result</a:t>
             </a:r>
             <a:endParaRPr lang="en-US" sz="2400" dirty="0"/>
           </a:p>
@@ -25739,7 +25805,7 @@
         <p:spPr>
           <a:xfrm>
             <a:off x="1173892" y="1189571"/>
-            <a:ext cx="10095471" cy="2308324"/>
+            <a:ext cx="10095471" cy="3293209"/>
           </a:xfrm>
           <a:prstGeom prst="rect">
             <a:avLst/>
@@ -25764,24 +25830,34 @@
             </a:pPr>
             <a:r>
               <a:rPr lang="en-US" altLang="en-US" sz="3200" dirty="0"/>
-              <a:t>Code: https://</a:t>
+              <a:t>Code: </a:t>
             </a:r>
             <a:r>
-              <a:rPr lang="en-US" altLang="en-US" sz="3200" dirty="0" err="1"/>
-              <a:t>github.com</a:t>
+              <a:rPr lang="en-US" altLang="en-US" sz="3200" dirty="0">
+                <a:hlinkClick r:id="rId2"/>
+              </a:rPr>
+              <a:t>https://github.com/billyean/anna</a:t>
             </a:r>
+            <a:endParaRPr lang="en-US" altLang="en-US" sz="3200" dirty="0"/>
+          </a:p>
+          <a:p>
+            <a:pPr marL="571500" indent="-571500" defTabSz="914400" eaLnBrk="0" fontAlgn="base" hangingPunct="0">
+              <a:spcBef>
+                <a:spcPct val="0"/>
+              </a:spcBef>
+              <a:spcAft>
+                <a:spcPct val="0"/>
+              </a:spcAft>
+              <a:buFont typeface="Arial" panose="020B0604020202020204" pitchFamily="34" charset="0"/>
+              <a:buChar char="•"/>
+            </a:pPr>
             <a:r>
-              <a:rPr lang="en-US" altLang="en-US" sz="3200" dirty="0"/>
-              <a:t>/</a:t>
+              <a:rPr lang="en-US" altLang="en-US" sz="3200" dirty="0">
+                <a:hlinkClick r:id="rId3"/>
+              </a:rPr>
+              <a:t>https://learning.oreilly.com/library/view/applied-text-analysis/9781491963036/ch04.html</a:t>
             </a:r>
-            <a:r>
-              <a:rPr lang="en-US" altLang="en-US" sz="3200" dirty="0" err="1"/>
-              <a:t>billyean</a:t>
-            </a:r>
-            <a:r>
-              <a:rPr lang="en-US" altLang="en-US" sz="3200" dirty="0"/>
-              <a:t>/anna</a:t>
-            </a:r>
+            <a:endParaRPr lang="en-US" altLang="en-US" sz="3200" dirty="0"/>
           </a:p>
           <a:p>
             <a:pPr marL="1028700" lvl="1" indent="-571500" defTabSz="914400" eaLnBrk="0" fontAlgn="base" hangingPunct="0">

</xml_diff>